<commit_message>
Presentacion Primer Sprint formato PowerPoint actualizado el 28/05/2019
</commit_message>
<xml_diff>
--- a/PrimerSprint/Presentación_PrimerSprint_AGNEX.pptx
+++ b/PrimerSprint/Presentación_PrimerSprint_AGNEX.pptx
@@ -118,6 +118,11 @@
       </a:defRPr>
     </a:lvl9pPr>
   </p:defaultTextStyle>
+  <p:extLst>
+    <p:ext uri="{EFAFB233-063F-42B5-8137-9DF3F51BA10A}">
+      <p15:sldGuideLst xmlns:p15="http://schemas.microsoft.com/office/powerpoint/2012/main"/>
+    </p:ext>
+  </p:extLst>
 </p:presentation>
 </file>
 
@@ -356,6 +361,11 @@
         </p:txBody>
       </p:sp>
     </p:spTree>
+    <p:extLst>
+      <p:ext uri="{BB962C8B-B14F-4D97-AF65-F5344CB8AC3E}">
+        <p14:creationId xmlns:p14="http://schemas.microsoft.com/office/powerpoint/2010/main" val="1563577680"/>
+      </p:ext>
+    </p:extLst>
   </p:cSld>
   <p:clrMap bg1="lt1" tx1="dk1" bg2="lt2" tx2="dk2" accent1="accent1" accent2="accent2" accent3="accent3" accent4="accent4" accent5="accent5" accent6="accent6" hlink="hlink" folHlink="folHlink"/>
   <p:notesStyle>
@@ -567,6 +577,11 @@
         </p:txBody>
       </p:sp>
     </p:spTree>
+    <p:extLst>
+      <p:ext uri="{BB962C8B-B14F-4D97-AF65-F5344CB8AC3E}">
+        <p14:creationId xmlns:p14="http://schemas.microsoft.com/office/powerpoint/2010/main" val="2099940382"/>
+      </p:ext>
+    </p:extLst>
   </p:cSld>
   <p:clrMapOvr>
     <a:masterClrMapping/>
@@ -689,6 +704,11 @@
         </p:txBody>
       </p:sp>
     </p:spTree>
+    <p:extLst>
+      <p:ext uri="{BB962C8B-B14F-4D97-AF65-F5344CB8AC3E}">
+        <p14:creationId xmlns:p14="http://schemas.microsoft.com/office/powerpoint/2010/main" val="4195125985"/>
+      </p:ext>
+    </p:extLst>
   </p:cSld>
   <p:clrMapOvr>
     <a:masterClrMapping/>
@@ -811,6 +831,11 @@
         </p:txBody>
       </p:sp>
     </p:spTree>
+    <p:extLst>
+      <p:ext uri="{BB962C8B-B14F-4D97-AF65-F5344CB8AC3E}">
+        <p14:creationId xmlns:p14="http://schemas.microsoft.com/office/powerpoint/2010/main" val="218969572"/>
+      </p:ext>
+    </p:extLst>
   </p:cSld>
   <p:clrMapOvr>
     <a:masterClrMapping/>
@@ -933,6 +958,11 @@
         </p:txBody>
       </p:sp>
     </p:spTree>
+    <p:extLst>
+      <p:ext uri="{BB962C8B-B14F-4D97-AF65-F5344CB8AC3E}">
+        <p14:creationId xmlns:p14="http://schemas.microsoft.com/office/powerpoint/2010/main" val="3224686526"/>
+      </p:ext>
+    </p:extLst>
   </p:cSld>
   <p:clrMapOvr>
     <a:masterClrMapping/>
@@ -1055,6 +1085,11 @@
         </p:txBody>
       </p:sp>
     </p:spTree>
+    <p:extLst>
+      <p:ext uri="{BB962C8B-B14F-4D97-AF65-F5344CB8AC3E}">
+        <p14:creationId xmlns:p14="http://schemas.microsoft.com/office/powerpoint/2010/main" val="3962637111"/>
+      </p:ext>
+    </p:extLst>
   </p:cSld>
   <p:clrMapOvr>
     <a:masterClrMapping/>
@@ -1177,6 +1212,11 @@
         </p:txBody>
       </p:sp>
     </p:spTree>
+    <p:extLst>
+      <p:ext uri="{BB962C8B-B14F-4D97-AF65-F5344CB8AC3E}">
+        <p14:creationId xmlns:p14="http://schemas.microsoft.com/office/powerpoint/2010/main" val="2310100210"/>
+      </p:ext>
+    </p:extLst>
   </p:cSld>
   <p:clrMapOvr>
     <a:masterClrMapping/>
@@ -1299,6 +1339,11 @@
         </p:txBody>
       </p:sp>
     </p:spTree>
+    <p:extLst>
+      <p:ext uri="{BB962C8B-B14F-4D97-AF65-F5344CB8AC3E}">
+        <p14:creationId xmlns:p14="http://schemas.microsoft.com/office/powerpoint/2010/main" val="435704541"/>
+      </p:ext>
+    </p:extLst>
   </p:cSld>
   <p:clrMapOvr>
     <a:masterClrMapping/>
@@ -1421,6 +1466,11 @@
         </p:txBody>
       </p:sp>
     </p:spTree>
+    <p:extLst>
+      <p:ext uri="{BB962C8B-B14F-4D97-AF65-F5344CB8AC3E}">
+        <p14:creationId xmlns:p14="http://schemas.microsoft.com/office/powerpoint/2010/main" val="3898891920"/>
+      </p:ext>
+    </p:extLst>
   </p:cSld>
   <p:clrMapOvr>
     <a:masterClrMapping/>
@@ -1543,6 +1593,11 @@
         </p:txBody>
       </p:sp>
     </p:spTree>
+    <p:extLst>
+      <p:ext uri="{BB962C8B-B14F-4D97-AF65-F5344CB8AC3E}">
+        <p14:creationId xmlns:p14="http://schemas.microsoft.com/office/powerpoint/2010/main" val="1447200360"/>
+      </p:ext>
+    </p:extLst>
   </p:cSld>
   <p:clrMapOvr>
     <a:masterClrMapping/>
@@ -1665,6 +1720,11 @@
         </p:txBody>
       </p:sp>
     </p:spTree>
+    <p:extLst>
+      <p:ext uri="{BB962C8B-B14F-4D97-AF65-F5344CB8AC3E}">
+        <p14:creationId xmlns:p14="http://schemas.microsoft.com/office/powerpoint/2010/main" val="1817225050"/>
+      </p:ext>
+    </p:extLst>
   </p:cSld>
   <p:clrMapOvr>
     <a:masterClrMapping/>
@@ -6285,7 +6345,7 @@
       </p:sp>
       <p:pic>
         <p:nvPicPr>
-          <p:cNvPr id="71" name="Imagen 70"/>
+          <p:cNvPr id="72" name="Imagen 71"/>
           <p:cNvPicPr/>
           <p:nvPr/>
         </p:nvPicPr>
@@ -6295,8 +6355,8 @@
         </p:blipFill>
         <p:spPr>
           <a:xfrm>
-            <a:off x="154800" y="1708200"/>
-            <a:ext cx="8629200" cy="4771800"/>
+            <a:off x="237240" y="982080"/>
+            <a:ext cx="8667360" cy="466200"/>
           </a:xfrm>
           <a:prstGeom prst="rect">
             <a:avLst/>
@@ -6308,25 +6368,26 @@
       </p:pic>
       <p:pic>
         <p:nvPicPr>
-          <p:cNvPr id="72" name="Imagen 71"/>
-          <p:cNvPicPr/>
+          <p:cNvPr id="2" name="Imagen 1"/>
+          <p:cNvPicPr>
+            <a:picLocks noChangeAspect="1"/>
+          </p:cNvPicPr>
           <p:nvPr/>
         </p:nvPicPr>
         <p:blipFill>
           <a:blip r:embed="rId4"/>
-          <a:stretch/>
+          <a:stretch>
+            <a:fillRect/>
+          </a:stretch>
         </p:blipFill>
         <p:spPr>
           <a:xfrm>
-            <a:off x="237240" y="982080"/>
-            <a:ext cx="8667360" cy="466200"/>
-          </a:xfrm>
-          <a:prstGeom prst="rect">
-            <a:avLst/>
-          </a:prstGeom>
-          <a:ln>
-            <a:noFill/>
-          </a:ln>
+            <a:off x="237240" y="1557337"/>
+            <a:ext cx="8825737" cy="5169172"/>
+          </a:xfrm>
+          <a:prstGeom prst="rect">
+            <a:avLst/>
+          </a:prstGeom>
         </p:spPr>
       </p:pic>
     </p:spTree>
@@ -6503,6 +6564,38 @@
             <a:endParaRPr lang="es-ES" sz="2800" b="0" strike="noStrike" spc="-1">
               <a:latin typeface="Arial"/>
             </a:endParaRPr>
+          </a:p>
+        </p:txBody>
+      </p:sp>
+      <p:sp>
+        <p:nvSpPr>
+          <p:cNvPr id="2" name="CuadroTexto 1"/>
+          <p:cNvSpPr txBox="1"/>
+          <p:nvPr/>
+        </p:nvSpPr>
+        <p:spPr>
+          <a:xfrm>
+            <a:off x="3758040" y="4815068"/>
+            <a:ext cx="2095510" cy="369332"/>
+          </a:xfrm>
+          <a:prstGeom prst="rect">
+            <a:avLst/>
+          </a:prstGeom>
+          <a:noFill/>
+        </p:spPr>
+        <p:txBody>
+          <a:bodyPr wrap="none" rtlCol="0">
+            <a:spAutoFit/>
+          </a:bodyPr>
+          <a:lstStyle/>
+          <a:p>
+            <a:r>
+              <a:rPr lang="es-ES" dirty="0" smtClean="0">
+                <a:hlinkClick r:id="rId4" action="ppaction://hlinkfile"/>
+              </a:rPr>
+              <a:t>Aplicación AGNEX</a:t>
+            </a:r>
+            <a:endParaRPr lang="es-ES" dirty="0"/>
           </a:p>
         </p:txBody>
       </p:sp>

</xml_diff>

<commit_message>
Presentación Sprint #1 formato PowerPoint 28/05/2019
</commit_message>
<xml_diff>
--- a/PrimerSprint/Presentación_PrimerSprint_AGNEX.pptx
+++ b/PrimerSprint/Presentación_PrimerSprint_AGNEX.pptx
@@ -11,12 +11,12 @@
     <p:sldId id="256" r:id="rId2"/>
     <p:sldId id="257" r:id="rId3"/>
     <p:sldId id="258" r:id="rId4"/>
-    <p:sldId id="259" r:id="rId5"/>
-    <p:sldId id="260" r:id="rId6"/>
-    <p:sldId id="261" r:id="rId7"/>
-    <p:sldId id="262" r:id="rId8"/>
-    <p:sldId id="263" r:id="rId9"/>
-    <p:sldId id="264" r:id="rId10"/>
+    <p:sldId id="264" r:id="rId5"/>
+    <p:sldId id="259" r:id="rId6"/>
+    <p:sldId id="260" r:id="rId7"/>
+    <p:sldId id="261" r:id="rId8"/>
+    <p:sldId id="262" r:id="rId9"/>
+    <p:sldId id="263" r:id="rId10"/>
     <p:sldId id="265" r:id="rId11"/>
     <p:sldId id="266" r:id="rId12"/>
     <p:sldId id="267" r:id="rId13"/>
@@ -862,7 +862,7 @@
       </p:grpSpPr>
       <p:sp>
         <p:nvSpPr>
-          <p:cNvPr id="111" name="PlaceHolder 1"/>
+          <p:cNvPr id="126" name="PlaceHolder 1"/>
           <p:cNvSpPr>
             <a:spLocks noGrp="1" noRot="1" noChangeAspect="1"/>
           </p:cNvSpPr>
@@ -882,7 +882,7 @@
       </p:sp>
       <p:sp>
         <p:nvSpPr>
-          <p:cNvPr id="112" name="PlaceHolder 2"/>
+          <p:cNvPr id="127" name="PlaceHolder 2"/>
           <p:cNvSpPr>
             <a:spLocks noGrp="1"/>
           </p:cNvSpPr>
@@ -913,7 +913,7 @@
       </p:sp>
       <p:sp>
         <p:nvSpPr>
-          <p:cNvPr id="113" name="TextShape 3"/>
+          <p:cNvPr id="128" name="TextShape 3"/>
           <p:cNvSpPr txBox="1"/>
           <p:nvPr/>
         </p:nvSpPr>
@@ -941,7 +941,7 @@
                 <a:spcPct val="100000"/>
               </a:lnSpc>
             </a:pPr>
-            <a:fld id="{C67F9B4B-CC0E-450B-A46D-9C6685E5D316}" type="slidenum">
+            <a:fld id="{0C95467B-EB93-40F5-92E2-CA3BF6A31241}" type="slidenum">
               <a:rPr lang="es-ES" sz="1200" b="0" strike="noStrike" spc="-1">
                 <a:solidFill>
                   <a:srgbClr val="000000"/>
@@ -960,7 +960,7 @@
     </p:spTree>
     <p:extLst>
       <p:ext uri="{BB962C8B-B14F-4D97-AF65-F5344CB8AC3E}">
-        <p14:creationId xmlns:p14="http://schemas.microsoft.com/office/powerpoint/2010/main" val="3224686526"/>
+        <p14:creationId xmlns:p14="http://schemas.microsoft.com/office/powerpoint/2010/main" val="1447200360"/>
       </p:ext>
     </p:extLst>
   </p:cSld>
@@ -989,7 +989,7 @@
       </p:grpSpPr>
       <p:sp>
         <p:nvSpPr>
-          <p:cNvPr id="114" name="PlaceHolder 1"/>
+          <p:cNvPr id="111" name="PlaceHolder 1"/>
           <p:cNvSpPr>
             <a:spLocks noGrp="1" noRot="1" noChangeAspect="1"/>
           </p:cNvSpPr>
@@ -1009,7 +1009,7 @@
       </p:sp>
       <p:sp>
         <p:nvSpPr>
-          <p:cNvPr id="115" name="PlaceHolder 2"/>
+          <p:cNvPr id="112" name="PlaceHolder 2"/>
           <p:cNvSpPr>
             <a:spLocks noGrp="1"/>
           </p:cNvSpPr>
@@ -1040,7 +1040,7 @@
       </p:sp>
       <p:sp>
         <p:nvSpPr>
-          <p:cNvPr id="116" name="TextShape 3"/>
+          <p:cNvPr id="113" name="TextShape 3"/>
           <p:cNvSpPr txBox="1"/>
           <p:nvPr/>
         </p:nvSpPr>
@@ -1068,7 +1068,7 @@
                 <a:spcPct val="100000"/>
               </a:lnSpc>
             </a:pPr>
-            <a:fld id="{8F24EB30-6B2C-4704-A37B-3FC931D8E1BD}" type="slidenum">
+            <a:fld id="{C67F9B4B-CC0E-450B-A46D-9C6685E5D316}" type="slidenum">
               <a:rPr lang="es-ES" sz="1200" b="0" strike="noStrike" spc="-1">
                 <a:solidFill>
                   <a:srgbClr val="000000"/>
@@ -1087,7 +1087,7 @@
     </p:spTree>
     <p:extLst>
       <p:ext uri="{BB962C8B-B14F-4D97-AF65-F5344CB8AC3E}">
-        <p14:creationId xmlns:p14="http://schemas.microsoft.com/office/powerpoint/2010/main" val="3962637111"/>
+        <p14:creationId xmlns:p14="http://schemas.microsoft.com/office/powerpoint/2010/main" val="3224686526"/>
       </p:ext>
     </p:extLst>
   </p:cSld>
@@ -1116,7 +1116,7 @@
       </p:grpSpPr>
       <p:sp>
         <p:nvSpPr>
-          <p:cNvPr id="117" name="PlaceHolder 1"/>
+          <p:cNvPr id="114" name="PlaceHolder 1"/>
           <p:cNvSpPr>
             <a:spLocks noGrp="1" noRot="1" noChangeAspect="1"/>
           </p:cNvSpPr>
@@ -1136,7 +1136,7 @@
       </p:sp>
       <p:sp>
         <p:nvSpPr>
-          <p:cNvPr id="118" name="PlaceHolder 2"/>
+          <p:cNvPr id="115" name="PlaceHolder 2"/>
           <p:cNvSpPr>
             <a:spLocks noGrp="1"/>
           </p:cNvSpPr>
@@ -1167,7 +1167,7 @@
       </p:sp>
       <p:sp>
         <p:nvSpPr>
-          <p:cNvPr id="119" name="TextShape 3"/>
+          <p:cNvPr id="116" name="TextShape 3"/>
           <p:cNvSpPr txBox="1"/>
           <p:nvPr/>
         </p:nvSpPr>
@@ -1195,7 +1195,7 @@
                 <a:spcPct val="100000"/>
               </a:lnSpc>
             </a:pPr>
-            <a:fld id="{EE04D805-D575-4BA5-8D7C-0FF2B62BA07A}" type="slidenum">
+            <a:fld id="{8F24EB30-6B2C-4704-A37B-3FC931D8E1BD}" type="slidenum">
               <a:rPr lang="es-ES" sz="1200" b="0" strike="noStrike" spc="-1">
                 <a:solidFill>
                   <a:srgbClr val="000000"/>
@@ -1214,7 +1214,7 @@
     </p:spTree>
     <p:extLst>
       <p:ext uri="{BB962C8B-B14F-4D97-AF65-F5344CB8AC3E}">
-        <p14:creationId xmlns:p14="http://schemas.microsoft.com/office/powerpoint/2010/main" val="2310100210"/>
+        <p14:creationId xmlns:p14="http://schemas.microsoft.com/office/powerpoint/2010/main" val="3962637111"/>
       </p:ext>
     </p:extLst>
   </p:cSld>
@@ -1243,7 +1243,7 @@
       </p:grpSpPr>
       <p:sp>
         <p:nvSpPr>
-          <p:cNvPr id="120" name="PlaceHolder 1"/>
+          <p:cNvPr id="117" name="PlaceHolder 1"/>
           <p:cNvSpPr>
             <a:spLocks noGrp="1" noRot="1" noChangeAspect="1"/>
           </p:cNvSpPr>
@@ -1263,7 +1263,7 @@
       </p:sp>
       <p:sp>
         <p:nvSpPr>
-          <p:cNvPr id="121" name="PlaceHolder 2"/>
+          <p:cNvPr id="118" name="PlaceHolder 2"/>
           <p:cNvSpPr>
             <a:spLocks noGrp="1"/>
           </p:cNvSpPr>
@@ -1294,7 +1294,7 @@
       </p:sp>
       <p:sp>
         <p:nvSpPr>
-          <p:cNvPr id="122" name="TextShape 3"/>
+          <p:cNvPr id="119" name="TextShape 3"/>
           <p:cNvSpPr txBox="1"/>
           <p:nvPr/>
         </p:nvSpPr>
@@ -1322,7 +1322,7 @@
                 <a:spcPct val="100000"/>
               </a:lnSpc>
             </a:pPr>
-            <a:fld id="{9CAD0EDE-3563-455D-B657-59A913EF016B}" type="slidenum">
+            <a:fld id="{EE04D805-D575-4BA5-8D7C-0FF2B62BA07A}" type="slidenum">
               <a:rPr lang="es-ES" sz="1200" b="0" strike="noStrike" spc="-1">
                 <a:solidFill>
                   <a:srgbClr val="000000"/>
@@ -1341,7 +1341,7 @@
     </p:spTree>
     <p:extLst>
       <p:ext uri="{BB962C8B-B14F-4D97-AF65-F5344CB8AC3E}">
-        <p14:creationId xmlns:p14="http://schemas.microsoft.com/office/powerpoint/2010/main" val="435704541"/>
+        <p14:creationId xmlns:p14="http://schemas.microsoft.com/office/powerpoint/2010/main" val="2310100210"/>
       </p:ext>
     </p:extLst>
   </p:cSld>
@@ -1370,7 +1370,7 @@
       </p:grpSpPr>
       <p:sp>
         <p:nvSpPr>
-          <p:cNvPr id="123" name="PlaceHolder 1"/>
+          <p:cNvPr id="120" name="PlaceHolder 1"/>
           <p:cNvSpPr>
             <a:spLocks noGrp="1" noRot="1" noChangeAspect="1"/>
           </p:cNvSpPr>
@@ -1390,7 +1390,7 @@
       </p:sp>
       <p:sp>
         <p:nvSpPr>
-          <p:cNvPr id="124" name="PlaceHolder 2"/>
+          <p:cNvPr id="121" name="PlaceHolder 2"/>
           <p:cNvSpPr>
             <a:spLocks noGrp="1"/>
           </p:cNvSpPr>
@@ -1421,7 +1421,7 @@
       </p:sp>
       <p:sp>
         <p:nvSpPr>
-          <p:cNvPr id="125" name="TextShape 3"/>
+          <p:cNvPr id="122" name="TextShape 3"/>
           <p:cNvSpPr txBox="1"/>
           <p:nvPr/>
         </p:nvSpPr>
@@ -1449,7 +1449,7 @@
                 <a:spcPct val="100000"/>
               </a:lnSpc>
             </a:pPr>
-            <a:fld id="{4197BDD6-ED08-4091-B598-90AC00CBED65}" type="slidenum">
+            <a:fld id="{9CAD0EDE-3563-455D-B657-59A913EF016B}" type="slidenum">
               <a:rPr lang="es-ES" sz="1200" b="0" strike="noStrike" spc="-1">
                 <a:solidFill>
                   <a:srgbClr val="000000"/>
@@ -1468,7 +1468,7 @@
     </p:spTree>
     <p:extLst>
       <p:ext uri="{BB962C8B-B14F-4D97-AF65-F5344CB8AC3E}">
-        <p14:creationId xmlns:p14="http://schemas.microsoft.com/office/powerpoint/2010/main" val="3898891920"/>
+        <p14:creationId xmlns:p14="http://schemas.microsoft.com/office/powerpoint/2010/main" val="435704541"/>
       </p:ext>
     </p:extLst>
   </p:cSld>
@@ -1497,7 +1497,7 @@
       </p:grpSpPr>
       <p:sp>
         <p:nvSpPr>
-          <p:cNvPr id="126" name="PlaceHolder 1"/>
+          <p:cNvPr id="123" name="PlaceHolder 1"/>
           <p:cNvSpPr>
             <a:spLocks noGrp="1" noRot="1" noChangeAspect="1"/>
           </p:cNvSpPr>
@@ -1517,7 +1517,7 @@
       </p:sp>
       <p:sp>
         <p:nvSpPr>
-          <p:cNvPr id="127" name="PlaceHolder 2"/>
+          <p:cNvPr id="124" name="PlaceHolder 2"/>
           <p:cNvSpPr>
             <a:spLocks noGrp="1"/>
           </p:cNvSpPr>
@@ -1548,7 +1548,7 @@
       </p:sp>
       <p:sp>
         <p:nvSpPr>
-          <p:cNvPr id="128" name="TextShape 3"/>
+          <p:cNvPr id="125" name="TextShape 3"/>
           <p:cNvSpPr txBox="1"/>
           <p:nvPr/>
         </p:nvSpPr>
@@ -1576,7 +1576,7 @@
                 <a:spcPct val="100000"/>
               </a:lnSpc>
             </a:pPr>
-            <a:fld id="{0C95467B-EB93-40F5-92E2-CA3BF6A31241}" type="slidenum">
+            <a:fld id="{4197BDD6-ED08-4091-B598-90AC00CBED65}" type="slidenum">
               <a:rPr lang="es-ES" sz="1200" b="0" strike="noStrike" spc="-1">
                 <a:solidFill>
                   <a:srgbClr val="000000"/>
@@ -1595,7 +1595,7 @@
     </p:spTree>
     <p:extLst>
       <p:ext uri="{BB962C8B-B14F-4D97-AF65-F5344CB8AC3E}">
-        <p14:creationId xmlns:p14="http://schemas.microsoft.com/office/powerpoint/2010/main" val="1447200360"/>
+        <p14:creationId xmlns:p14="http://schemas.microsoft.com/office/powerpoint/2010/main" val="3898891920"/>
       </p:ext>
     </p:extLst>
   </p:cSld>
@@ -5999,14 +5999,38 @@
               <a:buChar char=""/>
             </a:pPr>
             <a:r>
-              <a:rPr lang="es-ES" sz="2000" b="0" strike="noStrike" spc="-1">
+              <a:rPr lang="es-ES" sz="2000" b="0" strike="noStrike" spc="-1" dirty="0">
                 <a:solidFill>
                   <a:srgbClr val="000000"/>
                 </a:solidFill>
                 <a:latin typeface="Arial"/>
               </a:rPr>
-              <a:t>Sprint backlog. </a:t>
+              <a:t>Sprint </a:t>
             </a:r>
+            <a:r>
+              <a:rPr lang="es-ES" sz="2000" b="0" strike="noStrike" spc="-1" dirty="0" err="1">
+                <a:solidFill>
+                  <a:srgbClr val="000000"/>
+                </a:solidFill>
+                <a:latin typeface="Arial"/>
+              </a:rPr>
+              <a:t>backlog</a:t>
+            </a:r>
+            <a:r>
+              <a:rPr lang="es-ES" sz="2000" b="0" strike="noStrike" spc="-1" dirty="0">
+                <a:solidFill>
+                  <a:srgbClr val="000000"/>
+                </a:solidFill>
+                <a:latin typeface="Arial"/>
+              </a:rPr>
+              <a:t>. </a:t>
+            </a:r>
+            <a:endParaRPr lang="es-ES" sz="2000" b="0" strike="noStrike" spc="-1" dirty="0" smtClean="0">
+              <a:solidFill>
+                <a:srgbClr val="000000"/>
+              </a:solidFill>
+              <a:latin typeface="Arial"/>
+            </a:endParaRPr>
           </a:p>
           <a:p>
             <a:pPr marL="441360" indent="-285480">
@@ -6023,14 +6047,43 @@
               <a:buChar char=""/>
             </a:pPr>
             <a:r>
-              <a:rPr lang="es-ES" sz="2000" b="0" strike="noStrike" spc="-1">
+              <a:rPr lang="es-ES" sz="2000" spc="-1" dirty="0">
                 <a:solidFill>
                   <a:srgbClr val="000000"/>
                 </a:solidFill>
-                <a:latin typeface="Arial"/>
               </a:rPr>
-              <a:t>Interfaz de Usuario + Visor Gis insertado.</a:t>
+              <a:t>Diagrama </a:t>
             </a:r>
+            <a:r>
+              <a:rPr lang="es-ES" sz="2000" spc="-1" dirty="0" err="1">
+                <a:solidFill>
+                  <a:srgbClr val="000000"/>
+                </a:solidFill>
+              </a:rPr>
+              <a:t>Burn-down</a:t>
+            </a:r>
+            <a:r>
+              <a:rPr lang="es-ES" sz="2000" spc="-1" dirty="0">
+                <a:solidFill>
+                  <a:srgbClr val="000000"/>
+                </a:solidFill>
+              </a:rPr>
+              <a:t> (Curva de estrés</a:t>
+            </a:r>
+            <a:r>
+              <a:rPr lang="es-ES" sz="2000" spc="-1" dirty="0" smtClean="0">
+                <a:solidFill>
+                  <a:srgbClr val="000000"/>
+                </a:solidFill>
+              </a:rPr>
+              <a:t>).</a:t>
+            </a:r>
+            <a:endParaRPr lang="es-ES" sz="2000" b="0" strike="noStrike" spc="-1" dirty="0">
+              <a:solidFill>
+                <a:srgbClr val="000000"/>
+              </a:solidFill>
+              <a:latin typeface="Arial"/>
+            </a:endParaRPr>
           </a:p>
           <a:p>
             <a:pPr marL="441360" indent="-285480">
@@ -6047,13 +6100,13 @@
               <a:buChar char=""/>
             </a:pPr>
             <a:r>
-              <a:rPr lang="es-ES" sz="2000" b="0" strike="noStrike" spc="-1">
+              <a:rPr lang="es-ES" sz="2000" b="0" strike="noStrike" spc="-1" dirty="0">
                 <a:solidFill>
                   <a:srgbClr val="000000"/>
                 </a:solidFill>
                 <a:latin typeface="Arial"/>
               </a:rPr>
-              <a:t>Diagrama de clases de diseño del sprint</a:t>
+              <a:t>Interfaz de Usuario + Visor Gis insertado.</a:t>
             </a:r>
           </a:p>
           <a:p>
@@ -6071,13 +6124,13 @@
               <a:buChar char=""/>
             </a:pPr>
             <a:r>
-              <a:rPr lang="es-ES" sz="2000" b="0" strike="noStrike" spc="-1">
+              <a:rPr lang="es-ES" sz="2000" b="0" strike="noStrike" spc="-1" dirty="0">
                 <a:solidFill>
                   <a:srgbClr val="000000"/>
                 </a:solidFill>
                 <a:latin typeface="Arial"/>
               </a:rPr>
-              <a:t>Diagrama Burn-down (Curva de estrés).</a:t>
+              <a:t>Diagrama de clases de diseño del sprint</a:t>
             </a:r>
           </a:p>
           <a:p>
@@ -6095,13 +6148,22 @@
               <a:buChar char=""/>
             </a:pPr>
             <a:r>
-              <a:rPr lang="es-ES" sz="2000" b="0" strike="noStrike" spc="-1">
+              <a:rPr lang="es-ES" sz="2000" b="0" strike="noStrike" spc="-1" dirty="0" smtClean="0">
                 <a:solidFill>
                   <a:srgbClr val="000000"/>
                 </a:solidFill>
                 <a:latin typeface="Arial"/>
               </a:rPr>
-              <a:t>Diagramas de Secuencia de 2 CU.</a:t>
+              <a:t>Diagramas </a:t>
+            </a:r>
+            <a:r>
+              <a:rPr lang="es-ES" sz="2000" b="0" strike="noStrike" spc="-1" dirty="0">
+                <a:solidFill>
+                  <a:srgbClr val="000000"/>
+                </a:solidFill>
+                <a:latin typeface="Arial"/>
+              </a:rPr>
+              <a:t>de Secuencia de 2 CU.</a:t>
             </a:r>
           </a:p>
           <a:p>
@@ -6113,7 +6175,7 @@
                 <a:spcPts val="1001"/>
               </a:spcBef>
             </a:pPr>
-            <a:endParaRPr lang="es-ES" sz="2000" b="0" strike="noStrike" spc="-1">
+            <a:endParaRPr lang="es-ES" sz="2000" b="0" strike="noStrike" spc="-1" dirty="0">
               <a:solidFill>
                 <a:srgbClr val="000000"/>
               </a:solidFill>
@@ -6129,7 +6191,7 @@
                 <a:spcPts val="1001"/>
               </a:spcBef>
             </a:pPr>
-            <a:endParaRPr lang="es-ES" sz="2000" b="0" strike="noStrike" spc="-1">
+            <a:endParaRPr lang="es-ES" sz="2000" b="0" strike="noStrike" spc="-1" dirty="0">
               <a:solidFill>
                 <a:srgbClr val="000000"/>
               </a:solidFill>
@@ -6145,7 +6207,7 @@
                 <a:spcPts val="1001"/>
               </a:spcBef>
             </a:pPr>
-            <a:endParaRPr lang="es-ES" sz="2000" b="0" strike="noStrike" spc="-1">
+            <a:endParaRPr lang="es-ES" sz="2000" b="0" strike="noStrike" spc="-1" dirty="0">
               <a:solidFill>
                 <a:srgbClr val="000000"/>
               </a:solidFill>
@@ -6368,7 +6430,7 @@
       </p:pic>
       <p:pic>
         <p:nvPicPr>
-          <p:cNvPr id="2" name="Imagen 1"/>
+          <p:cNvPr id="3" name="Imagen 2"/>
           <p:cNvPicPr>
             <a:picLocks noChangeAspect="1"/>
           </p:cNvPicPr>
@@ -6382,8 +6444,8 @@
         </p:blipFill>
         <p:spPr>
           <a:xfrm>
-            <a:off x="237240" y="1557337"/>
-            <a:ext cx="8825737" cy="5169172"/>
+            <a:off x="237239" y="1533349"/>
+            <a:ext cx="8766801" cy="5013350"/>
           </a:xfrm>
           <a:prstGeom prst="rect">
             <a:avLst/>
@@ -6444,7 +6506,7 @@
       </p:grpSpPr>
       <p:sp>
         <p:nvSpPr>
-          <p:cNvPr id="73" name="CustomShape 1"/>
+          <p:cNvPr id="88" name="CustomShape 1"/>
           <p:cNvSpPr/>
           <p:nvPr/>
         </p:nvSpPr>
@@ -6491,7 +6553,7 @@
                 </a:solidFill>
                 <a:latin typeface="Arial"/>
               </a:rPr>
-              <a:t>Sprint #1. </a:t>
+              <a:t>Sprint #1.</a:t>
             </a:r>
             <a:endParaRPr lang="es-ES" sz="2800" b="0" strike="noStrike" spc="-1">
               <a:latin typeface="Arial"/>
@@ -6499,32 +6561,9 @@
           </a:p>
         </p:txBody>
       </p:sp>
-      <p:pic>
-        <p:nvPicPr>
-          <p:cNvPr id="74" name="Imagen 73"/>
-          <p:cNvPicPr/>
-          <p:nvPr/>
-        </p:nvPicPr>
-        <p:blipFill>
-          <a:blip r:embed="rId3"/>
-          <a:stretch/>
-        </p:blipFill>
-        <p:spPr>
-          <a:xfrm>
-            <a:off x="3758040" y="2170800"/>
-            <a:ext cx="2361960" cy="1933200"/>
-          </a:xfrm>
-          <a:prstGeom prst="rect">
-            <a:avLst/>
-          </a:prstGeom>
-          <a:ln>
-            <a:noFill/>
-          </a:ln>
-        </p:spPr>
-      </p:pic>
-      <p:sp>
-        <p:nvSpPr>
-          <p:cNvPr id="75" name="TextShape 2"/>
+      <p:sp>
+        <p:nvSpPr>
+          <p:cNvPr id="89" name="TextShape 2"/>
           <p:cNvSpPr txBox="1"/>
           <p:nvPr/>
         </p:nvSpPr>
@@ -6559,7 +6598,7 @@
                 </a:solidFill>
                 <a:latin typeface="Arial"/>
               </a:rPr>
-              <a:t>Interfaz de Usuario + Visor GIS insertado. </a:t>
+              <a:t>Diagrama Burn-down (Curva de estrés). </a:t>
             </a:r>
             <a:endParaRPr lang="es-ES" sz="2800" b="0" strike="noStrike" spc="-1">
               <a:latin typeface="Arial"/>
@@ -6567,38 +6606,29 @@
           </a:p>
         </p:txBody>
       </p:sp>
-      <p:sp>
-        <p:nvSpPr>
-          <p:cNvPr id="2" name="CuadroTexto 1"/>
-          <p:cNvSpPr txBox="1"/>
+      <p:pic>
+        <p:nvPicPr>
+          <p:cNvPr id="90" name="Imagen 89"/>
+          <p:cNvPicPr/>
           <p:nvPr/>
-        </p:nvSpPr>
-        <p:spPr>
-          <a:xfrm>
-            <a:off x="3758040" y="4815068"/>
-            <a:ext cx="2095510" cy="369332"/>
-          </a:xfrm>
-          <a:prstGeom prst="rect">
-            <a:avLst/>
-          </a:prstGeom>
-          <a:noFill/>
-        </p:spPr>
-        <p:txBody>
-          <a:bodyPr wrap="none" rtlCol="0">
-            <a:spAutoFit/>
-          </a:bodyPr>
-          <a:lstStyle/>
-          <a:p>
-            <a:r>
-              <a:rPr lang="es-ES" dirty="0" smtClean="0">
-                <a:hlinkClick r:id="rId4" action="ppaction://hlinkfile"/>
-              </a:rPr>
-              <a:t>Aplicación AGNEX</a:t>
-            </a:r>
-            <a:endParaRPr lang="es-ES" dirty="0"/>
-          </a:p>
-        </p:txBody>
-      </p:sp>
+        </p:nvPicPr>
+        <p:blipFill>
+          <a:blip r:embed="rId3"/>
+          <a:stretch/>
+        </p:blipFill>
+        <p:spPr>
+          <a:xfrm>
+            <a:off x="360000" y="1573920"/>
+            <a:ext cx="8454600" cy="4042080"/>
+          </a:xfrm>
+          <a:prstGeom prst="rect">
+            <a:avLst/>
+          </a:prstGeom>
+          <a:ln>
+            <a:noFill/>
+          </a:ln>
+        </p:spPr>
+      </p:pic>
     </p:spTree>
   </p:cSld>
   <p:clrMapOvr>
@@ -6653,7 +6683,7 @@
       </p:grpSpPr>
       <p:sp>
         <p:nvSpPr>
-          <p:cNvPr id="76" name="CustomShape 1"/>
+          <p:cNvPr id="73" name="CustomShape 1"/>
           <p:cNvSpPr/>
           <p:nvPr/>
         </p:nvSpPr>
@@ -6700,7 +6730,7 @@
                 </a:solidFill>
                 <a:latin typeface="Arial"/>
               </a:rPr>
-              <a:t>Sprint #1.</a:t>
+              <a:t>Sprint #1. </a:t>
             </a:r>
             <a:endParaRPr lang="es-ES" sz="2800" b="0" strike="noStrike" spc="-1">
               <a:latin typeface="Arial"/>
@@ -6708,9 +6738,32 @@
           </a:p>
         </p:txBody>
       </p:sp>
-      <p:sp>
-        <p:nvSpPr>
-          <p:cNvPr id="77" name="TextShape 2"/>
+      <p:pic>
+        <p:nvPicPr>
+          <p:cNvPr id="74" name="Imagen 73"/>
+          <p:cNvPicPr/>
+          <p:nvPr/>
+        </p:nvPicPr>
+        <p:blipFill>
+          <a:blip r:embed="rId3"/>
+          <a:stretch/>
+        </p:blipFill>
+        <p:spPr>
+          <a:xfrm>
+            <a:off x="3758040" y="2170800"/>
+            <a:ext cx="2361960" cy="1933200"/>
+          </a:xfrm>
+          <a:prstGeom prst="rect">
+            <a:avLst/>
+          </a:prstGeom>
+          <a:ln>
+            <a:noFill/>
+          </a:ln>
+        </p:spPr>
+      </p:pic>
+      <p:sp>
+        <p:nvSpPr>
+          <p:cNvPr id="75" name="TextShape 2"/>
           <p:cNvSpPr txBox="1"/>
           <p:nvPr/>
         </p:nvSpPr>
@@ -6745,7 +6798,7 @@
                 </a:solidFill>
                 <a:latin typeface="Arial"/>
               </a:rPr>
-              <a:t>Diagrama de clases de diseño del sprint. </a:t>
+              <a:t>Interfaz de Usuario + Visor GIS insertado. </a:t>
             </a:r>
             <a:endParaRPr lang="es-ES" sz="2800" b="0" strike="noStrike" spc="-1">
               <a:latin typeface="Arial"/>
@@ -6753,29 +6806,38 @@
           </a:p>
         </p:txBody>
       </p:sp>
-      <p:pic>
-        <p:nvPicPr>
-          <p:cNvPr id="78" name="Imagen 77"/>
-          <p:cNvPicPr/>
+      <p:sp>
+        <p:nvSpPr>
+          <p:cNvPr id="2" name="CuadroTexto 1"/>
+          <p:cNvSpPr txBox="1"/>
           <p:nvPr/>
-        </p:nvPicPr>
-        <p:blipFill>
-          <a:blip r:embed="rId3"/>
-          <a:stretch/>
-        </p:blipFill>
-        <p:spPr>
-          <a:xfrm>
-            <a:off x="1992240" y="2122560"/>
-            <a:ext cx="5229000" cy="2266560"/>
-          </a:xfrm>
-          <a:prstGeom prst="rect">
-            <a:avLst/>
-          </a:prstGeom>
-          <a:ln>
-            <a:noFill/>
-          </a:ln>
-        </p:spPr>
-      </p:pic>
+        </p:nvSpPr>
+        <p:spPr>
+          <a:xfrm>
+            <a:off x="3758040" y="4815068"/>
+            <a:ext cx="2095510" cy="369332"/>
+          </a:xfrm>
+          <a:prstGeom prst="rect">
+            <a:avLst/>
+          </a:prstGeom>
+          <a:noFill/>
+        </p:spPr>
+        <p:txBody>
+          <a:bodyPr wrap="none" rtlCol="0">
+            <a:spAutoFit/>
+          </a:bodyPr>
+          <a:lstStyle/>
+          <a:p>
+            <a:r>
+              <a:rPr lang="es-ES" dirty="0" smtClean="0">
+                <a:hlinkClick r:id="rId4" action="ppaction://hlinkfile"/>
+              </a:rPr>
+              <a:t>Aplicación AGNEX</a:t>
+            </a:r>
+            <a:endParaRPr lang="es-ES" dirty="0"/>
+          </a:p>
+        </p:txBody>
+      </p:sp>
     </p:spTree>
   </p:cSld>
   <p:clrMapOvr>
@@ -6830,7 +6892,7 @@
       </p:grpSpPr>
       <p:sp>
         <p:nvSpPr>
-          <p:cNvPr id="79" name="CustomShape 1"/>
+          <p:cNvPr id="76" name="CustomShape 1"/>
           <p:cNvSpPr/>
           <p:nvPr/>
         </p:nvSpPr>
@@ -6887,7 +6949,7 @@
       </p:sp>
       <p:sp>
         <p:nvSpPr>
-          <p:cNvPr id="80" name="TextShape 2"/>
+          <p:cNvPr id="77" name="TextShape 2"/>
           <p:cNvSpPr txBox="1"/>
           <p:nvPr/>
         </p:nvSpPr>
@@ -6932,7 +6994,7 @@
       </p:sp>
       <p:pic>
         <p:nvPicPr>
-          <p:cNvPr id="81" name="Imagen 80"/>
+          <p:cNvPr id="78" name="Imagen 77"/>
           <p:cNvPicPr/>
           <p:nvPr/>
         </p:nvPicPr>
@@ -6942,8 +7004,8 @@
         </p:blipFill>
         <p:spPr>
           <a:xfrm>
-            <a:off x="1728000" y="1180800"/>
-            <a:ext cx="5472000" cy="5320080"/>
+            <a:off x="1992240" y="2122560"/>
+            <a:ext cx="5229000" cy="2266560"/>
           </a:xfrm>
           <a:prstGeom prst="rect">
             <a:avLst/>
@@ -7007,7 +7069,7 @@
       </p:grpSpPr>
       <p:sp>
         <p:nvSpPr>
-          <p:cNvPr id="82" name="CustomShape 1"/>
+          <p:cNvPr id="79" name="CustomShape 1"/>
           <p:cNvSpPr/>
           <p:nvPr/>
         </p:nvSpPr>
@@ -7064,7 +7126,7 @@
       </p:sp>
       <p:sp>
         <p:nvSpPr>
-          <p:cNvPr id="83" name="TextShape 2"/>
+          <p:cNvPr id="80" name="TextShape 2"/>
           <p:cNvSpPr txBox="1"/>
           <p:nvPr/>
         </p:nvSpPr>
@@ -7109,7 +7171,7 @@
       </p:sp>
       <p:pic>
         <p:nvPicPr>
-          <p:cNvPr id="84" name="Imagen 83"/>
+          <p:cNvPr id="81" name="Imagen 80"/>
           <p:cNvPicPr/>
           <p:nvPr/>
         </p:nvPicPr>
@@ -7119,8 +7181,8 @@
         </p:blipFill>
         <p:spPr>
           <a:xfrm>
-            <a:off x="1728000" y="1143000"/>
-            <a:ext cx="6768000" cy="5352120"/>
+            <a:off x="1728000" y="1180800"/>
+            <a:ext cx="5472000" cy="5320080"/>
           </a:xfrm>
           <a:prstGeom prst="rect">
             <a:avLst/>
@@ -7184,7 +7246,7 @@
       </p:grpSpPr>
       <p:sp>
         <p:nvSpPr>
-          <p:cNvPr id="85" name="CustomShape 1"/>
+          <p:cNvPr id="82" name="CustomShape 1"/>
           <p:cNvSpPr/>
           <p:nvPr/>
         </p:nvSpPr>
@@ -7241,7 +7303,7 @@
       </p:sp>
       <p:sp>
         <p:nvSpPr>
-          <p:cNvPr id="86" name="TextShape 2"/>
+          <p:cNvPr id="83" name="TextShape 2"/>
           <p:cNvSpPr txBox="1"/>
           <p:nvPr/>
         </p:nvSpPr>
@@ -7286,7 +7348,7 @@
       </p:sp>
       <p:pic>
         <p:nvPicPr>
-          <p:cNvPr id="87" name="Imagen 86"/>
+          <p:cNvPr id="84" name="Imagen 83"/>
           <p:cNvPicPr/>
           <p:nvPr/>
         </p:nvPicPr>
@@ -7296,8 +7358,8 @@
         </p:blipFill>
         <p:spPr>
           <a:xfrm>
-            <a:off x="1978200" y="1396800"/>
-            <a:ext cx="5257440" cy="4219200"/>
+            <a:off x="1728000" y="1143000"/>
+            <a:ext cx="6768000" cy="5352120"/>
           </a:xfrm>
           <a:prstGeom prst="rect">
             <a:avLst/>
@@ -7361,7 +7423,7 @@
       </p:grpSpPr>
       <p:sp>
         <p:nvSpPr>
-          <p:cNvPr id="88" name="CustomShape 1"/>
+          <p:cNvPr id="85" name="CustomShape 1"/>
           <p:cNvSpPr/>
           <p:nvPr/>
         </p:nvSpPr>
@@ -7418,7 +7480,7 @@
       </p:sp>
       <p:sp>
         <p:nvSpPr>
-          <p:cNvPr id="89" name="TextShape 2"/>
+          <p:cNvPr id="86" name="TextShape 2"/>
           <p:cNvSpPr txBox="1"/>
           <p:nvPr/>
         </p:nvSpPr>
@@ -7453,7 +7515,7 @@
                 </a:solidFill>
                 <a:latin typeface="Arial"/>
               </a:rPr>
-              <a:t>Diagrama Burn-down (Curva de estrés). </a:t>
+              <a:t>Diagrama de clases de diseño del sprint. </a:t>
             </a:r>
             <a:endParaRPr lang="es-ES" sz="2800" b="0" strike="noStrike" spc="-1">
               <a:latin typeface="Arial"/>
@@ -7463,7 +7525,7 @@
       </p:sp>
       <p:pic>
         <p:nvPicPr>
-          <p:cNvPr id="90" name="Imagen 89"/>
+          <p:cNvPr id="87" name="Imagen 86"/>
           <p:cNvPicPr/>
           <p:nvPr/>
         </p:nvPicPr>
@@ -7473,8 +7535,8 @@
         </p:blipFill>
         <p:spPr>
           <a:xfrm>
-            <a:off x="360000" y="1573920"/>
-            <a:ext cx="8454600" cy="4042080"/>
+            <a:off x="1978200" y="1396800"/>
+            <a:ext cx="5257440" cy="4219200"/>
           </a:xfrm>
           <a:prstGeom prst="rect">
             <a:avLst/>

</xml_diff>

<commit_message>
Presentación Sprint # 1 PowerPoint 28/05/2019
</commit_message>
<xml_diff>
--- a/PrimerSprint/Presentación_PrimerSprint_AGNEX.pptx
+++ b/PrimerSprint/Presentación_PrimerSprint_AGNEX.pptx
@@ -5,21 +5,22 @@
     <p:sldMasterId id="2147483648" r:id="rId1"/>
   </p:sldMasterIdLst>
   <p:notesMasterIdLst>
-    <p:notesMasterId r:id="rId14"/>
+    <p:notesMasterId r:id="rId15"/>
   </p:notesMasterIdLst>
   <p:sldIdLst>
     <p:sldId id="256" r:id="rId2"/>
     <p:sldId id="257" r:id="rId3"/>
     <p:sldId id="258" r:id="rId4"/>
-    <p:sldId id="264" r:id="rId5"/>
-    <p:sldId id="259" r:id="rId6"/>
-    <p:sldId id="260" r:id="rId7"/>
-    <p:sldId id="261" r:id="rId8"/>
-    <p:sldId id="262" r:id="rId9"/>
-    <p:sldId id="263" r:id="rId10"/>
-    <p:sldId id="265" r:id="rId11"/>
-    <p:sldId id="266" r:id="rId12"/>
-    <p:sldId id="267" r:id="rId13"/>
+    <p:sldId id="268" r:id="rId5"/>
+    <p:sldId id="264" r:id="rId6"/>
+    <p:sldId id="259" r:id="rId7"/>
+    <p:sldId id="260" r:id="rId8"/>
+    <p:sldId id="261" r:id="rId9"/>
+    <p:sldId id="262" r:id="rId10"/>
+    <p:sldId id="263" r:id="rId11"/>
+    <p:sldId id="265" r:id="rId12"/>
+    <p:sldId id="266" r:id="rId13"/>
+    <p:sldId id="267" r:id="rId14"/>
   </p:sldIdLst>
   <p:sldSz cx="9144000" cy="6858000" type="screen4x3"/>
   <p:notesSz cx="6797675" cy="9926638"/>
@@ -608,6 +609,133 @@
       </p:grpSpPr>
       <p:sp>
         <p:nvSpPr>
+          <p:cNvPr id="129" name="PlaceHolder 1"/>
+          <p:cNvSpPr>
+            <a:spLocks noGrp="1" noRot="1" noChangeAspect="1"/>
+          </p:cNvSpPr>
+          <p:nvPr>
+            <p:ph type="sldImg"/>
+          </p:nvPr>
+        </p:nvSpPr>
+        <p:spPr>
+          <a:xfrm>
+            <a:off x="1165225" y="1241425"/>
+            <a:ext cx="4467225" cy="3349625"/>
+          </a:xfrm>
+          <a:prstGeom prst="rect">
+            <a:avLst/>
+          </a:prstGeom>
+        </p:spPr>
+      </p:sp>
+      <p:sp>
+        <p:nvSpPr>
+          <p:cNvPr id="130" name="PlaceHolder 2"/>
+          <p:cNvSpPr>
+            <a:spLocks noGrp="1"/>
+          </p:cNvSpPr>
+          <p:nvPr>
+            <p:ph type="body"/>
+          </p:nvPr>
+        </p:nvSpPr>
+        <p:spPr>
+          <a:xfrm>
+            <a:off x="679320" y="4776840"/>
+            <a:ext cx="5438520" cy="3908160"/>
+          </a:xfrm>
+          <a:prstGeom prst="rect">
+            <a:avLst/>
+          </a:prstGeom>
+        </p:spPr>
+        <p:txBody>
+          <a:bodyPr>
+            <a:noAutofit/>
+          </a:bodyPr>
+          <a:lstStyle/>
+          <a:p>
+            <a:endParaRPr lang="es-ES" sz="2000" b="0" strike="noStrike" spc="-1">
+              <a:latin typeface="Arial"/>
+            </a:endParaRPr>
+          </a:p>
+        </p:txBody>
+      </p:sp>
+      <p:sp>
+        <p:nvSpPr>
+          <p:cNvPr id="131" name="TextShape 3"/>
+          <p:cNvSpPr txBox="1"/>
+          <p:nvPr/>
+        </p:nvSpPr>
+        <p:spPr>
+          <a:xfrm>
+            <a:off x="3849840" y="9429840"/>
+            <a:ext cx="2945880" cy="496440"/>
+          </a:xfrm>
+          <a:prstGeom prst="rect">
+            <a:avLst/>
+          </a:prstGeom>
+          <a:noFill/>
+          <a:ln>
+            <a:noFill/>
+          </a:ln>
+        </p:spPr>
+        <p:txBody>
+          <a:bodyPr anchor="b">
+            <a:noAutofit/>
+          </a:bodyPr>
+          <a:lstStyle/>
+          <a:p>
+            <a:pPr algn="r">
+              <a:lnSpc>
+                <a:spcPct val="100000"/>
+              </a:lnSpc>
+            </a:pPr>
+            <a:fld id="{6A7A1432-E67B-4998-8031-FD8A7E1BD872}" type="slidenum">
+              <a:rPr lang="es-ES" sz="1200" b="0" strike="noStrike" spc="-1">
+                <a:solidFill>
+                  <a:srgbClr val="000000"/>
+                </a:solidFill>
+                <a:latin typeface="Arial"/>
+                <a:ea typeface="+mn-ea"/>
+              </a:rPr>
+              <a:t>11</a:t>
+            </a:fld>
+            <a:endParaRPr lang="es-ES" sz="1200" b="0" strike="noStrike" spc="-1">
+              <a:latin typeface="Times New Roman"/>
+            </a:endParaRPr>
+          </a:p>
+        </p:txBody>
+      </p:sp>
+    </p:spTree>
+    <p:extLst>
+      <p:ext uri="{BB962C8B-B14F-4D97-AF65-F5344CB8AC3E}">
+        <p14:creationId xmlns:p14="http://schemas.microsoft.com/office/powerpoint/2010/main" val="1817225050"/>
+      </p:ext>
+    </p:extLst>
+  </p:cSld>
+  <p:clrMapOvr>
+    <a:masterClrMapping/>
+  </p:clrMapOvr>
+</p:notes>
+</file>
+
+<file path=ppt/notesSlides/notesSlide11.xml><?xml version="1.0" encoding="utf-8"?>
+<p:notes xmlns:a="http://schemas.openxmlformats.org/drawingml/2006/main" xmlns:r="http://schemas.openxmlformats.org/officeDocument/2006/relationships" xmlns:p="http://schemas.openxmlformats.org/presentationml/2006/main">
+  <p:cSld>
+    <p:spTree>
+      <p:nvGrpSpPr>
+        <p:cNvPr id="1" name=""/>
+        <p:cNvGrpSpPr/>
+        <p:nvPr/>
+      </p:nvGrpSpPr>
+      <p:grpSpPr>
+        <a:xfrm>
+          <a:off x="0" y="0"/>
+          <a:ext cx="0" cy="0"/>
+          <a:chOff x="0" y="0"/>
+          <a:chExt cx="0" cy="0"/>
+        </a:xfrm>
+      </p:grpSpPr>
+      <p:sp>
+        <p:nvSpPr>
           <p:cNvPr id="132" name="PlaceHolder 1"/>
           <p:cNvSpPr>
             <a:spLocks noGrp="1" noRot="1" noChangeAspect="1"/>
@@ -695,7 +823,7 @@
                 <a:latin typeface="Arial"/>
                 <a:ea typeface="+mn-ea"/>
               </a:rPr>
-              <a:t>11</a:t>
+              <a:t>12</a:t>
             </a:fld>
             <a:endParaRPr lang="es-ES" sz="1200" b="0" strike="noStrike" spc="-1">
               <a:latin typeface="Times New Roman"/>
@@ -862,7 +990,7 @@
       </p:grpSpPr>
       <p:sp>
         <p:nvSpPr>
-          <p:cNvPr id="126" name="PlaceHolder 1"/>
+          <p:cNvPr id="108" name="PlaceHolder 1"/>
           <p:cNvSpPr>
             <a:spLocks noGrp="1" noRot="1" noChangeAspect="1"/>
           </p:cNvSpPr>
@@ -882,7 +1010,7 @@
       </p:sp>
       <p:sp>
         <p:nvSpPr>
-          <p:cNvPr id="127" name="PlaceHolder 2"/>
+          <p:cNvPr id="109" name="PlaceHolder 2"/>
           <p:cNvSpPr>
             <a:spLocks noGrp="1"/>
           </p:cNvSpPr>
@@ -913,7 +1041,7 @@
       </p:sp>
       <p:sp>
         <p:nvSpPr>
-          <p:cNvPr id="128" name="TextShape 3"/>
+          <p:cNvPr id="110" name="TextShape 3"/>
           <p:cNvSpPr txBox="1"/>
           <p:nvPr/>
         </p:nvSpPr>
@@ -941,7 +1069,7 @@
                 <a:spcPct val="100000"/>
               </a:lnSpc>
             </a:pPr>
-            <a:fld id="{0C95467B-EB93-40F5-92E2-CA3BF6A31241}" type="slidenum">
+            <a:fld id="{6D3D6C27-F590-48EA-9243-F456EC7F99BF}" type="slidenum">
               <a:rPr lang="es-ES" sz="1200" b="0" strike="noStrike" spc="-1">
                 <a:solidFill>
                   <a:srgbClr val="000000"/>
@@ -960,7 +1088,7 @@
     </p:spTree>
     <p:extLst>
       <p:ext uri="{BB962C8B-B14F-4D97-AF65-F5344CB8AC3E}">
-        <p14:creationId xmlns:p14="http://schemas.microsoft.com/office/powerpoint/2010/main" val="1447200360"/>
+        <p14:creationId xmlns:p14="http://schemas.microsoft.com/office/powerpoint/2010/main" val="370262700"/>
       </p:ext>
     </p:extLst>
   </p:cSld>
@@ -989,7 +1117,7 @@
       </p:grpSpPr>
       <p:sp>
         <p:nvSpPr>
-          <p:cNvPr id="111" name="PlaceHolder 1"/>
+          <p:cNvPr id="126" name="PlaceHolder 1"/>
           <p:cNvSpPr>
             <a:spLocks noGrp="1" noRot="1" noChangeAspect="1"/>
           </p:cNvSpPr>
@@ -1009,7 +1137,7 @@
       </p:sp>
       <p:sp>
         <p:nvSpPr>
-          <p:cNvPr id="112" name="PlaceHolder 2"/>
+          <p:cNvPr id="127" name="PlaceHolder 2"/>
           <p:cNvSpPr>
             <a:spLocks noGrp="1"/>
           </p:cNvSpPr>
@@ -1040,7 +1168,7 @@
       </p:sp>
       <p:sp>
         <p:nvSpPr>
-          <p:cNvPr id="113" name="TextShape 3"/>
+          <p:cNvPr id="128" name="TextShape 3"/>
           <p:cNvSpPr txBox="1"/>
           <p:nvPr/>
         </p:nvSpPr>
@@ -1068,7 +1196,7 @@
                 <a:spcPct val="100000"/>
               </a:lnSpc>
             </a:pPr>
-            <a:fld id="{C67F9B4B-CC0E-450B-A46D-9C6685E5D316}" type="slidenum">
+            <a:fld id="{0C95467B-EB93-40F5-92E2-CA3BF6A31241}" type="slidenum">
               <a:rPr lang="es-ES" sz="1200" b="0" strike="noStrike" spc="-1">
                 <a:solidFill>
                   <a:srgbClr val="000000"/>
@@ -1087,7 +1215,7 @@
     </p:spTree>
     <p:extLst>
       <p:ext uri="{BB962C8B-B14F-4D97-AF65-F5344CB8AC3E}">
-        <p14:creationId xmlns:p14="http://schemas.microsoft.com/office/powerpoint/2010/main" val="3224686526"/>
+        <p14:creationId xmlns:p14="http://schemas.microsoft.com/office/powerpoint/2010/main" val="1447200360"/>
       </p:ext>
     </p:extLst>
   </p:cSld>
@@ -1116,7 +1244,7 @@
       </p:grpSpPr>
       <p:sp>
         <p:nvSpPr>
-          <p:cNvPr id="114" name="PlaceHolder 1"/>
+          <p:cNvPr id="111" name="PlaceHolder 1"/>
           <p:cNvSpPr>
             <a:spLocks noGrp="1" noRot="1" noChangeAspect="1"/>
           </p:cNvSpPr>
@@ -1136,7 +1264,7 @@
       </p:sp>
       <p:sp>
         <p:nvSpPr>
-          <p:cNvPr id="115" name="PlaceHolder 2"/>
+          <p:cNvPr id="112" name="PlaceHolder 2"/>
           <p:cNvSpPr>
             <a:spLocks noGrp="1"/>
           </p:cNvSpPr>
@@ -1167,7 +1295,7 @@
       </p:sp>
       <p:sp>
         <p:nvSpPr>
-          <p:cNvPr id="116" name="TextShape 3"/>
+          <p:cNvPr id="113" name="TextShape 3"/>
           <p:cNvSpPr txBox="1"/>
           <p:nvPr/>
         </p:nvSpPr>
@@ -1195,7 +1323,7 @@
                 <a:spcPct val="100000"/>
               </a:lnSpc>
             </a:pPr>
-            <a:fld id="{8F24EB30-6B2C-4704-A37B-3FC931D8E1BD}" type="slidenum">
+            <a:fld id="{C67F9B4B-CC0E-450B-A46D-9C6685E5D316}" type="slidenum">
               <a:rPr lang="es-ES" sz="1200" b="0" strike="noStrike" spc="-1">
                 <a:solidFill>
                   <a:srgbClr val="000000"/>
@@ -1214,7 +1342,7 @@
     </p:spTree>
     <p:extLst>
       <p:ext uri="{BB962C8B-B14F-4D97-AF65-F5344CB8AC3E}">
-        <p14:creationId xmlns:p14="http://schemas.microsoft.com/office/powerpoint/2010/main" val="3962637111"/>
+        <p14:creationId xmlns:p14="http://schemas.microsoft.com/office/powerpoint/2010/main" val="3224686526"/>
       </p:ext>
     </p:extLst>
   </p:cSld>
@@ -1243,7 +1371,7 @@
       </p:grpSpPr>
       <p:sp>
         <p:nvSpPr>
-          <p:cNvPr id="117" name="PlaceHolder 1"/>
+          <p:cNvPr id="114" name="PlaceHolder 1"/>
           <p:cNvSpPr>
             <a:spLocks noGrp="1" noRot="1" noChangeAspect="1"/>
           </p:cNvSpPr>
@@ -1263,7 +1391,7 @@
       </p:sp>
       <p:sp>
         <p:nvSpPr>
-          <p:cNvPr id="118" name="PlaceHolder 2"/>
+          <p:cNvPr id="115" name="PlaceHolder 2"/>
           <p:cNvSpPr>
             <a:spLocks noGrp="1"/>
           </p:cNvSpPr>
@@ -1294,7 +1422,7 @@
       </p:sp>
       <p:sp>
         <p:nvSpPr>
-          <p:cNvPr id="119" name="TextShape 3"/>
+          <p:cNvPr id="116" name="TextShape 3"/>
           <p:cNvSpPr txBox="1"/>
           <p:nvPr/>
         </p:nvSpPr>
@@ -1322,7 +1450,7 @@
                 <a:spcPct val="100000"/>
               </a:lnSpc>
             </a:pPr>
-            <a:fld id="{EE04D805-D575-4BA5-8D7C-0FF2B62BA07A}" type="slidenum">
+            <a:fld id="{8F24EB30-6B2C-4704-A37B-3FC931D8E1BD}" type="slidenum">
               <a:rPr lang="es-ES" sz="1200" b="0" strike="noStrike" spc="-1">
                 <a:solidFill>
                   <a:srgbClr val="000000"/>
@@ -1341,7 +1469,7 @@
     </p:spTree>
     <p:extLst>
       <p:ext uri="{BB962C8B-B14F-4D97-AF65-F5344CB8AC3E}">
-        <p14:creationId xmlns:p14="http://schemas.microsoft.com/office/powerpoint/2010/main" val="2310100210"/>
+        <p14:creationId xmlns:p14="http://schemas.microsoft.com/office/powerpoint/2010/main" val="3962637111"/>
       </p:ext>
     </p:extLst>
   </p:cSld>
@@ -1370,7 +1498,7 @@
       </p:grpSpPr>
       <p:sp>
         <p:nvSpPr>
-          <p:cNvPr id="120" name="PlaceHolder 1"/>
+          <p:cNvPr id="117" name="PlaceHolder 1"/>
           <p:cNvSpPr>
             <a:spLocks noGrp="1" noRot="1" noChangeAspect="1"/>
           </p:cNvSpPr>
@@ -1390,7 +1518,7 @@
       </p:sp>
       <p:sp>
         <p:nvSpPr>
-          <p:cNvPr id="121" name="PlaceHolder 2"/>
+          <p:cNvPr id="118" name="PlaceHolder 2"/>
           <p:cNvSpPr>
             <a:spLocks noGrp="1"/>
           </p:cNvSpPr>
@@ -1421,7 +1549,7 @@
       </p:sp>
       <p:sp>
         <p:nvSpPr>
-          <p:cNvPr id="122" name="TextShape 3"/>
+          <p:cNvPr id="119" name="TextShape 3"/>
           <p:cNvSpPr txBox="1"/>
           <p:nvPr/>
         </p:nvSpPr>
@@ -1449,7 +1577,7 @@
                 <a:spcPct val="100000"/>
               </a:lnSpc>
             </a:pPr>
-            <a:fld id="{9CAD0EDE-3563-455D-B657-59A913EF016B}" type="slidenum">
+            <a:fld id="{EE04D805-D575-4BA5-8D7C-0FF2B62BA07A}" type="slidenum">
               <a:rPr lang="es-ES" sz="1200" b="0" strike="noStrike" spc="-1">
                 <a:solidFill>
                   <a:srgbClr val="000000"/>
@@ -1468,7 +1596,7 @@
     </p:spTree>
     <p:extLst>
       <p:ext uri="{BB962C8B-B14F-4D97-AF65-F5344CB8AC3E}">
-        <p14:creationId xmlns:p14="http://schemas.microsoft.com/office/powerpoint/2010/main" val="435704541"/>
+        <p14:creationId xmlns:p14="http://schemas.microsoft.com/office/powerpoint/2010/main" val="2310100210"/>
       </p:ext>
     </p:extLst>
   </p:cSld>
@@ -1497,7 +1625,7 @@
       </p:grpSpPr>
       <p:sp>
         <p:nvSpPr>
-          <p:cNvPr id="123" name="PlaceHolder 1"/>
+          <p:cNvPr id="120" name="PlaceHolder 1"/>
           <p:cNvSpPr>
             <a:spLocks noGrp="1" noRot="1" noChangeAspect="1"/>
           </p:cNvSpPr>
@@ -1517,7 +1645,7 @@
       </p:sp>
       <p:sp>
         <p:nvSpPr>
-          <p:cNvPr id="124" name="PlaceHolder 2"/>
+          <p:cNvPr id="121" name="PlaceHolder 2"/>
           <p:cNvSpPr>
             <a:spLocks noGrp="1"/>
           </p:cNvSpPr>
@@ -1548,7 +1676,7 @@
       </p:sp>
       <p:sp>
         <p:nvSpPr>
-          <p:cNvPr id="125" name="TextShape 3"/>
+          <p:cNvPr id="122" name="TextShape 3"/>
           <p:cNvSpPr txBox="1"/>
           <p:nvPr/>
         </p:nvSpPr>
@@ -1576,7 +1704,7 @@
                 <a:spcPct val="100000"/>
               </a:lnSpc>
             </a:pPr>
-            <a:fld id="{4197BDD6-ED08-4091-B598-90AC00CBED65}" type="slidenum">
+            <a:fld id="{9CAD0EDE-3563-455D-B657-59A913EF016B}" type="slidenum">
               <a:rPr lang="es-ES" sz="1200" b="0" strike="noStrike" spc="-1">
                 <a:solidFill>
                   <a:srgbClr val="000000"/>
@@ -1595,7 +1723,7 @@
     </p:spTree>
     <p:extLst>
       <p:ext uri="{BB962C8B-B14F-4D97-AF65-F5344CB8AC3E}">
-        <p14:creationId xmlns:p14="http://schemas.microsoft.com/office/powerpoint/2010/main" val="3898891920"/>
+        <p14:creationId xmlns:p14="http://schemas.microsoft.com/office/powerpoint/2010/main" val="435704541"/>
       </p:ext>
     </p:extLst>
   </p:cSld>
@@ -1624,7 +1752,7 @@
       </p:grpSpPr>
       <p:sp>
         <p:nvSpPr>
-          <p:cNvPr id="129" name="PlaceHolder 1"/>
+          <p:cNvPr id="123" name="PlaceHolder 1"/>
           <p:cNvSpPr>
             <a:spLocks noGrp="1" noRot="1" noChangeAspect="1"/>
           </p:cNvSpPr>
@@ -1644,7 +1772,7 @@
       </p:sp>
       <p:sp>
         <p:nvSpPr>
-          <p:cNvPr id="130" name="PlaceHolder 2"/>
+          <p:cNvPr id="124" name="PlaceHolder 2"/>
           <p:cNvSpPr>
             <a:spLocks noGrp="1"/>
           </p:cNvSpPr>
@@ -1675,7 +1803,7 @@
       </p:sp>
       <p:sp>
         <p:nvSpPr>
-          <p:cNvPr id="131" name="TextShape 3"/>
+          <p:cNvPr id="125" name="TextShape 3"/>
           <p:cNvSpPr txBox="1"/>
           <p:nvPr/>
         </p:nvSpPr>
@@ -1703,7 +1831,7 @@
                 <a:spcPct val="100000"/>
               </a:lnSpc>
             </a:pPr>
-            <a:fld id="{6A7A1432-E67B-4998-8031-FD8A7E1BD872}" type="slidenum">
+            <a:fld id="{4197BDD6-ED08-4091-B598-90AC00CBED65}" type="slidenum">
               <a:rPr lang="es-ES" sz="1200" b="0" strike="noStrike" spc="-1">
                 <a:solidFill>
                   <a:srgbClr val="000000"/>
@@ -1722,7 +1850,7 @@
     </p:spTree>
     <p:extLst>
       <p:ext uri="{BB962C8B-B14F-4D97-AF65-F5344CB8AC3E}">
-        <p14:creationId xmlns:p14="http://schemas.microsoft.com/office/powerpoint/2010/main" val="1817225050"/>
+        <p14:creationId xmlns:p14="http://schemas.microsoft.com/office/powerpoint/2010/main" val="3898891920"/>
       </p:ext>
     </p:extLst>
   </p:cSld>
@@ -4726,7 +4854,7 @@
       </p:grpSpPr>
       <p:sp>
         <p:nvSpPr>
-          <p:cNvPr id="91" name="CustomShape 1"/>
+          <p:cNvPr id="85" name="CustomShape 1"/>
           <p:cNvSpPr/>
           <p:nvPr/>
         </p:nvSpPr>
@@ -4781,9 +4909,54 @@
           </a:p>
         </p:txBody>
       </p:sp>
+      <p:sp>
+        <p:nvSpPr>
+          <p:cNvPr id="86" name="TextShape 2"/>
+          <p:cNvSpPr txBox="1"/>
+          <p:nvPr/>
+        </p:nvSpPr>
+        <p:spPr>
+          <a:xfrm>
+            <a:off x="1224000" y="720000"/>
+            <a:ext cx="7488000" cy="576000"/>
+          </a:xfrm>
+          <a:prstGeom prst="rect">
+            <a:avLst/>
+          </a:prstGeom>
+          <a:noFill/>
+          <a:ln>
+            <a:noFill/>
+          </a:ln>
+        </p:spPr>
+        <p:txBody>
+          <a:bodyPr lIns="90000" tIns="45000" rIns="90000" bIns="45000">
+            <a:spAutoFit/>
+          </a:bodyPr>
+          <a:lstStyle/>
+          <a:p>
+            <a:pPr algn="ctr">
+              <a:lnSpc>
+                <a:spcPct val="100000"/>
+              </a:lnSpc>
+            </a:pPr>
+            <a:r>
+              <a:rPr lang="es-ES" sz="2800" b="1" strike="noStrike" spc="-1">
+                <a:solidFill>
+                  <a:srgbClr val="000000"/>
+                </a:solidFill>
+                <a:latin typeface="Arial"/>
+              </a:rPr>
+              <a:t>Diagrama de clases de diseño del sprint. </a:t>
+            </a:r>
+            <a:endParaRPr lang="es-ES" sz="2800" b="0" strike="noStrike" spc="-1">
+              <a:latin typeface="Arial"/>
+            </a:endParaRPr>
+          </a:p>
+        </p:txBody>
+      </p:sp>
       <p:pic>
         <p:nvPicPr>
-          <p:cNvPr id="92" name="Imagen 91"/>
+          <p:cNvPr id="87" name="Imagen 86"/>
           <p:cNvPicPr/>
           <p:nvPr/>
         </p:nvPicPr>
@@ -4793,8 +4966,8 @@
         </p:blipFill>
         <p:spPr>
           <a:xfrm>
-            <a:off x="1512000" y="724680"/>
-            <a:ext cx="7037640" cy="5755320"/>
+            <a:off x="1978200" y="1396800"/>
+            <a:ext cx="5257440" cy="4219200"/>
           </a:xfrm>
           <a:prstGeom prst="rect">
             <a:avLst/>
@@ -4858,7 +5031,7 @@
       </p:grpSpPr>
       <p:sp>
         <p:nvSpPr>
-          <p:cNvPr id="93" name="CustomShape 1"/>
+          <p:cNvPr id="91" name="CustomShape 1"/>
           <p:cNvSpPr/>
           <p:nvPr/>
         </p:nvSpPr>
@@ -4915,7 +5088,7 @@
       </p:sp>
       <p:pic>
         <p:nvPicPr>
-          <p:cNvPr id="94" name="Imagen 93"/>
+          <p:cNvPr id="92" name="Imagen 91"/>
           <p:cNvPicPr/>
           <p:nvPr/>
         </p:nvPicPr>
@@ -4925,8 +5098,8 @@
         </p:blipFill>
         <p:spPr>
           <a:xfrm>
-            <a:off x="864000" y="844200"/>
-            <a:ext cx="7848000" cy="5056560"/>
+            <a:off x="1512000" y="724680"/>
+            <a:ext cx="7037640" cy="5755320"/>
           </a:xfrm>
           <a:prstGeom prst="rect">
             <a:avLst/>
@@ -4972,6 +5145,138 @@
 </file>
 
 <file path=ppt/slides/slide12.xml><?xml version="1.0" encoding="utf-8"?>
+<p:sld xmlns:a="http://schemas.openxmlformats.org/drawingml/2006/main" xmlns:r="http://schemas.openxmlformats.org/officeDocument/2006/relationships" xmlns:p="http://schemas.openxmlformats.org/presentationml/2006/main">
+  <p:cSld>
+    <p:spTree>
+      <p:nvGrpSpPr>
+        <p:cNvPr id="1" name=""/>
+        <p:cNvGrpSpPr/>
+        <p:nvPr/>
+      </p:nvGrpSpPr>
+      <p:grpSpPr>
+        <a:xfrm>
+          <a:off x="0" y="0"/>
+          <a:ext cx="0" cy="0"/>
+          <a:chOff x="0" y="0"/>
+          <a:chExt cx="0" cy="0"/>
+        </a:xfrm>
+      </p:grpSpPr>
+      <p:sp>
+        <p:nvSpPr>
+          <p:cNvPr id="93" name="CustomShape 1"/>
+          <p:cNvSpPr/>
+          <p:nvPr/>
+        </p:nvSpPr>
+        <p:spPr>
+          <a:xfrm>
+            <a:off x="2627280" y="198360"/>
+            <a:ext cx="5400360" cy="566280"/>
+          </a:xfrm>
+          <a:prstGeom prst="rect">
+            <a:avLst/>
+          </a:prstGeom>
+          <a:noFill/>
+          <a:ln>
+            <a:noFill/>
+          </a:ln>
+        </p:spPr>
+        <p:style>
+          <a:lnRef idx="0">
+            <a:scrgbClr r="0" g="0" b="0"/>
+          </a:lnRef>
+          <a:fillRef idx="0">
+            <a:scrgbClr r="0" g="0" b="0"/>
+          </a:fillRef>
+          <a:effectRef idx="0">
+            <a:scrgbClr r="0" g="0" b="0"/>
+          </a:effectRef>
+          <a:fontRef idx="minor"/>
+        </p:style>
+        <p:txBody>
+          <a:bodyPr wrap="none" lIns="45720" tIns="44280" rIns="45720" bIns="44280" anchor="ctr">
+            <a:noAutofit/>
+          </a:bodyPr>
+          <a:lstStyle/>
+          <a:p>
+            <a:pPr algn="ctr">
+              <a:lnSpc>
+                <a:spcPct val="100000"/>
+              </a:lnSpc>
+            </a:pPr>
+            <a:r>
+              <a:rPr lang="es-ES" sz="2800" b="1" strike="noStrike" spc="-1">
+                <a:solidFill>
+                  <a:srgbClr val="000000"/>
+                </a:solidFill>
+                <a:latin typeface="Arial"/>
+              </a:rPr>
+              <a:t>Sprint #1.</a:t>
+            </a:r>
+            <a:endParaRPr lang="es-ES" sz="2800" b="0" strike="noStrike" spc="-1">
+              <a:latin typeface="Arial"/>
+            </a:endParaRPr>
+          </a:p>
+        </p:txBody>
+      </p:sp>
+      <p:pic>
+        <p:nvPicPr>
+          <p:cNvPr id="94" name="Imagen 93"/>
+          <p:cNvPicPr/>
+          <p:nvPr/>
+        </p:nvPicPr>
+        <p:blipFill>
+          <a:blip r:embed="rId3"/>
+          <a:stretch/>
+        </p:blipFill>
+        <p:spPr>
+          <a:xfrm>
+            <a:off x="864000" y="844200"/>
+            <a:ext cx="7848000" cy="5056560"/>
+          </a:xfrm>
+          <a:prstGeom prst="rect">
+            <a:avLst/>
+          </a:prstGeom>
+          <a:ln>
+            <a:noFill/>
+          </a:ln>
+        </p:spPr>
+      </p:pic>
+    </p:spTree>
+  </p:cSld>
+  <p:clrMapOvr>
+    <a:masterClrMapping/>
+  </p:clrMapOvr>
+  <p:timing>
+    <p:tnLst>
+      <p:par>
+        <p:cTn id="1" dur="indefinite" restart="never" nodeType="tmRoot">
+          <p:childTnLst>
+            <p:seq>
+              <p:cTn id="2" dur="indefinite" nodeType="mainSeq"/>
+              <p:prevCondLst>
+                <p:cond evt="onPrev" delay="0">
+                  <p:tgtEl>
+                    <p:sldTgt/>
+                  </p:tgtEl>
+                </p:cond>
+              </p:prevCondLst>
+              <p:nextCondLst>
+                <p:cond evt="onNext" delay="0">
+                  <p:tgtEl>
+                    <p:sldTgt/>
+                  </p:tgtEl>
+                </p:cond>
+              </p:nextCondLst>
+            </p:seq>
+          </p:childTnLst>
+        </p:cTn>
+      </p:par>
+    </p:tnLst>
+  </p:timing>
+</p:sld>
+</file>
+
+<file path=ppt/slides/slide13.xml><?xml version="1.0" encoding="utf-8"?>
 <p:sld xmlns:a="http://schemas.openxmlformats.org/drawingml/2006/main" xmlns:r="http://schemas.openxmlformats.org/officeDocument/2006/relationships" xmlns:p="http://schemas.openxmlformats.org/presentationml/2006/main">
   <p:cSld>
     <p:spTree>
@@ -5969,7 +6274,7 @@
         <p:spPr>
           <a:xfrm>
             <a:off x="954360" y="1224000"/>
-            <a:ext cx="7381440" cy="4176000"/>
+            <a:ext cx="7381440" cy="4449012"/>
           </a:xfrm>
           <a:prstGeom prst="rect">
             <a:avLst/>
@@ -5999,7 +6304,31 @@
               <a:buChar char=""/>
             </a:pPr>
             <a:r>
-              <a:rPr lang="es-ES" sz="2000" b="0" strike="noStrike" spc="-1" dirty="0">
+              <a:rPr lang="es-ES" sz="2000" b="0" strike="noStrike" spc="-1" dirty="0" smtClean="0">
+                <a:solidFill>
+                  <a:srgbClr val="000000"/>
+                </a:solidFill>
+                <a:latin typeface="Arial"/>
+              </a:rPr>
+              <a:t>Reunión de Planificación.</a:t>
+            </a:r>
+          </a:p>
+          <a:p>
+            <a:pPr marL="441360" indent="-285480">
+              <a:lnSpc>
+                <a:spcPct val="200000"/>
+              </a:lnSpc>
+              <a:spcBef>
+                <a:spcPts val="1001"/>
+              </a:spcBef>
+              <a:buClr>
+                <a:srgbClr val="BBE0E3"/>
+              </a:buClr>
+              <a:buFont typeface="Wingdings 3" charset="2"/>
+              <a:buChar char=""/>
+            </a:pPr>
+            <a:r>
+              <a:rPr lang="es-ES" sz="2000" b="0" strike="noStrike" spc="-1" dirty="0" smtClean="0">
                 <a:solidFill>
                   <a:srgbClr val="000000"/>
                 </a:solidFill>
@@ -6391,15 +6720,37 @@
               </a:lnSpc>
             </a:pPr>
             <a:r>
-              <a:rPr lang="es-ES" sz="2800" b="1" strike="noStrike" spc="-1">
+              <a:rPr lang="es-ES" sz="2800" b="1" strike="noStrike" spc="-1" dirty="0">
                 <a:solidFill>
                   <a:srgbClr val="000000"/>
                 </a:solidFill>
                 <a:latin typeface="Arial"/>
               </a:rPr>
-              <a:t>Sprint #1. Sprint Backlog.</a:t>
+              <a:t>Sprint #1. </a:t>
             </a:r>
-            <a:endParaRPr lang="es-ES" sz="2800" b="0" strike="noStrike" spc="-1">
+            <a:endParaRPr lang="es-ES" sz="2800" b="1" strike="noStrike" spc="-1" dirty="0" smtClean="0">
+              <a:solidFill>
+                <a:srgbClr val="000000"/>
+              </a:solidFill>
+              <a:latin typeface="Arial"/>
+            </a:endParaRPr>
+          </a:p>
+          <a:p>
+            <a:pPr algn="ctr">
+              <a:lnSpc>
+                <a:spcPct val="100000"/>
+              </a:lnSpc>
+            </a:pPr>
+            <a:r>
+              <a:rPr lang="es-ES" sz="2800" b="1" strike="noStrike" spc="-1" dirty="0" smtClean="0">
+                <a:solidFill>
+                  <a:srgbClr val="000000"/>
+                </a:solidFill>
+                <a:latin typeface="Arial"/>
+              </a:rPr>
+              <a:t>Reunión de Planificación.</a:t>
+            </a:r>
+            <a:endParaRPr lang="es-ES" sz="2800" b="0" strike="noStrike" spc="-1" dirty="0">
               <a:latin typeface="Arial"/>
             </a:endParaRPr>
           </a:p>
@@ -6417,7 +6768,7 @@
         </p:blipFill>
         <p:spPr>
           <a:xfrm>
-            <a:off x="237240" y="982080"/>
+            <a:off x="361658" y="3799925"/>
             <a:ext cx="8667360" cy="466200"/>
           </a:xfrm>
           <a:prstGeom prst="rect">
@@ -6430,7 +6781,7 @@
       </p:pic>
       <p:pic>
         <p:nvPicPr>
-          <p:cNvPr id="3" name="Imagen 2"/>
+          <p:cNvPr id="2" name="Imagen 1"/>
           <p:cNvPicPr>
             <a:picLocks noChangeAspect="1"/>
           </p:cNvPicPr>
@@ -6444,8 +6795,8 @@
         </p:blipFill>
         <p:spPr>
           <a:xfrm>
-            <a:off x="237239" y="1533349"/>
-            <a:ext cx="8766801" cy="5013350"/>
+            <a:off x="361658" y="1448965"/>
+            <a:ext cx="8467718" cy="1518169"/>
           </a:xfrm>
           <a:prstGeom prst="rect">
             <a:avLst/>
@@ -6506,7 +6857,7 @@
       </p:grpSpPr>
       <p:sp>
         <p:nvSpPr>
-          <p:cNvPr id="88" name="CustomShape 1"/>
+          <p:cNvPr id="70" name="CustomShape 1"/>
           <p:cNvSpPr/>
           <p:nvPr/>
         </p:nvSpPr>
@@ -6553,7 +6904,7 @@
                 </a:solidFill>
                 <a:latin typeface="Arial"/>
               </a:rPr>
-              <a:t>Sprint #1.</a:t>
+              <a:t>Sprint #1. Sprint Backlog.</a:t>
             </a:r>
             <a:endParaRPr lang="es-ES" sz="2800" b="0" strike="noStrike" spc="-1">
               <a:latin typeface="Arial"/>
@@ -6561,75 +6912,36 @@
           </a:p>
         </p:txBody>
       </p:sp>
-      <p:sp>
-        <p:nvSpPr>
-          <p:cNvPr id="89" name="TextShape 2"/>
-          <p:cNvSpPr txBox="1"/>
-          <p:nvPr/>
-        </p:nvSpPr>
-        <p:spPr>
-          <a:xfrm>
-            <a:off x="1224000" y="720000"/>
-            <a:ext cx="7488000" cy="576000"/>
-          </a:xfrm>
-          <a:prstGeom prst="rect">
-            <a:avLst/>
-          </a:prstGeom>
-          <a:noFill/>
-          <a:ln>
-            <a:noFill/>
-          </a:ln>
-        </p:spPr>
-        <p:txBody>
-          <a:bodyPr lIns="90000" tIns="45000" rIns="90000" bIns="45000">
-            <a:spAutoFit/>
-          </a:bodyPr>
-          <a:lstStyle/>
-          <a:p>
-            <a:pPr algn="ctr">
-              <a:lnSpc>
-                <a:spcPct val="100000"/>
-              </a:lnSpc>
-            </a:pPr>
-            <a:r>
-              <a:rPr lang="es-ES" sz="2800" b="1" strike="noStrike" spc="-1">
-                <a:solidFill>
-                  <a:srgbClr val="000000"/>
-                </a:solidFill>
-                <a:latin typeface="Arial"/>
-              </a:rPr>
-              <a:t>Diagrama Burn-down (Curva de estrés). </a:t>
-            </a:r>
-            <a:endParaRPr lang="es-ES" sz="2800" b="0" strike="noStrike" spc="-1">
-              <a:latin typeface="Arial"/>
-            </a:endParaRPr>
-          </a:p>
-        </p:txBody>
-      </p:sp>
       <p:pic>
         <p:nvPicPr>
-          <p:cNvPr id="90" name="Imagen 89"/>
-          <p:cNvPicPr/>
+          <p:cNvPr id="3" name="Imagen 2"/>
+          <p:cNvPicPr>
+            <a:picLocks noChangeAspect="1"/>
+          </p:cNvPicPr>
           <p:nvPr/>
         </p:nvPicPr>
         <p:blipFill>
           <a:blip r:embed="rId3"/>
-          <a:stretch/>
+          <a:stretch>
+            <a:fillRect/>
+          </a:stretch>
         </p:blipFill>
         <p:spPr>
           <a:xfrm>
-            <a:off x="360000" y="1573920"/>
-            <a:ext cx="8454600" cy="4042080"/>
-          </a:xfrm>
-          <a:prstGeom prst="rect">
-            <a:avLst/>
-          </a:prstGeom>
-          <a:ln>
-            <a:noFill/>
-          </a:ln>
+            <a:off x="237239" y="1533349"/>
+            <a:ext cx="8766801" cy="5013350"/>
+          </a:xfrm>
+          <a:prstGeom prst="rect">
+            <a:avLst/>
+          </a:prstGeom>
         </p:spPr>
       </p:pic>
     </p:spTree>
+    <p:extLst>
+      <p:ext uri="{BB962C8B-B14F-4D97-AF65-F5344CB8AC3E}">
+        <p14:creationId xmlns:p14="http://schemas.microsoft.com/office/powerpoint/2010/main" val="1426475499"/>
+      </p:ext>
+    </p:extLst>
   </p:cSld>
   <p:clrMapOvr>
     <a:masterClrMapping/>
@@ -6683,7 +6995,7 @@
       </p:grpSpPr>
       <p:sp>
         <p:nvSpPr>
-          <p:cNvPr id="73" name="CustomShape 1"/>
+          <p:cNvPr id="88" name="CustomShape 1"/>
           <p:cNvSpPr/>
           <p:nvPr/>
         </p:nvSpPr>
@@ -6730,7 +7042,7 @@
                 </a:solidFill>
                 <a:latin typeface="Arial"/>
               </a:rPr>
-              <a:t>Sprint #1. </a:t>
+              <a:t>Sprint #1.</a:t>
             </a:r>
             <a:endParaRPr lang="es-ES" sz="2800" b="0" strike="noStrike" spc="-1">
               <a:latin typeface="Arial"/>
@@ -6738,32 +7050,9 @@
           </a:p>
         </p:txBody>
       </p:sp>
-      <p:pic>
-        <p:nvPicPr>
-          <p:cNvPr id="74" name="Imagen 73"/>
-          <p:cNvPicPr/>
-          <p:nvPr/>
-        </p:nvPicPr>
-        <p:blipFill>
-          <a:blip r:embed="rId3"/>
-          <a:stretch/>
-        </p:blipFill>
-        <p:spPr>
-          <a:xfrm>
-            <a:off x="3758040" y="2170800"/>
-            <a:ext cx="2361960" cy="1933200"/>
-          </a:xfrm>
-          <a:prstGeom prst="rect">
-            <a:avLst/>
-          </a:prstGeom>
-          <a:ln>
-            <a:noFill/>
-          </a:ln>
-        </p:spPr>
-      </p:pic>
-      <p:sp>
-        <p:nvSpPr>
-          <p:cNvPr id="75" name="TextShape 2"/>
+      <p:sp>
+        <p:nvSpPr>
+          <p:cNvPr id="89" name="TextShape 2"/>
           <p:cNvSpPr txBox="1"/>
           <p:nvPr/>
         </p:nvSpPr>
@@ -6798,7 +7087,7 @@
                 </a:solidFill>
                 <a:latin typeface="Arial"/>
               </a:rPr>
-              <a:t>Interfaz de Usuario + Visor GIS insertado. </a:t>
+              <a:t>Diagrama Burn-down (Curva de estrés). </a:t>
             </a:r>
             <a:endParaRPr lang="es-ES" sz="2800" b="0" strike="noStrike" spc="-1">
               <a:latin typeface="Arial"/>
@@ -6806,38 +7095,29 @@
           </a:p>
         </p:txBody>
       </p:sp>
-      <p:sp>
-        <p:nvSpPr>
-          <p:cNvPr id="2" name="CuadroTexto 1"/>
-          <p:cNvSpPr txBox="1"/>
+      <p:pic>
+        <p:nvPicPr>
+          <p:cNvPr id="90" name="Imagen 89"/>
+          <p:cNvPicPr/>
           <p:nvPr/>
-        </p:nvSpPr>
-        <p:spPr>
-          <a:xfrm>
-            <a:off x="3758040" y="4815068"/>
-            <a:ext cx="2095510" cy="369332"/>
-          </a:xfrm>
-          <a:prstGeom prst="rect">
-            <a:avLst/>
-          </a:prstGeom>
-          <a:noFill/>
-        </p:spPr>
-        <p:txBody>
-          <a:bodyPr wrap="none" rtlCol="0">
-            <a:spAutoFit/>
-          </a:bodyPr>
-          <a:lstStyle/>
-          <a:p>
-            <a:r>
-              <a:rPr lang="es-ES" dirty="0" smtClean="0">
-                <a:hlinkClick r:id="rId4" action="ppaction://hlinkfile"/>
-              </a:rPr>
-              <a:t>Aplicación AGNEX</a:t>
-            </a:r>
-            <a:endParaRPr lang="es-ES" dirty="0"/>
-          </a:p>
-        </p:txBody>
-      </p:sp>
+        </p:nvPicPr>
+        <p:blipFill>
+          <a:blip r:embed="rId3"/>
+          <a:stretch/>
+        </p:blipFill>
+        <p:spPr>
+          <a:xfrm>
+            <a:off x="360000" y="1573920"/>
+            <a:ext cx="8454600" cy="4042080"/>
+          </a:xfrm>
+          <a:prstGeom prst="rect">
+            <a:avLst/>
+          </a:prstGeom>
+          <a:ln>
+            <a:noFill/>
+          </a:ln>
+        </p:spPr>
+      </p:pic>
     </p:spTree>
   </p:cSld>
   <p:clrMapOvr>
@@ -6892,7 +7172,7 @@
       </p:grpSpPr>
       <p:sp>
         <p:nvSpPr>
-          <p:cNvPr id="76" name="CustomShape 1"/>
+          <p:cNvPr id="73" name="CustomShape 1"/>
           <p:cNvSpPr/>
           <p:nvPr/>
         </p:nvSpPr>
@@ -6939,7 +7219,7 @@
                 </a:solidFill>
                 <a:latin typeface="Arial"/>
               </a:rPr>
-              <a:t>Sprint #1.</a:t>
+              <a:t>Sprint #1. </a:t>
             </a:r>
             <a:endParaRPr lang="es-ES" sz="2800" b="0" strike="noStrike" spc="-1">
               <a:latin typeface="Arial"/>
@@ -6947,9 +7227,32 @@
           </a:p>
         </p:txBody>
       </p:sp>
-      <p:sp>
-        <p:nvSpPr>
-          <p:cNvPr id="77" name="TextShape 2"/>
+      <p:pic>
+        <p:nvPicPr>
+          <p:cNvPr id="74" name="Imagen 73"/>
+          <p:cNvPicPr/>
+          <p:nvPr/>
+        </p:nvPicPr>
+        <p:blipFill>
+          <a:blip r:embed="rId3"/>
+          <a:stretch/>
+        </p:blipFill>
+        <p:spPr>
+          <a:xfrm>
+            <a:off x="3758040" y="2170800"/>
+            <a:ext cx="2361960" cy="1933200"/>
+          </a:xfrm>
+          <a:prstGeom prst="rect">
+            <a:avLst/>
+          </a:prstGeom>
+          <a:ln>
+            <a:noFill/>
+          </a:ln>
+        </p:spPr>
+      </p:pic>
+      <p:sp>
+        <p:nvSpPr>
+          <p:cNvPr id="75" name="TextShape 2"/>
           <p:cNvSpPr txBox="1"/>
           <p:nvPr/>
         </p:nvSpPr>
@@ -6984,7 +7287,7 @@
                 </a:solidFill>
                 <a:latin typeface="Arial"/>
               </a:rPr>
-              <a:t>Diagrama de clases de diseño del sprint. </a:t>
+              <a:t>Interfaz de Usuario + Visor GIS insertado. </a:t>
             </a:r>
             <a:endParaRPr lang="es-ES" sz="2800" b="0" strike="noStrike" spc="-1">
               <a:latin typeface="Arial"/>
@@ -6992,29 +7295,38 @@
           </a:p>
         </p:txBody>
       </p:sp>
-      <p:pic>
-        <p:nvPicPr>
-          <p:cNvPr id="78" name="Imagen 77"/>
-          <p:cNvPicPr/>
+      <p:sp>
+        <p:nvSpPr>
+          <p:cNvPr id="2" name="CuadroTexto 1"/>
+          <p:cNvSpPr txBox="1"/>
           <p:nvPr/>
-        </p:nvPicPr>
-        <p:blipFill>
-          <a:blip r:embed="rId3"/>
-          <a:stretch/>
-        </p:blipFill>
-        <p:spPr>
-          <a:xfrm>
-            <a:off x="1992240" y="2122560"/>
-            <a:ext cx="5229000" cy="2266560"/>
-          </a:xfrm>
-          <a:prstGeom prst="rect">
-            <a:avLst/>
-          </a:prstGeom>
-          <a:ln>
-            <a:noFill/>
-          </a:ln>
-        </p:spPr>
-      </p:pic>
+        </p:nvSpPr>
+        <p:spPr>
+          <a:xfrm>
+            <a:off x="3758040" y="4815068"/>
+            <a:ext cx="2095510" cy="369332"/>
+          </a:xfrm>
+          <a:prstGeom prst="rect">
+            <a:avLst/>
+          </a:prstGeom>
+          <a:noFill/>
+        </p:spPr>
+        <p:txBody>
+          <a:bodyPr wrap="none" rtlCol="0">
+            <a:spAutoFit/>
+          </a:bodyPr>
+          <a:lstStyle/>
+          <a:p>
+            <a:r>
+              <a:rPr lang="es-ES" dirty="0" smtClean="0">
+                <a:hlinkClick r:id="rId4" action="ppaction://hlinkfile"/>
+              </a:rPr>
+              <a:t>Aplicación AGNEX</a:t>
+            </a:r>
+            <a:endParaRPr lang="es-ES" dirty="0"/>
+          </a:p>
+        </p:txBody>
+      </p:sp>
     </p:spTree>
   </p:cSld>
   <p:clrMapOvr>
@@ -7069,7 +7381,7 @@
       </p:grpSpPr>
       <p:sp>
         <p:nvSpPr>
-          <p:cNvPr id="79" name="CustomShape 1"/>
+          <p:cNvPr id="76" name="CustomShape 1"/>
           <p:cNvSpPr/>
           <p:nvPr/>
         </p:nvSpPr>
@@ -7126,7 +7438,7 @@
       </p:sp>
       <p:sp>
         <p:nvSpPr>
-          <p:cNvPr id="80" name="TextShape 2"/>
+          <p:cNvPr id="77" name="TextShape 2"/>
           <p:cNvSpPr txBox="1"/>
           <p:nvPr/>
         </p:nvSpPr>
@@ -7171,7 +7483,7 @@
       </p:sp>
       <p:pic>
         <p:nvPicPr>
-          <p:cNvPr id="81" name="Imagen 80"/>
+          <p:cNvPr id="78" name="Imagen 77"/>
           <p:cNvPicPr/>
           <p:nvPr/>
         </p:nvPicPr>
@@ -7181,8 +7493,8 @@
         </p:blipFill>
         <p:spPr>
           <a:xfrm>
-            <a:off x="1728000" y="1180800"/>
-            <a:ext cx="5472000" cy="5320080"/>
+            <a:off x="1992240" y="2122560"/>
+            <a:ext cx="5229000" cy="2266560"/>
           </a:xfrm>
           <a:prstGeom prst="rect">
             <a:avLst/>
@@ -7246,7 +7558,7 @@
       </p:grpSpPr>
       <p:sp>
         <p:nvSpPr>
-          <p:cNvPr id="82" name="CustomShape 1"/>
+          <p:cNvPr id="79" name="CustomShape 1"/>
           <p:cNvSpPr/>
           <p:nvPr/>
         </p:nvSpPr>
@@ -7303,7 +7615,7 @@
       </p:sp>
       <p:sp>
         <p:nvSpPr>
-          <p:cNvPr id="83" name="TextShape 2"/>
+          <p:cNvPr id="80" name="TextShape 2"/>
           <p:cNvSpPr txBox="1"/>
           <p:nvPr/>
         </p:nvSpPr>
@@ -7348,7 +7660,7 @@
       </p:sp>
       <p:pic>
         <p:nvPicPr>
-          <p:cNvPr id="84" name="Imagen 83"/>
+          <p:cNvPr id="81" name="Imagen 80"/>
           <p:cNvPicPr/>
           <p:nvPr/>
         </p:nvPicPr>
@@ -7358,8 +7670,8 @@
         </p:blipFill>
         <p:spPr>
           <a:xfrm>
-            <a:off x="1728000" y="1143000"/>
-            <a:ext cx="6768000" cy="5352120"/>
+            <a:off x="1728000" y="1180800"/>
+            <a:ext cx="5472000" cy="5320080"/>
           </a:xfrm>
           <a:prstGeom prst="rect">
             <a:avLst/>
@@ -7423,7 +7735,7 @@
       </p:grpSpPr>
       <p:sp>
         <p:nvSpPr>
-          <p:cNvPr id="85" name="CustomShape 1"/>
+          <p:cNvPr id="82" name="CustomShape 1"/>
           <p:cNvSpPr/>
           <p:nvPr/>
         </p:nvSpPr>
@@ -7480,7 +7792,7 @@
       </p:sp>
       <p:sp>
         <p:nvSpPr>
-          <p:cNvPr id="86" name="TextShape 2"/>
+          <p:cNvPr id="83" name="TextShape 2"/>
           <p:cNvSpPr txBox="1"/>
           <p:nvPr/>
         </p:nvSpPr>
@@ -7525,7 +7837,7 @@
       </p:sp>
       <p:pic>
         <p:nvPicPr>
-          <p:cNvPr id="87" name="Imagen 86"/>
+          <p:cNvPr id="84" name="Imagen 83"/>
           <p:cNvPicPr/>
           <p:nvPr/>
         </p:nvPicPr>
@@ -7535,8 +7847,8 @@
         </p:blipFill>
         <p:spPr>
           <a:xfrm>
-            <a:off x="1978200" y="1396800"/>
-            <a:ext cx="5257440" cy="4219200"/>
+            <a:off x="1728000" y="1143000"/>
+            <a:ext cx="6768000" cy="5352120"/>
           </a:xfrm>
           <a:prstGeom prst="rect">
             <a:avLst/>

</xml_diff>

<commit_message>
Cambiado esquemas de Secuencias
</commit_message>
<xml_diff>
--- a/PrimerSprint/Presentación_PrimerSprint_AGNEX.pptx
+++ b/PrimerSprint/Presentación_PrimerSprint_AGNEX.pptx
@@ -5088,25 +5088,32 @@
       </p:sp>
       <p:pic>
         <p:nvPicPr>
-          <p:cNvPr id="92" name="Imagen 91"/>
-          <p:cNvPicPr/>
+          <p:cNvPr id="2" name="Imagen 1"/>
+          <p:cNvPicPr>
+            <a:picLocks noChangeAspect="1"/>
+          </p:cNvPicPr>
           <p:nvPr/>
         </p:nvPicPr>
         <p:blipFill>
-          <a:blip r:embed="rId3"/>
-          <a:stretch/>
+          <a:blip r:embed="rId3">
+            <a:extLst>
+              <a:ext uri="{28A0092B-C50C-407E-A947-70E740481C1C}">
+                <a14:useLocalDpi xmlns:a14="http://schemas.microsoft.com/office/drawing/2010/main" val="0"/>
+              </a:ext>
+            </a:extLst>
+          </a:blip>
+          <a:stretch>
+            <a:fillRect/>
+          </a:stretch>
         </p:blipFill>
         <p:spPr>
           <a:xfrm>
-            <a:off x="1512000" y="724680"/>
-            <a:ext cx="7037640" cy="5755320"/>
-          </a:xfrm>
-          <a:prstGeom prst="rect">
-            <a:avLst/>
-          </a:prstGeom>
-          <a:ln>
-            <a:noFill/>
-          </a:ln>
+            <a:off x="799573" y="385337"/>
+            <a:ext cx="7544853" cy="6087325"/>
+          </a:xfrm>
+          <a:prstGeom prst="rect">
+            <a:avLst/>
+          </a:prstGeom>
         </p:spPr>
       </p:pic>
     </p:spTree>
@@ -5220,25 +5227,32 @@
       </p:sp>
       <p:pic>
         <p:nvPicPr>
-          <p:cNvPr id="94" name="Imagen 93"/>
-          <p:cNvPicPr/>
+          <p:cNvPr id="2" name="Imagen 1"/>
+          <p:cNvPicPr>
+            <a:picLocks noChangeAspect="1"/>
+          </p:cNvPicPr>
           <p:nvPr/>
         </p:nvPicPr>
         <p:blipFill>
-          <a:blip r:embed="rId3"/>
-          <a:stretch/>
+          <a:blip r:embed="rId3">
+            <a:extLst>
+              <a:ext uri="{28A0092B-C50C-407E-A947-70E740481C1C}">
+                <a14:useLocalDpi xmlns:a14="http://schemas.microsoft.com/office/drawing/2010/main" val="0"/>
+              </a:ext>
+            </a:extLst>
+          </a:blip>
+          <a:stretch>
+            <a:fillRect/>
+          </a:stretch>
         </p:blipFill>
         <p:spPr>
           <a:xfrm>
-            <a:off x="864000" y="844200"/>
-            <a:ext cx="7848000" cy="5056560"/>
-          </a:xfrm>
-          <a:prstGeom prst="rect">
-            <a:avLst/>
-          </a:prstGeom>
-          <a:ln>
-            <a:noFill/>
-          </a:ln>
+            <a:off x="807300" y="1198468"/>
+            <a:ext cx="7384967" cy="4978397"/>
+          </a:xfrm>
+          <a:prstGeom prst="rect">
+            <a:avLst/>
+          </a:prstGeom>
         </p:spPr>
       </p:pic>
     </p:spTree>

</xml_diff>

<commit_message>
Presentación Primer Sprint AGNEX 28/05/2019
</commit_message>
<xml_diff>
--- a/PrimerSprint/Presentación_PrimerSprint_AGNEX.pptx
+++ b/PrimerSprint/Presentación_PrimerSprint_AGNEX.pptx
@@ -5,25 +5,25 @@
     <p:sldMasterId id="2147483648" r:id="rId1"/>
   </p:sldMasterIdLst>
   <p:notesMasterIdLst>
-    <p:notesMasterId r:id="rId15"/>
+    <p:notesMasterId r:id="rId5"/>
   </p:notesMasterIdLst>
   <p:sldIdLst>
-    <p:sldId id="256" r:id="rId2"/>
-    <p:sldId id="257" r:id="rId3"/>
-    <p:sldId id="258" r:id="rId4"/>
-    <p:sldId id="268" r:id="rId5"/>
-    <p:sldId id="264" r:id="rId6"/>
-    <p:sldId id="259" r:id="rId7"/>
-    <p:sldId id="260" r:id="rId8"/>
-    <p:sldId id="261" r:id="rId9"/>
-    <p:sldId id="262" r:id="rId10"/>
-    <p:sldId id="263" r:id="rId11"/>
-    <p:sldId id="265" r:id="rId12"/>
-    <p:sldId id="266" r:id="rId13"/>
-    <p:sldId id="267" r:id="rId14"/>
+    <p:sldId id="256" r:id="rId3"/>
+    <p:sldId id="257" r:id="rId4"/>
+    <p:sldId id="258" r:id="rId6"/>
+    <p:sldId id="268" r:id="rId7"/>
+    <p:sldId id="264" r:id="rId8"/>
+    <p:sldId id="259" r:id="rId9"/>
+    <p:sldId id="260" r:id="rId10"/>
+    <p:sldId id="261" r:id="rId11"/>
+    <p:sldId id="262" r:id="rId12"/>
+    <p:sldId id="263" r:id="rId13"/>
+    <p:sldId id="265" r:id="rId14"/>
+    <p:sldId id="266" r:id="rId15"/>
+    <p:sldId id="267" r:id="rId16"/>
   </p:sldIdLst>
   <p:sldSz cx="9144000" cy="6858000" type="screen4x3"/>
-  <p:notesSz cx="6797675" cy="9926638"/>
+  <p:notesSz cx="6797675" cy="9926320"/>
   <p:defaultTextStyle>
     <a:defPPr>
       <a:defRPr lang="es-ES"/>
@@ -119,11 +119,6 @@
       </a:defRPr>
     </a:lvl9pPr>
   </p:defaultTextStyle>
-  <p:extLst>
-    <p:ext uri="{EFAFB233-063F-42B5-8137-9DF3F51BA10A}">
-      <p15:sldGuideLst xmlns:p15="http://schemas.microsoft.com/office/powerpoint/2012/main"/>
-    </p:ext>
-  </p:extLst>
 </p:presentation>
 </file>
 
@@ -183,6 +178,12 @@
               </a:rPr>
               <a:t>Click to move the slide</a:t>
             </a:r>
+            <a:endParaRPr lang="es-ES" sz="4400" b="0" strike="noStrike" spc="-1">
+              <a:solidFill>
+                <a:srgbClr val="000000"/>
+              </a:solidFill>
+              <a:latin typeface="Arial"/>
+            </a:endParaRPr>
           </a:p>
         </p:txBody>
       </p:sp>
@@ -217,6 +218,9 @@
               </a:rPr>
               <a:t>Click to edit the notes format</a:t>
             </a:r>
+            <a:endParaRPr lang="es-ES" sz="2000" b="0" strike="noStrike" spc="-1">
+              <a:latin typeface="Arial"/>
+            </a:endParaRPr>
           </a:p>
         </p:txBody>
       </p:sp>
@@ -251,6 +255,9 @@
               </a:rPr>
               <a:t> </a:t>
             </a:r>
+            <a:endParaRPr lang="es-ES" sz="1400" b="0" strike="noStrike" spc="-1">
+              <a:latin typeface="Times New Roman"/>
+            </a:endParaRPr>
           </a:p>
         </p:txBody>
       </p:sp>
@@ -286,6 +293,9 @@
               </a:rPr>
               <a:t> </a:t>
             </a:r>
+            <a:endParaRPr lang="es-ES" sz="1400" b="0" strike="noStrike" spc="-1">
+              <a:latin typeface="Times New Roman"/>
+            </a:endParaRPr>
           </a:p>
         </p:txBody>
       </p:sp>
@@ -320,6 +330,9 @@
               </a:rPr>
               <a:t> </a:t>
             </a:r>
+            <a:endParaRPr lang="es-ES" sz="1400" b="0" strike="noStrike" spc="-1">
+              <a:latin typeface="Times New Roman"/>
+            </a:endParaRPr>
           </a:p>
         </p:txBody>
       </p:sp>
@@ -353,7 +366,6 @@
               <a:rPr lang="es-ES" sz="1400" b="0" strike="noStrike" spc="-1">
                 <a:latin typeface="Times New Roman"/>
               </a:rPr>
-              <a:t>‹Nº›</a:t>
             </a:fld>
             <a:endParaRPr lang="es-ES" sz="1400" b="0" strike="noStrike" spc="-1">
               <a:latin typeface="Times New Roman"/>
@@ -362,11 +374,6 @@
         </p:txBody>
       </p:sp>
     </p:spTree>
-    <p:extLst>
-      <p:ext uri="{BB962C8B-B14F-4D97-AF65-F5344CB8AC3E}">
-        <p14:creationId xmlns:p14="http://schemas.microsoft.com/office/powerpoint/2010/main" val="1563577680"/>
-      </p:ext>
-    </p:extLst>
   </p:cSld>
   <p:clrMap bg1="lt1" tx1="dk1" bg2="lt2" tx2="dk2" accent1="accent1" accent2="accent2" accent3="accent3" accent4="accent4" accent5="accent5" accent6="accent6" hlink="hlink" folHlink="folHlink"/>
   <p:notesStyle>
@@ -569,7 +576,6 @@
                 </a:solidFill>
                 <a:latin typeface="Arial"/>
               </a:rPr>
-              <a:t>2</a:t>
             </a:fld>
             <a:endParaRPr lang="es-ES" sz="1200" b="0" strike="noStrike" spc="-1">
               <a:latin typeface="Times New Roman"/>
@@ -578,11 +584,6 @@
         </p:txBody>
       </p:sp>
     </p:spTree>
-    <p:extLst>
-      <p:ext uri="{BB962C8B-B14F-4D97-AF65-F5344CB8AC3E}">
-        <p14:creationId xmlns:p14="http://schemas.microsoft.com/office/powerpoint/2010/main" val="2099940382"/>
-      </p:ext>
-    </p:extLst>
   </p:cSld>
   <p:clrMapOvr>
     <a:masterClrMapping/>
@@ -696,7 +697,6 @@
                 <a:latin typeface="Arial"/>
                 <a:ea typeface="+mn-ea"/>
               </a:rPr>
-              <a:t>11</a:t>
             </a:fld>
             <a:endParaRPr lang="es-ES" sz="1200" b="0" strike="noStrike" spc="-1">
               <a:latin typeface="Times New Roman"/>
@@ -705,11 +705,6 @@
         </p:txBody>
       </p:sp>
     </p:spTree>
-    <p:extLst>
-      <p:ext uri="{BB962C8B-B14F-4D97-AF65-F5344CB8AC3E}">
-        <p14:creationId xmlns:p14="http://schemas.microsoft.com/office/powerpoint/2010/main" val="1817225050"/>
-      </p:ext>
-    </p:extLst>
   </p:cSld>
   <p:clrMapOvr>
     <a:masterClrMapping/>
@@ -823,7 +818,6 @@
                 <a:latin typeface="Arial"/>
                 <a:ea typeface="+mn-ea"/>
               </a:rPr>
-              <a:t>12</a:t>
             </a:fld>
             <a:endParaRPr lang="es-ES" sz="1200" b="0" strike="noStrike" spc="-1">
               <a:latin typeface="Times New Roman"/>
@@ -832,11 +826,6 @@
         </p:txBody>
       </p:sp>
     </p:spTree>
-    <p:extLst>
-      <p:ext uri="{BB962C8B-B14F-4D97-AF65-F5344CB8AC3E}">
-        <p14:creationId xmlns:p14="http://schemas.microsoft.com/office/powerpoint/2010/main" val="4195125985"/>
-      </p:ext>
-    </p:extLst>
   </p:cSld>
   <p:clrMapOvr>
     <a:masterClrMapping/>
@@ -950,7 +939,6 @@
                 <a:latin typeface="Arial"/>
                 <a:ea typeface="+mn-ea"/>
               </a:rPr>
-              <a:t>3</a:t>
             </a:fld>
             <a:endParaRPr lang="es-ES" sz="1200" b="0" strike="noStrike" spc="-1">
               <a:latin typeface="Times New Roman"/>
@@ -959,11 +947,6 @@
         </p:txBody>
       </p:sp>
     </p:spTree>
-    <p:extLst>
-      <p:ext uri="{BB962C8B-B14F-4D97-AF65-F5344CB8AC3E}">
-        <p14:creationId xmlns:p14="http://schemas.microsoft.com/office/powerpoint/2010/main" val="218969572"/>
-      </p:ext>
-    </p:extLst>
   </p:cSld>
   <p:clrMapOvr>
     <a:masterClrMapping/>
@@ -1077,7 +1060,6 @@
                 <a:latin typeface="Arial"/>
                 <a:ea typeface="+mn-ea"/>
               </a:rPr>
-              <a:t>4</a:t>
             </a:fld>
             <a:endParaRPr lang="es-ES" sz="1200" b="0" strike="noStrike" spc="-1">
               <a:latin typeface="Times New Roman"/>
@@ -1086,11 +1068,6 @@
         </p:txBody>
       </p:sp>
     </p:spTree>
-    <p:extLst>
-      <p:ext uri="{BB962C8B-B14F-4D97-AF65-F5344CB8AC3E}">
-        <p14:creationId xmlns:p14="http://schemas.microsoft.com/office/powerpoint/2010/main" val="370262700"/>
-      </p:ext>
-    </p:extLst>
   </p:cSld>
   <p:clrMapOvr>
     <a:masterClrMapping/>
@@ -1204,7 +1181,6 @@
                 <a:latin typeface="Arial"/>
                 <a:ea typeface="+mn-ea"/>
               </a:rPr>
-              <a:t>5</a:t>
             </a:fld>
             <a:endParaRPr lang="es-ES" sz="1200" b="0" strike="noStrike" spc="-1">
               <a:latin typeface="Times New Roman"/>
@@ -1213,11 +1189,6 @@
         </p:txBody>
       </p:sp>
     </p:spTree>
-    <p:extLst>
-      <p:ext uri="{BB962C8B-B14F-4D97-AF65-F5344CB8AC3E}">
-        <p14:creationId xmlns:p14="http://schemas.microsoft.com/office/powerpoint/2010/main" val="1447200360"/>
-      </p:ext>
-    </p:extLst>
   </p:cSld>
   <p:clrMapOvr>
     <a:masterClrMapping/>
@@ -1331,7 +1302,6 @@
                 <a:latin typeface="Arial"/>
                 <a:ea typeface="+mn-ea"/>
               </a:rPr>
-              <a:t>6</a:t>
             </a:fld>
             <a:endParaRPr lang="es-ES" sz="1200" b="0" strike="noStrike" spc="-1">
               <a:latin typeface="Times New Roman"/>
@@ -1340,11 +1310,6 @@
         </p:txBody>
       </p:sp>
     </p:spTree>
-    <p:extLst>
-      <p:ext uri="{BB962C8B-B14F-4D97-AF65-F5344CB8AC3E}">
-        <p14:creationId xmlns:p14="http://schemas.microsoft.com/office/powerpoint/2010/main" val="3224686526"/>
-      </p:ext>
-    </p:extLst>
   </p:cSld>
   <p:clrMapOvr>
     <a:masterClrMapping/>
@@ -1458,7 +1423,6 @@
                 <a:latin typeface="Arial"/>
                 <a:ea typeface="+mn-ea"/>
               </a:rPr>
-              <a:t>7</a:t>
             </a:fld>
             <a:endParaRPr lang="es-ES" sz="1200" b="0" strike="noStrike" spc="-1">
               <a:latin typeface="Times New Roman"/>
@@ -1467,11 +1431,6 @@
         </p:txBody>
       </p:sp>
     </p:spTree>
-    <p:extLst>
-      <p:ext uri="{BB962C8B-B14F-4D97-AF65-F5344CB8AC3E}">
-        <p14:creationId xmlns:p14="http://schemas.microsoft.com/office/powerpoint/2010/main" val="3962637111"/>
-      </p:ext>
-    </p:extLst>
   </p:cSld>
   <p:clrMapOvr>
     <a:masterClrMapping/>
@@ -1585,7 +1544,6 @@
                 <a:latin typeface="Arial"/>
                 <a:ea typeface="+mn-ea"/>
               </a:rPr>
-              <a:t>8</a:t>
             </a:fld>
             <a:endParaRPr lang="es-ES" sz="1200" b="0" strike="noStrike" spc="-1">
               <a:latin typeface="Times New Roman"/>
@@ -1594,11 +1552,6 @@
         </p:txBody>
       </p:sp>
     </p:spTree>
-    <p:extLst>
-      <p:ext uri="{BB962C8B-B14F-4D97-AF65-F5344CB8AC3E}">
-        <p14:creationId xmlns:p14="http://schemas.microsoft.com/office/powerpoint/2010/main" val="2310100210"/>
-      </p:ext>
-    </p:extLst>
   </p:cSld>
   <p:clrMapOvr>
     <a:masterClrMapping/>
@@ -1712,7 +1665,6 @@
                 <a:latin typeface="Arial"/>
                 <a:ea typeface="+mn-ea"/>
               </a:rPr>
-              <a:t>9</a:t>
             </a:fld>
             <a:endParaRPr lang="es-ES" sz="1200" b="0" strike="noStrike" spc="-1">
               <a:latin typeface="Times New Roman"/>
@@ -1721,11 +1673,6 @@
         </p:txBody>
       </p:sp>
     </p:spTree>
-    <p:extLst>
-      <p:ext uri="{BB962C8B-B14F-4D97-AF65-F5344CB8AC3E}">
-        <p14:creationId xmlns:p14="http://schemas.microsoft.com/office/powerpoint/2010/main" val="435704541"/>
-      </p:ext>
-    </p:extLst>
   </p:cSld>
   <p:clrMapOvr>
     <a:masterClrMapping/>
@@ -1839,7 +1786,6 @@
                 <a:latin typeface="Arial"/>
                 <a:ea typeface="+mn-ea"/>
               </a:rPr>
-              <a:t>10</a:t>
             </a:fld>
             <a:endParaRPr lang="es-ES" sz="1200" b="0" strike="noStrike" spc="-1">
               <a:latin typeface="Times New Roman"/>
@@ -1848,11 +1794,6 @@
         </p:txBody>
       </p:sp>
     </p:spTree>
-    <p:extLst>
-      <p:ext uri="{BB962C8B-B14F-4D97-AF65-F5344CB8AC3E}">
-        <p14:creationId xmlns:p14="http://schemas.microsoft.com/office/powerpoint/2010/main" val="3898891920"/>
-      </p:ext>
-    </p:extLst>
   </p:cSld>
   <p:clrMapOvr>
     <a:masterClrMapping/>
@@ -3856,7 +3797,6 @@
                 </a:solidFill>
                 <a:latin typeface="Arial"/>
               </a:rPr>
-              <a:t>‹Nº›</a:t>
             </a:fld>
             <a:endParaRPr lang="es-ES" sz="1400" b="0" strike="noStrike" spc="-1">
               <a:latin typeface="Times New Roman"/>
@@ -3898,6 +3838,12 @@
               </a:rPr>
               <a:t>Click to edit the title text format</a:t>
             </a:r>
+            <a:endParaRPr lang="es-ES" sz="4400" b="0" strike="noStrike" spc="-1">
+              <a:solidFill>
+                <a:srgbClr val="000000"/>
+              </a:solidFill>
+              <a:latin typeface="Arial"/>
+            </a:endParaRPr>
           </a:p>
         </p:txBody>
       </p:sp>
@@ -3926,15 +3872,15 @@
           </a:bodyPr>
           <a:lstStyle/>
           <a:p>
-            <a:pPr marL="432000" indent="-324000">
+            <a:pPr marL="431800" indent="-323850">
               <a:spcBef>
-                <a:spcPts val="1417"/>
+                <a:spcPts val="1415"/>
               </a:spcBef>
               <a:buClr>
                 <a:srgbClr val="000000"/>
               </a:buClr>
               <a:buSzPct val="45000"/>
-              <a:buFont typeface="Wingdings" charset="2"/>
+              <a:buFont typeface="Wingdings" panose="05000000000000000000" pitchFamily="2" charset="2"/>
               <a:buChar char=""/>
             </a:pPr>
             <a:r>
@@ -3946,11 +3892,17 @@
               </a:rPr>
               <a:t>Click to edit the outline text format</a:t>
             </a:r>
-          </a:p>
-          <a:p>
-            <a:pPr marL="864000" lvl="1" indent="-324000">
+            <a:endParaRPr lang="es-ES" sz="3200" b="0" strike="noStrike" spc="-1">
+              <a:solidFill>
+                <a:srgbClr val="000000"/>
+              </a:solidFill>
+              <a:latin typeface="Arial"/>
+            </a:endParaRPr>
+          </a:p>
+          <a:p>
+            <a:pPr marL="864235" lvl="1" indent="-323850">
               <a:spcBef>
-                <a:spcPts val="1134"/>
+                <a:spcPts val="1135"/>
               </a:spcBef>
               <a:buClr>
                 <a:srgbClr val="000000"/>
@@ -3968,9 +3920,15 @@
               </a:rPr>
               <a:t>Second Outline Level</a:t>
             </a:r>
-          </a:p>
-          <a:p>
-            <a:pPr marL="1296000" lvl="2" indent="-288000">
+            <a:endParaRPr lang="es-ES" sz="2400" b="0" strike="noStrike" spc="-1">
+              <a:solidFill>
+                <a:srgbClr val="000000"/>
+              </a:solidFill>
+              <a:latin typeface="Arial"/>
+            </a:endParaRPr>
+          </a:p>
+          <a:p>
+            <a:pPr marL="1296035" lvl="2" indent="-288290">
               <a:spcBef>
                 <a:spcPts val="850"/>
               </a:spcBef>
@@ -3978,7 +3936,7 @@
                 <a:srgbClr val="000000"/>
               </a:buClr>
               <a:buSzPct val="45000"/>
-              <a:buFont typeface="Wingdings" charset="2"/>
+              <a:buFont typeface="Wingdings" panose="05000000000000000000" pitchFamily="2" charset="2"/>
               <a:buChar char=""/>
             </a:pPr>
             <a:r>
@@ -3990,11 +3948,17 @@
               </a:rPr>
               <a:t>Third Outline Level</a:t>
             </a:r>
-          </a:p>
-          <a:p>
-            <a:pPr marL="1728000" lvl="3" indent="-216000">
+            <a:endParaRPr lang="es-ES" sz="2000" b="0" strike="noStrike" spc="-1">
+              <a:solidFill>
+                <a:srgbClr val="000000"/>
+              </a:solidFill>
+              <a:latin typeface="Arial"/>
+            </a:endParaRPr>
+          </a:p>
+          <a:p>
+            <a:pPr marL="1727835" lvl="3" indent="-215900">
               <a:spcBef>
-                <a:spcPts val="567"/>
+                <a:spcPts val="565"/>
               </a:spcBef>
               <a:buClr>
                 <a:srgbClr val="000000"/>
@@ -4012,17 +3976,23 @@
               </a:rPr>
               <a:t>Fourth Outline Level</a:t>
             </a:r>
-          </a:p>
-          <a:p>
-            <a:pPr marL="2160000" lvl="4" indent="-216000">
+            <a:endParaRPr lang="es-ES" sz="2000" b="0" strike="noStrike" spc="-1">
+              <a:solidFill>
+                <a:srgbClr val="000000"/>
+              </a:solidFill>
+              <a:latin typeface="Arial"/>
+            </a:endParaRPr>
+          </a:p>
+          <a:p>
+            <a:pPr marL="2160270" lvl="4" indent="-215900">
               <a:spcBef>
-                <a:spcPts val="283"/>
+                <a:spcPts val="285"/>
               </a:spcBef>
               <a:buClr>
                 <a:srgbClr val="000000"/>
               </a:buClr>
               <a:buSzPct val="45000"/>
-              <a:buFont typeface="Wingdings" charset="2"/>
+              <a:buFont typeface="Wingdings" panose="05000000000000000000" pitchFamily="2" charset="2"/>
               <a:buChar char=""/>
             </a:pPr>
             <a:r>
@@ -4034,17 +4004,23 @@
               </a:rPr>
               <a:t>Fifth Outline Level</a:t>
             </a:r>
-          </a:p>
-          <a:p>
-            <a:pPr marL="2592000" lvl="5" indent="-216000">
+            <a:endParaRPr lang="es-ES" sz="2000" b="0" strike="noStrike" spc="-1">
+              <a:solidFill>
+                <a:srgbClr val="000000"/>
+              </a:solidFill>
+              <a:latin typeface="Arial"/>
+            </a:endParaRPr>
+          </a:p>
+          <a:p>
+            <a:pPr marL="2592070" lvl="5" indent="-215900">
               <a:spcBef>
-                <a:spcPts val="283"/>
+                <a:spcPts val="285"/>
               </a:spcBef>
               <a:buClr>
                 <a:srgbClr val="000000"/>
               </a:buClr>
               <a:buSzPct val="45000"/>
-              <a:buFont typeface="Wingdings" charset="2"/>
+              <a:buFont typeface="Wingdings" panose="05000000000000000000" pitchFamily="2" charset="2"/>
               <a:buChar char=""/>
             </a:pPr>
             <a:r>
@@ -4056,17 +4032,23 @@
               </a:rPr>
               <a:t>Sixth Outline Level</a:t>
             </a:r>
-          </a:p>
-          <a:p>
-            <a:pPr marL="3024000" lvl="6" indent="-216000">
+            <a:endParaRPr lang="es-ES" sz="2000" b="0" strike="noStrike" spc="-1">
+              <a:solidFill>
+                <a:srgbClr val="000000"/>
+              </a:solidFill>
+              <a:latin typeface="Arial"/>
+            </a:endParaRPr>
+          </a:p>
+          <a:p>
+            <a:pPr marL="3023870" lvl="6" indent="-215900">
               <a:spcBef>
-                <a:spcPts val="283"/>
+                <a:spcPts val="285"/>
               </a:spcBef>
               <a:buClr>
                 <a:srgbClr val="000000"/>
               </a:buClr>
               <a:buSzPct val="45000"/>
-              <a:buFont typeface="Wingdings" charset="2"/>
+              <a:buFont typeface="Wingdings" panose="05000000000000000000" pitchFamily="2" charset="2"/>
               <a:buChar char=""/>
             </a:pPr>
             <a:r>
@@ -4078,6 +4060,12 @@
               </a:rPr>
               <a:t>Seventh Outline Level</a:t>
             </a:r>
+            <a:endParaRPr lang="es-ES" sz="2000" b="0" strike="noStrike" spc="-1">
+              <a:solidFill>
+                <a:srgbClr val="000000"/>
+              </a:solidFill>
+              <a:latin typeface="Arial"/>
+            </a:endParaRPr>
           </a:p>
         </p:txBody>
       </p:sp>
@@ -4126,7 +4114,7 @@
         <a:spcBef>
           <a:spcPts val="1000"/>
         </a:spcBef>
-        <a:buFont typeface="Arial" panose="020B0604020202020204" pitchFamily="34" charset="0"/>
+        <a:buFont typeface="Arial" panose="02080604020202020204" pitchFamily="34" charset="0"/>
         <a:buChar char="•"/>
         <a:defRPr sz="2800" kern="1200">
           <a:solidFill>
@@ -4144,7 +4132,7 @@
         <a:spcBef>
           <a:spcPts val="500"/>
         </a:spcBef>
-        <a:buFont typeface="Arial" panose="020B0604020202020204" pitchFamily="34" charset="0"/>
+        <a:buFont typeface="Arial" panose="02080604020202020204" pitchFamily="34" charset="0"/>
         <a:buChar char="•"/>
         <a:defRPr sz="2400" kern="1200">
           <a:solidFill>
@@ -4162,7 +4150,7 @@
         <a:spcBef>
           <a:spcPts val="500"/>
         </a:spcBef>
-        <a:buFont typeface="Arial" panose="020B0604020202020204" pitchFamily="34" charset="0"/>
+        <a:buFont typeface="Arial" panose="02080604020202020204" pitchFamily="34" charset="0"/>
         <a:buChar char="•"/>
         <a:defRPr sz="2000" kern="1200">
           <a:solidFill>
@@ -4180,7 +4168,7 @@
         <a:spcBef>
           <a:spcPts val="500"/>
         </a:spcBef>
-        <a:buFont typeface="Arial" panose="020B0604020202020204" pitchFamily="34" charset="0"/>
+        <a:buFont typeface="Arial" panose="02080604020202020204" pitchFamily="34" charset="0"/>
         <a:buChar char="•"/>
         <a:defRPr sz="1800" kern="1200">
           <a:solidFill>
@@ -4198,7 +4186,7 @@
         <a:spcBef>
           <a:spcPts val="500"/>
         </a:spcBef>
-        <a:buFont typeface="Arial" panose="020B0604020202020204" pitchFamily="34" charset="0"/>
+        <a:buFont typeface="Arial" panose="02080604020202020204" pitchFamily="34" charset="0"/>
         <a:buChar char="•"/>
         <a:defRPr sz="1800" kern="1200">
           <a:solidFill>
@@ -4216,7 +4204,7 @@
         <a:spcBef>
           <a:spcPts val="500"/>
         </a:spcBef>
-        <a:buFont typeface="Arial" panose="020B0604020202020204" pitchFamily="34" charset="0"/>
+        <a:buFont typeface="Arial" panose="02080604020202020204" pitchFamily="34" charset="0"/>
         <a:buChar char="•"/>
         <a:defRPr sz="1800" kern="1200">
           <a:solidFill>
@@ -4234,7 +4222,7 @@
         <a:spcBef>
           <a:spcPts val="500"/>
         </a:spcBef>
-        <a:buFont typeface="Arial" panose="020B0604020202020204" pitchFamily="34" charset="0"/>
+        <a:buFont typeface="Arial" panose="02080604020202020204" pitchFamily="34" charset="0"/>
         <a:buChar char="•"/>
         <a:defRPr sz="1800" kern="1200">
           <a:solidFill>
@@ -4252,7 +4240,7 @@
         <a:spcBef>
           <a:spcPts val="500"/>
         </a:spcBef>
-        <a:buFont typeface="Arial" panose="020B0604020202020204" pitchFamily="34" charset="0"/>
+        <a:buFont typeface="Arial" panose="02080604020202020204" pitchFamily="34" charset="0"/>
         <a:buChar char="•"/>
         <a:defRPr sz="1800" kern="1200">
           <a:solidFill>
@@ -4270,7 +4258,7 @@
         <a:spcBef>
           <a:spcPts val="500"/>
         </a:spcBef>
-        <a:buFont typeface="Arial" panose="020B0604020202020204" pitchFamily="34" charset="0"/>
+        <a:buFont typeface="Arial" panose="02080604020202020204" pitchFamily="34" charset="0"/>
         <a:buChar char="•"/>
         <a:defRPr sz="1800" kern="1200">
           <a:solidFill>
@@ -4405,8 +4393,10 @@
           <p:nvPr/>
         </p:nvPicPr>
         <p:blipFill>
-          <a:blip r:embed="rId2"/>
-          <a:stretch/>
+          <a:blip r:embed="rId1"/>
+          <a:stretch>
+            <a:fillRect/>
+          </a:stretch>
         </p:blipFill>
         <p:spPr>
           <a:xfrm>
@@ -4610,7 +4600,7 @@
                   <a:spcPct val="100000"/>
                 </a:lnSpc>
                 <a:spcBef>
-                  <a:spcPts val="901"/>
+                  <a:spcPts val="900"/>
                 </a:spcBef>
               </a:pPr>
               <a:r>
@@ -4808,27 +4798,7 @@
   <p:timing>
     <p:tnLst>
       <p:par>
-        <p:cTn id="1" dur="indefinite" restart="never" nodeType="tmRoot">
-          <p:childTnLst>
-            <p:seq>
-              <p:cTn id="2" dur="indefinite" nodeType="mainSeq"/>
-              <p:prevCondLst>
-                <p:cond evt="onPrev" delay="0">
-                  <p:tgtEl>
-                    <p:sldTgt/>
-                  </p:tgtEl>
-                </p:cond>
-              </p:prevCondLst>
-              <p:nextCondLst>
-                <p:cond evt="onNext" delay="0">
-                  <p:tgtEl>
-                    <p:sldTgt/>
-                  </p:tgtEl>
-                </p:cond>
-              </p:nextCondLst>
-            </p:seq>
-          </p:childTnLst>
-        </p:cTn>
+        <p:cTn id="1" dur="indefinite" restart="never" nodeType="tmRoot"/>
       </p:par>
     </p:tnLst>
   </p:timing>
@@ -4956,25 +4926,26 @@
       </p:sp>
       <p:pic>
         <p:nvPicPr>
-          <p:cNvPr id="87" name="Imagen 86"/>
-          <p:cNvPicPr/>
+          <p:cNvPr id="2" name="Picture 1"/>
+          <p:cNvPicPr>
+            <a:picLocks noChangeAspect="1"/>
+          </p:cNvPicPr>
           <p:nvPr/>
         </p:nvPicPr>
         <p:blipFill>
-          <a:blip r:embed="rId3"/>
-          <a:stretch/>
+          <a:blip r:embed="rId1"/>
+          <a:stretch>
+            <a:fillRect/>
+          </a:stretch>
         </p:blipFill>
         <p:spPr>
           <a:xfrm>
-            <a:off x="1978200" y="1396800"/>
-            <a:ext cx="5257440" cy="4219200"/>
-          </a:xfrm>
-          <a:prstGeom prst="rect">
-            <a:avLst/>
-          </a:prstGeom>
-          <a:ln>
-            <a:noFill/>
-          </a:ln>
+            <a:off x="1811020" y="1867535"/>
+            <a:ext cx="6314440" cy="4571365"/>
+          </a:xfrm>
+          <a:prstGeom prst="rect">
+            <a:avLst/>
+          </a:prstGeom>
         </p:spPr>
       </p:pic>
     </p:spTree>
@@ -4985,27 +4956,7 @@
   <p:timing>
     <p:tnLst>
       <p:par>
-        <p:cTn id="1" dur="indefinite" restart="never" nodeType="tmRoot">
-          <p:childTnLst>
-            <p:seq>
-              <p:cTn id="2" dur="indefinite" nodeType="mainSeq"/>
-              <p:prevCondLst>
-                <p:cond evt="onPrev" delay="0">
-                  <p:tgtEl>
-                    <p:sldTgt/>
-                  </p:tgtEl>
-                </p:cond>
-              </p:prevCondLst>
-              <p:nextCondLst>
-                <p:cond evt="onNext" delay="0">
-                  <p:tgtEl>
-                    <p:sldTgt/>
-                  </p:tgtEl>
-                </p:cond>
-              </p:nextCondLst>
-            </p:seq>
-          </p:childTnLst>
-        </p:cTn>
+        <p:cTn id="1" dur="indefinite" restart="never" nodeType="tmRoot"/>
       </p:par>
     </p:tnLst>
   </p:timing>
@@ -5095,7 +5046,7 @@
           <p:nvPr/>
         </p:nvPicPr>
         <p:blipFill>
-          <a:blip r:embed="rId3">
+          <a:blip r:embed="rId1">
             <a:extLst>
               <a:ext uri="{28A0092B-C50C-407E-A947-70E740481C1C}">
                 <a14:useLocalDpi xmlns:a14="http://schemas.microsoft.com/office/drawing/2010/main" val="0"/>
@@ -5124,27 +5075,7 @@
   <p:timing>
     <p:tnLst>
       <p:par>
-        <p:cTn id="1" dur="indefinite" restart="never" nodeType="tmRoot">
-          <p:childTnLst>
-            <p:seq>
-              <p:cTn id="2" dur="indefinite" nodeType="mainSeq"/>
-              <p:prevCondLst>
-                <p:cond evt="onPrev" delay="0">
-                  <p:tgtEl>
-                    <p:sldTgt/>
-                  </p:tgtEl>
-                </p:cond>
-              </p:prevCondLst>
-              <p:nextCondLst>
-                <p:cond evt="onNext" delay="0">
-                  <p:tgtEl>
-                    <p:sldTgt/>
-                  </p:tgtEl>
-                </p:cond>
-              </p:nextCondLst>
-            </p:seq>
-          </p:childTnLst>
-        </p:cTn>
+        <p:cTn id="1" dur="indefinite" restart="never" nodeType="tmRoot"/>
       </p:par>
     </p:tnLst>
   </p:timing>
@@ -5234,7 +5165,7 @@
           <p:nvPr/>
         </p:nvPicPr>
         <p:blipFill>
-          <a:blip r:embed="rId3">
+          <a:blip r:embed="rId1">
             <a:extLst>
               <a:ext uri="{28A0092B-C50C-407E-A947-70E740481C1C}">
                 <a14:useLocalDpi xmlns:a14="http://schemas.microsoft.com/office/drawing/2010/main" val="0"/>
@@ -5263,27 +5194,7 @@
   <p:timing>
     <p:tnLst>
       <p:par>
-        <p:cTn id="1" dur="indefinite" restart="never" nodeType="tmRoot">
-          <p:childTnLst>
-            <p:seq>
-              <p:cTn id="2" dur="indefinite" nodeType="mainSeq"/>
-              <p:prevCondLst>
-                <p:cond evt="onPrev" delay="0">
-                  <p:tgtEl>
-                    <p:sldTgt/>
-                  </p:tgtEl>
-                </p:cond>
-              </p:prevCondLst>
-              <p:nextCondLst>
-                <p:cond evt="onNext" delay="0">
-                  <p:tgtEl>
-                    <p:sldTgt/>
-                  </p:tgtEl>
-                </p:cond>
-              </p:nextCondLst>
-            </p:seq>
-          </p:childTnLst>
-        </p:cTn>
+        <p:cTn id="1" dur="indefinite" restart="never" nodeType="tmRoot"/>
       </p:par>
     </p:tnLst>
   </p:timing>
@@ -5314,8 +5225,10 @@
           <p:nvPr/>
         </p:nvPicPr>
         <p:blipFill>
-          <a:blip r:embed="rId2"/>
-          <a:stretch/>
+          <a:blip r:embed="rId1"/>
+          <a:stretch>
+            <a:fillRect/>
+          </a:stretch>
         </p:blipFill>
         <p:spPr>
           <a:xfrm>
@@ -5439,8 +5352,7 @@
               </a:pathLst>
             </a:custGeom>
             <a:blipFill rotWithShape="0">
-              <a:blip r:embed="rId3"/>
-              <a:tile/>
+              <a:blip r:embed="rId2"/>
             </a:blipFill>
             <a:ln>
               <a:noFill/>
@@ -5497,8 +5409,7 @@
               </a:pathLst>
             </a:custGeom>
             <a:blipFill rotWithShape="0">
-              <a:blip r:embed="rId3"/>
-              <a:tile/>
+              <a:blip r:embed="rId2"/>
             </a:blipFill>
             <a:ln>
               <a:noFill/>
@@ -5555,8 +5466,7 @@
               </a:pathLst>
             </a:custGeom>
             <a:blipFill rotWithShape="0">
-              <a:blip r:embed="rId3"/>
-              <a:tile/>
+              <a:blip r:embed="rId2"/>
             </a:blipFill>
             <a:ln>
               <a:noFill/>
@@ -5613,8 +5523,7 @@
               </a:pathLst>
             </a:custGeom>
             <a:blipFill rotWithShape="0">
-              <a:blip r:embed="rId3"/>
-              <a:tile/>
+              <a:blip r:embed="rId2"/>
             </a:blipFill>
             <a:ln>
               <a:noFill/>
@@ -5671,8 +5580,7 @@
               </a:pathLst>
             </a:custGeom>
             <a:blipFill rotWithShape="0">
-              <a:blip r:embed="rId3"/>
-              <a:tile/>
+              <a:blip r:embed="rId2"/>
             </a:blipFill>
             <a:ln>
               <a:noFill/>
@@ -5729,8 +5637,7 @@
               </a:pathLst>
             </a:custGeom>
             <a:blipFill rotWithShape="0">
-              <a:blip r:embed="rId3"/>
-              <a:tile/>
+              <a:blip r:embed="rId2"/>
             </a:blipFill>
             <a:ln>
               <a:noFill/>
@@ -5815,27 +5722,7 @@
   <p:timing>
     <p:tnLst>
       <p:par>
-        <p:cTn id="1" dur="indefinite" restart="never" nodeType="tmRoot">
-          <p:childTnLst>
-            <p:seq>
-              <p:cTn id="2" dur="indefinite" nodeType="mainSeq"/>
-              <p:prevCondLst>
-                <p:cond evt="onPrev" delay="0">
-                  <p:tgtEl>
-                    <p:sldTgt/>
-                  </p:tgtEl>
-                </p:cond>
-              </p:prevCondLst>
-              <p:nextCondLst>
-                <p:cond evt="onNext" delay="0">
-                  <p:tgtEl>
-                    <p:sldTgt/>
-                  </p:tgtEl>
-                </p:cond>
-              </p:nextCondLst>
-            </p:seq>
-          </p:childTnLst>
-        </p:cTn>
+        <p:cTn id="1" dur="indefinite" restart="never" nodeType="tmRoot"/>
       </p:par>
     </p:tnLst>
   </p:timing>
@@ -5911,8 +5798,7 @@
               </a:pathLst>
             </a:custGeom>
             <a:blipFill rotWithShape="0">
-              <a:blip r:embed="rId3"/>
-              <a:tile/>
+              <a:blip r:embed="rId1"/>
             </a:blipFill>
             <a:ln>
               <a:noFill/>
@@ -5969,8 +5855,7 @@
               </a:pathLst>
             </a:custGeom>
             <a:blipFill rotWithShape="0">
-              <a:blip r:embed="rId3"/>
-              <a:tile/>
+              <a:blip r:embed="rId1"/>
             </a:blipFill>
             <a:ln>
               <a:noFill/>
@@ -6027,8 +5912,7 @@
               </a:pathLst>
             </a:custGeom>
             <a:blipFill rotWithShape="0">
-              <a:blip r:embed="rId3"/>
-              <a:tile/>
+              <a:blip r:embed="rId1"/>
             </a:blipFill>
             <a:ln>
               <a:noFill/>
@@ -6085,8 +5969,7 @@
               </a:pathLst>
             </a:custGeom>
             <a:blipFill rotWithShape="0">
-              <a:blip r:embed="rId3"/>
-              <a:tile/>
+              <a:blip r:embed="rId1"/>
             </a:blipFill>
             <a:ln>
               <a:noFill/>
@@ -6143,8 +6026,7 @@
               </a:pathLst>
             </a:custGeom>
             <a:blipFill rotWithShape="0">
-              <a:blip r:embed="rId3"/>
-              <a:tile/>
+              <a:blip r:embed="rId1"/>
             </a:blipFill>
             <a:ln>
               <a:noFill/>
@@ -6201,8 +6083,7 @@
               </a:pathLst>
             </a:custGeom>
             <a:blipFill rotWithShape="0">
-              <a:blip r:embed="rId3"/>
-              <a:tile/>
+              <a:blip r:embed="rId1"/>
             </a:blipFill>
             <a:ln>
               <a:noFill/>
@@ -6304,12 +6185,12 @@
           </a:bodyPr>
           <a:lstStyle/>
           <a:p>
-            <a:pPr marL="441360" indent="-285480">
+            <a:pPr marL="441325" indent="-285750">
               <a:lnSpc>
                 <a:spcPct val="200000"/>
               </a:lnSpc>
               <a:spcBef>
-                <a:spcPts val="1001"/>
+                <a:spcPts val="1000"/>
               </a:spcBef>
               <a:buClr>
                 <a:srgbClr val="BBE0E3"/>
@@ -6326,14 +6207,20 @@
               </a:rPr>
               <a:t>Reunión de Planificación.</a:t>
             </a:r>
-          </a:p>
-          <a:p>
-            <a:pPr marL="441360" indent="-285480">
+            <a:endParaRPr lang="es-ES" sz="2000" b="0" strike="noStrike" spc="-1" dirty="0" smtClean="0">
+              <a:solidFill>
+                <a:srgbClr val="000000"/>
+              </a:solidFill>
+              <a:latin typeface="Arial"/>
+            </a:endParaRPr>
+          </a:p>
+          <a:p>
+            <a:pPr marL="441325" indent="-285750">
               <a:lnSpc>
                 <a:spcPct val="200000"/>
               </a:lnSpc>
               <a:spcBef>
-                <a:spcPts val="1001"/>
+                <a:spcPts val="1000"/>
               </a:spcBef>
               <a:buClr>
                 <a:srgbClr val="BBE0E3"/>
@@ -6376,12 +6263,12 @@
             </a:endParaRPr>
           </a:p>
           <a:p>
-            <a:pPr marL="441360" indent="-285480">
+            <a:pPr marL="441325" indent="-285750">
               <a:lnSpc>
                 <a:spcPct val="200000"/>
               </a:lnSpc>
               <a:spcBef>
-                <a:spcPts val="1001"/>
+                <a:spcPts val="1000"/>
               </a:spcBef>
               <a:buClr>
                 <a:srgbClr val="BBE0E3"/>
@@ -6429,12 +6316,12 @@
             </a:endParaRPr>
           </a:p>
           <a:p>
-            <a:pPr marL="441360" indent="-285480">
+            <a:pPr marL="441325" indent="-285750">
               <a:lnSpc>
                 <a:spcPct val="200000"/>
               </a:lnSpc>
               <a:spcBef>
-                <a:spcPts val="1001"/>
+                <a:spcPts val="1000"/>
               </a:spcBef>
               <a:buClr>
                 <a:srgbClr val="BBE0E3"/>
@@ -6451,14 +6338,20 @@
               </a:rPr>
               <a:t>Interfaz de Usuario + Visor Gis insertado.</a:t>
             </a:r>
-          </a:p>
-          <a:p>
-            <a:pPr marL="441360" indent="-285480">
+            <a:endParaRPr lang="es-ES" sz="2000" b="0" strike="noStrike" spc="-1" dirty="0">
+              <a:solidFill>
+                <a:srgbClr val="000000"/>
+              </a:solidFill>
+              <a:latin typeface="Arial"/>
+            </a:endParaRPr>
+          </a:p>
+          <a:p>
+            <a:pPr marL="441325" indent="-285750">
               <a:lnSpc>
                 <a:spcPct val="200000"/>
               </a:lnSpc>
               <a:spcBef>
-                <a:spcPts val="1001"/>
+                <a:spcPts val="1000"/>
               </a:spcBef>
               <a:buClr>
                 <a:srgbClr val="BBE0E3"/>
@@ -6475,14 +6368,20 @@
               </a:rPr>
               <a:t>Diagrama de clases de diseño del sprint</a:t>
             </a:r>
-          </a:p>
-          <a:p>
-            <a:pPr marL="441360" indent="-285480">
+            <a:endParaRPr lang="es-ES" sz="2000" b="0" strike="noStrike" spc="-1" dirty="0">
+              <a:solidFill>
+                <a:srgbClr val="000000"/>
+              </a:solidFill>
+              <a:latin typeface="Arial"/>
+            </a:endParaRPr>
+          </a:p>
+          <a:p>
+            <a:pPr marL="441325" indent="-285750">
               <a:lnSpc>
                 <a:spcPct val="200000"/>
               </a:lnSpc>
               <a:spcBef>
-                <a:spcPts val="1001"/>
+                <a:spcPts val="1000"/>
               </a:spcBef>
               <a:buClr>
                 <a:srgbClr val="BBE0E3"/>
@@ -6508,6 +6407,12 @@
               </a:rPr>
               <a:t>de Secuencia de 2 CU.</a:t>
             </a:r>
+            <a:endParaRPr lang="es-ES" sz="2000" b="0" strike="noStrike" spc="-1" dirty="0">
+              <a:solidFill>
+                <a:srgbClr val="000000"/>
+              </a:solidFill>
+              <a:latin typeface="Arial"/>
+            </a:endParaRPr>
           </a:p>
           <a:p>
             <a:pPr>
@@ -6515,7 +6420,7 @@
                 <a:spcPct val="200000"/>
               </a:lnSpc>
               <a:spcBef>
-                <a:spcPts val="1001"/>
+                <a:spcPts val="1000"/>
               </a:spcBef>
             </a:pPr>
             <a:endParaRPr lang="es-ES" sz="2000" b="0" strike="noStrike" spc="-1" dirty="0">
@@ -6531,7 +6436,7 @@
                 <a:spcPct val="200000"/>
               </a:lnSpc>
               <a:spcBef>
-                <a:spcPts val="1001"/>
+                <a:spcPts val="1000"/>
               </a:spcBef>
             </a:pPr>
             <a:endParaRPr lang="es-ES" sz="2000" b="0" strike="noStrike" spc="-1" dirty="0">
@@ -6547,7 +6452,7 @@
                 <a:spcPct val="200000"/>
               </a:lnSpc>
               <a:spcBef>
-                <a:spcPts val="1001"/>
+                <a:spcPts val="1000"/>
               </a:spcBef>
             </a:pPr>
             <a:endParaRPr lang="es-ES" sz="2000" b="0" strike="noStrike" spc="-1" dirty="0">
@@ -6623,8 +6528,10 @@
           <p:nvPr/>
         </p:nvPicPr>
         <p:blipFill>
-          <a:blip r:embed="rId4"/>
-          <a:stretch/>
+          <a:blip r:embed="rId2"/>
+          <a:stretch>
+            <a:fillRect/>
+          </a:stretch>
         </p:blipFill>
         <p:spPr>
           <a:xfrm>
@@ -6647,27 +6554,7 @@
   <p:timing>
     <p:tnLst>
       <p:par>
-        <p:cTn id="1" dur="indefinite" restart="never" nodeType="tmRoot">
-          <p:childTnLst>
-            <p:seq>
-              <p:cTn id="2" dur="indefinite" nodeType="mainSeq"/>
-              <p:prevCondLst>
-                <p:cond evt="onPrev" delay="0">
-                  <p:tgtEl>
-                    <p:sldTgt/>
-                  </p:tgtEl>
-                </p:cond>
-              </p:prevCondLst>
-              <p:nextCondLst>
-                <p:cond evt="onNext" delay="0">
-                  <p:tgtEl>
-                    <p:sldTgt/>
-                  </p:tgtEl>
-                </p:cond>
-              </p:nextCondLst>
-            </p:seq>
-          </p:childTnLst>
-        </p:cTn>
+        <p:cTn id="1" dur="indefinite" restart="never" nodeType="tmRoot"/>
       </p:par>
     </p:tnLst>
   </p:timing>
@@ -6772,29 +6659,6 @@
       </p:sp>
       <p:pic>
         <p:nvPicPr>
-          <p:cNvPr id="72" name="Imagen 71"/>
-          <p:cNvPicPr/>
-          <p:nvPr/>
-        </p:nvPicPr>
-        <p:blipFill>
-          <a:blip r:embed="rId3"/>
-          <a:stretch/>
-        </p:blipFill>
-        <p:spPr>
-          <a:xfrm>
-            <a:off x="361658" y="3799925"/>
-            <a:ext cx="8667360" cy="466200"/>
-          </a:xfrm>
-          <a:prstGeom prst="rect">
-            <a:avLst/>
-          </a:prstGeom>
-          <a:ln>
-            <a:noFill/>
-          </a:ln>
-        </p:spPr>
-      </p:pic>
-      <p:pic>
-        <p:nvPicPr>
           <p:cNvPr id="2" name="Imagen 1"/>
           <p:cNvPicPr>
             <a:picLocks noChangeAspect="1"/>
@@ -6802,7 +6666,7 @@
           <p:nvPr/>
         </p:nvPicPr>
         <p:blipFill>
-          <a:blip r:embed="rId4"/>
+          <a:blip r:embed="rId1"/>
           <a:stretch>
             <a:fillRect/>
           </a:stretch>
@@ -6811,6 +6675,30 @@
           <a:xfrm>
             <a:off x="361658" y="1448965"/>
             <a:ext cx="8467718" cy="1518169"/>
+          </a:xfrm>
+          <a:prstGeom prst="rect">
+            <a:avLst/>
+          </a:prstGeom>
+        </p:spPr>
+      </p:pic>
+      <p:pic>
+        <p:nvPicPr>
+          <p:cNvPr id="3" name="Picture 2"/>
+          <p:cNvPicPr>
+            <a:picLocks noChangeAspect="1"/>
+          </p:cNvPicPr>
+          <p:nvPr/>
+        </p:nvPicPr>
+        <p:blipFill>
+          <a:blip r:embed="rId2"/>
+          <a:stretch>
+            <a:fillRect/>
+          </a:stretch>
+        </p:blipFill>
+        <p:spPr>
+          <a:xfrm>
+            <a:off x="435610" y="3579495"/>
+            <a:ext cx="8435975" cy="1034415"/>
           </a:xfrm>
           <a:prstGeom prst="rect">
             <a:avLst/>
@@ -6825,27 +6713,7 @@
   <p:timing>
     <p:tnLst>
       <p:par>
-        <p:cTn id="1" dur="indefinite" restart="never" nodeType="tmRoot">
-          <p:childTnLst>
-            <p:seq>
-              <p:cTn id="2" dur="indefinite" nodeType="mainSeq"/>
-              <p:prevCondLst>
-                <p:cond evt="onPrev" delay="0">
-                  <p:tgtEl>
-                    <p:sldTgt/>
-                  </p:tgtEl>
-                </p:cond>
-              </p:prevCondLst>
-              <p:nextCondLst>
-                <p:cond evt="onNext" delay="0">
-                  <p:tgtEl>
-                    <p:sldTgt/>
-                  </p:tgtEl>
-                </p:cond>
-              </p:nextCondLst>
-            </p:seq>
-          </p:childTnLst>
-        </p:cTn>
+        <p:cTn id="1" dur="indefinite" restart="never" nodeType="tmRoot"/>
       </p:par>
     </p:tnLst>
   </p:timing>
@@ -6928,22 +6796,22 @@
       </p:sp>
       <p:pic>
         <p:nvPicPr>
-          <p:cNvPr id="3" name="Imagen 2"/>
+          <p:cNvPr id="2" name="Picture 1"/>
           <p:cNvPicPr>
             <a:picLocks noChangeAspect="1"/>
           </p:cNvPicPr>
           <p:nvPr/>
         </p:nvPicPr>
         <p:blipFill>
-          <a:blip r:embed="rId3"/>
+          <a:blip r:embed="rId1"/>
           <a:stretch>
             <a:fillRect/>
           </a:stretch>
         </p:blipFill>
         <p:spPr>
           <a:xfrm>
-            <a:off x="237239" y="1533349"/>
-            <a:ext cx="8766801" cy="5013350"/>
+            <a:off x="256540" y="1015365"/>
+            <a:ext cx="8833485" cy="4940935"/>
           </a:xfrm>
           <a:prstGeom prst="rect">
             <a:avLst/>
@@ -6951,11 +6819,6 @@
         </p:spPr>
       </p:pic>
     </p:spTree>
-    <p:extLst>
-      <p:ext uri="{BB962C8B-B14F-4D97-AF65-F5344CB8AC3E}">
-        <p14:creationId xmlns:p14="http://schemas.microsoft.com/office/powerpoint/2010/main" val="1426475499"/>
-      </p:ext>
-    </p:extLst>
   </p:cSld>
   <p:clrMapOvr>
     <a:masterClrMapping/>
@@ -6963,27 +6826,7 @@
   <p:timing>
     <p:tnLst>
       <p:par>
-        <p:cTn id="1" dur="indefinite" restart="never" nodeType="tmRoot">
-          <p:childTnLst>
-            <p:seq>
-              <p:cTn id="2" dur="indefinite" nodeType="mainSeq"/>
-              <p:prevCondLst>
-                <p:cond evt="onPrev" delay="0">
-                  <p:tgtEl>
-                    <p:sldTgt/>
-                  </p:tgtEl>
-                </p:cond>
-              </p:prevCondLst>
-              <p:nextCondLst>
-                <p:cond evt="onNext" delay="0">
-                  <p:tgtEl>
-                    <p:sldTgt/>
-                  </p:tgtEl>
-                </p:cond>
-              </p:nextCondLst>
-            </p:seq>
-          </p:childTnLst>
-        </p:cTn>
+        <p:cTn id="1" dur="indefinite" restart="never" nodeType="tmRoot"/>
       </p:par>
     </p:tnLst>
   </p:timing>
@@ -7116,8 +6959,10 @@
           <p:nvPr/>
         </p:nvPicPr>
         <p:blipFill>
-          <a:blip r:embed="rId3"/>
-          <a:stretch/>
+          <a:blip r:embed="rId1"/>
+          <a:stretch>
+            <a:fillRect/>
+          </a:stretch>
         </p:blipFill>
         <p:spPr>
           <a:xfrm>
@@ -7140,27 +6985,7 @@
   <p:timing>
     <p:tnLst>
       <p:par>
-        <p:cTn id="1" dur="indefinite" restart="never" nodeType="tmRoot">
-          <p:childTnLst>
-            <p:seq>
-              <p:cTn id="2" dur="indefinite" nodeType="mainSeq"/>
-              <p:prevCondLst>
-                <p:cond evt="onPrev" delay="0">
-                  <p:tgtEl>
-                    <p:sldTgt/>
-                  </p:tgtEl>
-                </p:cond>
-              </p:prevCondLst>
-              <p:nextCondLst>
-                <p:cond evt="onNext" delay="0">
-                  <p:tgtEl>
-                    <p:sldTgt/>
-                  </p:tgtEl>
-                </p:cond>
-              </p:nextCondLst>
-            </p:seq>
-          </p:childTnLst>
-        </p:cTn>
+        <p:cTn id="1" dur="indefinite" restart="never" nodeType="tmRoot"/>
       </p:par>
     </p:tnLst>
   </p:timing>
@@ -7248,8 +7073,10 @@
           <p:nvPr/>
         </p:nvPicPr>
         <p:blipFill>
-          <a:blip r:embed="rId3"/>
-          <a:stretch/>
+          <a:blip r:embed="rId1"/>
+          <a:stretch>
+            <a:fillRect/>
+          </a:stretch>
         </p:blipFill>
         <p:spPr>
           <a:xfrm>
@@ -7333,7 +7160,7 @@
           <a:p>
             <a:r>
               <a:rPr lang="es-ES" dirty="0" smtClean="0">
-                <a:hlinkClick r:id="rId4" action="ppaction://hlinkfile"/>
+                <a:hlinkClick r:id="rId2" action="ppaction://hlinkfile"/>
               </a:rPr>
               <a:t>Aplicación AGNEX</a:t>
             </a:r>
@@ -7349,27 +7176,7 @@
   <p:timing>
     <p:tnLst>
       <p:par>
-        <p:cTn id="1" dur="indefinite" restart="never" nodeType="tmRoot">
-          <p:childTnLst>
-            <p:seq>
-              <p:cTn id="2" dur="indefinite" nodeType="mainSeq"/>
-              <p:prevCondLst>
-                <p:cond evt="onPrev" delay="0">
-                  <p:tgtEl>
-                    <p:sldTgt/>
-                  </p:tgtEl>
-                </p:cond>
-              </p:prevCondLst>
-              <p:nextCondLst>
-                <p:cond evt="onNext" delay="0">
-                  <p:tgtEl>
-                    <p:sldTgt/>
-                  </p:tgtEl>
-                </p:cond>
-              </p:nextCondLst>
-            </p:seq>
-          </p:childTnLst>
-        </p:cTn>
+        <p:cTn id="1" dur="indefinite" restart="never" nodeType="tmRoot"/>
       </p:par>
     </p:tnLst>
   </p:timing>
@@ -7497,25 +7304,26 @@
       </p:sp>
       <p:pic>
         <p:nvPicPr>
-          <p:cNvPr id="78" name="Imagen 77"/>
-          <p:cNvPicPr/>
+          <p:cNvPr id="2" name="Picture 1"/>
+          <p:cNvPicPr>
+            <a:picLocks noChangeAspect="1"/>
+          </p:cNvPicPr>
           <p:nvPr/>
         </p:nvPicPr>
         <p:blipFill>
-          <a:blip r:embed="rId3"/>
-          <a:stretch/>
+          <a:blip r:embed="rId1"/>
+          <a:stretch>
+            <a:fillRect/>
+          </a:stretch>
         </p:blipFill>
         <p:spPr>
           <a:xfrm>
-            <a:off x="1992240" y="2122560"/>
-            <a:ext cx="5229000" cy="2266560"/>
-          </a:xfrm>
-          <a:prstGeom prst="rect">
-            <a:avLst/>
-          </a:prstGeom>
-          <a:ln>
-            <a:noFill/>
-          </a:ln>
+            <a:off x="1221740" y="1925320"/>
+            <a:ext cx="7078980" cy="3176905"/>
+          </a:xfrm>
+          <a:prstGeom prst="rect">
+            <a:avLst/>
+          </a:prstGeom>
         </p:spPr>
       </p:pic>
     </p:spTree>
@@ -7526,27 +7334,7 @@
   <p:timing>
     <p:tnLst>
       <p:par>
-        <p:cTn id="1" dur="indefinite" restart="never" nodeType="tmRoot">
-          <p:childTnLst>
-            <p:seq>
-              <p:cTn id="2" dur="indefinite" nodeType="mainSeq"/>
-              <p:prevCondLst>
-                <p:cond evt="onPrev" delay="0">
-                  <p:tgtEl>
-                    <p:sldTgt/>
-                  </p:tgtEl>
-                </p:cond>
-              </p:prevCondLst>
-              <p:nextCondLst>
-                <p:cond evt="onNext" delay="0">
-                  <p:tgtEl>
-                    <p:sldTgt/>
-                  </p:tgtEl>
-                </p:cond>
-              </p:nextCondLst>
-            </p:seq>
-          </p:childTnLst>
-        </p:cTn>
+        <p:cTn id="1" dur="indefinite" restart="never" nodeType="tmRoot"/>
       </p:par>
     </p:tnLst>
   </p:timing>
@@ -7679,8 +7467,10 @@
           <p:nvPr/>
         </p:nvPicPr>
         <p:blipFill>
-          <a:blip r:embed="rId3"/>
-          <a:stretch/>
+          <a:blip r:embed="rId1"/>
+          <a:stretch>
+            <a:fillRect/>
+          </a:stretch>
         </p:blipFill>
         <p:spPr>
           <a:xfrm>
@@ -7703,27 +7493,7 @@
   <p:timing>
     <p:tnLst>
       <p:par>
-        <p:cTn id="1" dur="indefinite" restart="never" nodeType="tmRoot">
-          <p:childTnLst>
-            <p:seq>
-              <p:cTn id="2" dur="indefinite" nodeType="mainSeq"/>
-              <p:prevCondLst>
-                <p:cond evt="onPrev" delay="0">
-                  <p:tgtEl>
-                    <p:sldTgt/>
-                  </p:tgtEl>
-                </p:cond>
-              </p:prevCondLst>
-              <p:nextCondLst>
-                <p:cond evt="onNext" delay="0">
-                  <p:tgtEl>
-                    <p:sldTgt/>
-                  </p:tgtEl>
-                </p:cond>
-              </p:nextCondLst>
-            </p:seq>
-          </p:childTnLst>
-        </p:cTn>
+        <p:cTn id="1" dur="indefinite" restart="never" nodeType="tmRoot"/>
       </p:par>
     </p:tnLst>
   </p:timing>
@@ -7856,8 +7626,10 @@
           <p:nvPr/>
         </p:nvPicPr>
         <p:blipFill>
-          <a:blip r:embed="rId3"/>
-          <a:stretch/>
+          <a:blip r:embed="rId1"/>
+          <a:stretch>
+            <a:fillRect/>
+          </a:stretch>
         </p:blipFill>
         <p:spPr>
           <a:xfrm>
@@ -7880,27 +7652,7 @@
   <p:timing>
     <p:tnLst>
       <p:par>
-        <p:cTn id="1" dur="indefinite" restart="never" nodeType="tmRoot">
-          <p:childTnLst>
-            <p:seq>
-              <p:cTn id="2" dur="indefinite" nodeType="mainSeq"/>
-              <p:prevCondLst>
-                <p:cond evt="onPrev" delay="0">
-                  <p:tgtEl>
-                    <p:sldTgt/>
-                  </p:tgtEl>
-                </p:cond>
-              </p:prevCondLst>
-              <p:nextCondLst>
-                <p:cond evt="onNext" delay="0">
-                  <p:tgtEl>
-                    <p:sldTgt/>
-                  </p:tgtEl>
-                </p:cond>
-              </p:nextCondLst>
-            </p:seq>
-          </p:childTnLst>
-        </p:cTn>
+        <p:cTn id="1" dur="indefinite" restart="never" nodeType="tmRoot"/>
       </p:par>
     </p:tnLst>
   </p:timing>
@@ -8127,8 +7879,11 @@
       </a:bgFillStyleLst>
     </a:fmtScheme>
   </a:themeElements>
-  <a:objectDefaults/>
-  <a:extraClrSchemeLst/>
+  <a:extLst>
+    <a:ext uri="{05A4C25C-085E-4340-85A3-A5531E510DB2}">
+      <thm15:themeFamily xmlns:thm15="http://schemas.microsoft.com/office/thememl/2012/main" name="Office Theme" id="{62F939B6-93AF-4DB8-9C6B-D6C7DFDC589F}" vid="{4A3C46E8-61CC-4603-A589-7422A47A8E4A}"/>
+    </a:ext>
+  </a:extLst>
 </a:theme>
 </file>
 
@@ -8352,7 +8107,10 @@
       </a:bgFillStyleLst>
     </a:fmtScheme>
   </a:themeElements>
-  <a:objectDefaults/>
-  <a:extraClrSchemeLst/>
+  <a:extLst>
+    <a:ext uri="{05A4C25C-085E-4340-85A3-A5531E510DB2}">
+      <thm15:themeFamily xmlns:thm15="http://schemas.microsoft.com/office/thememl/2012/main" name="Office Theme" id="{62F939B6-93AF-4DB8-9C6B-D6C7DFDC589F}" vid="{4A3C46E8-61CC-4603-A589-7422A47A8E4A}"/>
+    </a:ext>
+  </a:extLst>
 </a:theme>
 </file>
</xml_diff>

<commit_message>
Presentación del Sprint #1 formato PowerPoint 29/05/2019
</commit_message>
<xml_diff>
--- a/PrimerSprint/Presentación_PrimerSprint_AGNEX.pptx
+++ b/PrimerSprint/Presentación_PrimerSprint_AGNEX.pptx
@@ -5,25 +5,25 @@
     <p:sldMasterId id="2147483648" r:id="rId1"/>
   </p:sldMasterIdLst>
   <p:notesMasterIdLst>
-    <p:notesMasterId r:id="rId5"/>
+    <p:notesMasterId r:id="rId15"/>
   </p:notesMasterIdLst>
   <p:sldIdLst>
-    <p:sldId id="256" r:id="rId3"/>
-    <p:sldId id="257" r:id="rId4"/>
-    <p:sldId id="258" r:id="rId6"/>
-    <p:sldId id="268" r:id="rId7"/>
-    <p:sldId id="264" r:id="rId8"/>
-    <p:sldId id="259" r:id="rId9"/>
-    <p:sldId id="260" r:id="rId10"/>
-    <p:sldId id="261" r:id="rId11"/>
-    <p:sldId id="262" r:id="rId12"/>
-    <p:sldId id="263" r:id="rId13"/>
-    <p:sldId id="265" r:id="rId14"/>
-    <p:sldId id="266" r:id="rId15"/>
-    <p:sldId id="267" r:id="rId16"/>
+    <p:sldId id="256" r:id="rId2"/>
+    <p:sldId id="257" r:id="rId3"/>
+    <p:sldId id="258" r:id="rId4"/>
+    <p:sldId id="268" r:id="rId5"/>
+    <p:sldId id="264" r:id="rId6"/>
+    <p:sldId id="260" r:id="rId7"/>
+    <p:sldId id="261" r:id="rId8"/>
+    <p:sldId id="262" r:id="rId9"/>
+    <p:sldId id="263" r:id="rId10"/>
+    <p:sldId id="265" r:id="rId11"/>
+    <p:sldId id="266" r:id="rId12"/>
+    <p:sldId id="259" r:id="rId13"/>
+    <p:sldId id="267" r:id="rId14"/>
   </p:sldIdLst>
   <p:sldSz cx="9144000" cy="6858000" type="screen4x3"/>
-  <p:notesSz cx="6797675" cy="9926320"/>
+  <p:notesSz cx="6797675" cy="9926638"/>
   <p:defaultTextStyle>
     <a:defPPr>
       <a:defRPr lang="es-ES"/>
@@ -119,6 +119,11 @@
       </a:defRPr>
     </a:lvl9pPr>
   </p:defaultTextStyle>
+  <p:extLst>
+    <p:ext uri="{EFAFB233-063F-42B5-8137-9DF3F51BA10A}">
+      <p15:sldGuideLst xmlns:p15="http://schemas.microsoft.com/office/powerpoint/2012/main"/>
+    </p:ext>
+  </p:extLst>
 </p:presentation>
 </file>
 
@@ -178,12 +183,6 @@
               </a:rPr>
               <a:t>Click to move the slide</a:t>
             </a:r>
-            <a:endParaRPr lang="es-ES" sz="4400" b="0" strike="noStrike" spc="-1">
-              <a:solidFill>
-                <a:srgbClr val="000000"/>
-              </a:solidFill>
-              <a:latin typeface="Arial"/>
-            </a:endParaRPr>
           </a:p>
         </p:txBody>
       </p:sp>
@@ -218,9 +217,6 @@
               </a:rPr>
               <a:t>Click to edit the notes format</a:t>
             </a:r>
-            <a:endParaRPr lang="es-ES" sz="2000" b="0" strike="noStrike" spc="-1">
-              <a:latin typeface="Arial"/>
-            </a:endParaRPr>
           </a:p>
         </p:txBody>
       </p:sp>
@@ -255,9 +251,6 @@
               </a:rPr>
               <a:t> </a:t>
             </a:r>
-            <a:endParaRPr lang="es-ES" sz="1400" b="0" strike="noStrike" spc="-1">
-              <a:latin typeface="Times New Roman"/>
-            </a:endParaRPr>
           </a:p>
         </p:txBody>
       </p:sp>
@@ -293,9 +286,6 @@
               </a:rPr>
               <a:t> </a:t>
             </a:r>
-            <a:endParaRPr lang="es-ES" sz="1400" b="0" strike="noStrike" spc="-1">
-              <a:latin typeface="Times New Roman"/>
-            </a:endParaRPr>
           </a:p>
         </p:txBody>
       </p:sp>
@@ -330,9 +320,6 @@
               </a:rPr>
               <a:t> </a:t>
             </a:r>
-            <a:endParaRPr lang="es-ES" sz="1400" b="0" strike="noStrike" spc="-1">
-              <a:latin typeface="Times New Roman"/>
-            </a:endParaRPr>
           </a:p>
         </p:txBody>
       </p:sp>
@@ -366,6 +353,7 @@
               <a:rPr lang="es-ES" sz="1400" b="0" strike="noStrike" spc="-1">
                 <a:latin typeface="Times New Roman"/>
               </a:rPr>
+              <a:t>‹Nº›</a:t>
             </a:fld>
             <a:endParaRPr lang="es-ES" sz="1400" b="0" strike="noStrike" spc="-1">
               <a:latin typeface="Times New Roman"/>
@@ -374,6 +362,11 @@
         </p:txBody>
       </p:sp>
     </p:spTree>
+    <p:extLst>
+      <p:ext uri="{BB962C8B-B14F-4D97-AF65-F5344CB8AC3E}">
+        <p14:creationId xmlns:p14="http://schemas.microsoft.com/office/powerpoint/2010/main" val="1905219969"/>
+      </p:ext>
+    </p:extLst>
   </p:cSld>
   <p:clrMap bg1="lt1" tx1="dk1" bg2="lt2" tx2="dk2" accent1="accent1" accent2="accent2" accent3="accent3" accent4="accent4" accent5="accent5" accent6="accent6" hlink="hlink" folHlink="folHlink"/>
   <p:notesStyle>
@@ -576,6 +569,7 @@
                 </a:solidFill>
                 <a:latin typeface="Arial"/>
               </a:rPr>
+              <a:t>2</a:t>
             </a:fld>
             <a:endParaRPr lang="es-ES" sz="1200" b="0" strike="noStrike" spc="-1">
               <a:latin typeface="Times New Roman"/>
@@ -584,6 +578,11 @@
         </p:txBody>
       </p:sp>
     </p:spTree>
+    <p:extLst>
+      <p:ext uri="{BB962C8B-B14F-4D97-AF65-F5344CB8AC3E}">
+        <p14:creationId xmlns:p14="http://schemas.microsoft.com/office/powerpoint/2010/main" val="2857922733"/>
+      </p:ext>
+    </p:extLst>
   </p:cSld>
   <p:clrMapOvr>
     <a:masterClrMapping/>
@@ -610,7 +609,7 @@
       </p:grpSpPr>
       <p:sp>
         <p:nvSpPr>
-          <p:cNvPr id="129" name="PlaceHolder 1"/>
+          <p:cNvPr id="132" name="PlaceHolder 1"/>
           <p:cNvSpPr>
             <a:spLocks noGrp="1" noRot="1" noChangeAspect="1"/>
           </p:cNvSpPr>
@@ -630,7 +629,7 @@
       </p:sp>
       <p:sp>
         <p:nvSpPr>
-          <p:cNvPr id="130" name="PlaceHolder 2"/>
+          <p:cNvPr id="133" name="PlaceHolder 2"/>
           <p:cNvSpPr>
             <a:spLocks noGrp="1"/>
           </p:cNvSpPr>
@@ -661,7 +660,7 @@
       </p:sp>
       <p:sp>
         <p:nvSpPr>
-          <p:cNvPr id="131" name="TextShape 3"/>
+          <p:cNvPr id="134" name="TextShape 3"/>
           <p:cNvSpPr txBox="1"/>
           <p:nvPr/>
         </p:nvSpPr>
@@ -689,7 +688,7 @@
                 <a:spcPct val="100000"/>
               </a:lnSpc>
             </a:pPr>
-            <a:fld id="{6A7A1432-E67B-4998-8031-FD8A7E1BD872}" type="slidenum">
+            <a:fld id="{6C3B477F-0A5D-4598-8CB9-F80835BC29BE}" type="slidenum">
               <a:rPr lang="es-ES" sz="1200" b="0" strike="noStrike" spc="-1">
                 <a:solidFill>
                   <a:srgbClr val="000000"/>
@@ -697,6 +696,7 @@
                 <a:latin typeface="Arial"/>
                 <a:ea typeface="+mn-ea"/>
               </a:rPr>
+              <a:t>11</a:t>
             </a:fld>
             <a:endParaRPr lang="es-ES" sz="1200" b="0" strike="noStrike" spc="-1">
               <a:latin typeface="Times New Roman"/>
@@ -705,6 +705,11 @@
         </p:txBody>
       </p:sp>
     </p:spTree>
+    <p:extLst>
+      <p:ext uri="{BB962C8B-B14F-4D97-AF65-F5344CB8AC3E}">
+        <p14:creationId xmlns:p14="http://schemas.microsoft.com/office/powerpoint/2010/main" val="995150798"/>
+      </p:ext>
+    </p:extLst>
   </p:cSld>
   <p:clrMapOvr>
     <a:masterClrMapping/>
@@ -731,7 +736,7 @@
       </p:grpSpPr>
       <p:sp>
         <p:nvSpPr>
-          <p:cNvPr id="132" name="PlaceHolder 1"/>
+          <p:cNvPr id="111" name="PlaceHolder 1"/>
           <p:cNvSpPr>
             <a:spLocks noGrp="1" noRot="1" noChangeAspect="1"/>
           </p:cNvSpPr>
@@ -751,7 +756,7 @@
       </p:sp>
       <p:sp>
         <p:nvSpPr>
-          <p:cNvPr id="133" name="PlaceHolder 2"/>
+          <p:cNvPr id="112" name="PlaceHolder 2"/>
           <p:cNvSpPr>
             <a:spLocks noGrp="1"/>
           </p:cNvSpPr>
@@ -782,7 +787,7 @@
       </p:sp>
       <p:sp>
         <p:nvSpPr>
-          <p:cNvPr id="134" name="TextShape 3"/>
+          <p:cNvPr id="113" name="TextShape 3"/>
           <p:cNvSpPr txBox="1"/>
           <p:nvPr/>
         </p:nvSpPr>
@@ -810,7 +815,7 @@
                 <a:spcPct val="100000"/>
               </a:lnSpc>
             </a:pPr>
-            <a:fld id="{6C3B477F-0A5D-4598-8CB9-F80835BC29BE}" type="slidenum">
+            <a:fld id="{C67F9B4B-CC0E-450B-A46D-9C6685E5D316}" type="slidenum">
               <a:rPr lang="es-ES" sz="1200" b="0" strike="noStrike" spc="-1">
                 <a:solidFill>
                   <a:srgbClr val="000000"/>
@@ -818,6 +823,7 @@
                 <a:latin typeface="Arial"/>
                 <a:ea typeface="+mn-ea"/>
               </a:rPr>
+              <a:t>12</a:t>
             </a:fld>
             <a:endParaRPr lang="es-ES" sz="1200" b="0" strike="noStrike" spc="-1">
               <a:latin typeface="Times New Roman"/>
@@ -826,6 +832,11 @@
         </p:txBody>
       </p:sp>
     </p:spTree>
+    <p:extLst>
+      <p:ext uri="{BB962C8B-B14F-4D97-AF65-F5344CB8AC3E}">
+        <p14:creationId xmlns:p14="http://schemas.microsoft.com/office/powerpoint/2010/main" val="497196656"/>
+      </p:ext>
+    </p:extLst>
   </p:cSld>
   <p:clrMapOvr>
     <a:masterClrMapping/>
@@ -939,6 +950,7 @@
                 <a:latin typeface="Arial"/>
                 <a:ea typeface="+mn-ea"/>
               </a:rPr>
+              <a:t>3</a:t>
             </a:fld>
             <a:endParaRPr lang="es-ES" sz="1200" b="0" strike="noStrike" spc="-1">
               <a:latin typeface="Times New Roman"/>
@@ -947,6 +959,11 @@
         </p:txBody>
       </p:sp>
     </p:spTree>
+    <p:extLst>
+      <p:ext uri="{BB962C8B-B14F-4D97-AF65-F5344CB8AC3E}">
+        <p14:creationId xmlns:p14="http://schemas.microsoft.com/office/powerpoint/2010/main" val="818418193"/>
+      </p:ext>
+    </p:extLst>
   </p:cSld>
   <p:clrMapOvr>
     <a:masterClrMapping/>
@@ -1060,6 +1077,7 @@
                 <a:latin typeface="Arial"/>
                 <a:ea typeface="+mn-ea"/>
               </a:rPr>
+              <a:t>4</a:t>
             </a:fld>
             <a:endParaRPr lang="es-ES" sz="1200" b="0" strike="noStrike" spc="-1">
               <a:latin typeface="Times New Roman"/>
@@ -1068,6 +1086,11 @@
         </p:txBody>
       </p:sp>
     </p:spTree>
+    <p:extLst>
+      <p:ext uri="{BB962C8B-B14F-4D97-AF65-F5344CB8AC3E}">
+        <p14:creationId xmlns:p14="http://schemas.microsoft.com/office/powerpoint/2010/main" val="3140828485"/>
+      </p:ext>
+    </p:extLst>
   </p:cSld>
   <p:clrMapOvr>
     <a:masterClrMapping/>
@@ -1181,6 +1204,7 @@
                 <a:latin typeface="Arial"/>
                 <a:ea typeface="+mn-ea"/>
               </a:rPr>
+              <a:t>5</a:t>
             </a:fld>
             <a:endParaRPr lang="es-ES" sz="1200" b="0" strike="noStrike" spc="-1">
               <a:latin typeface="Times New Roman"/>
@@ -1189,6 +1213,11 @@
         </p:txBody>
       </p:sp>
     </p:spTree>
+    <p:extLst>
+      <p:ext uri="{BB962C8B-B14F-4D97-AF65-F5344CB8AC3E}">
+        <p14:creationId xmlns:p14="http://schemas.microsoft.com/office/powerpoint/2010/main" val="4018158065"/>
+      </p:ext>
+    </p:extLst>
   </p:cSld>
   <p:clrMapOvr>
     <a:masterClrMapping/>
@@ -1215,7 +1244,7 @@
       </p:grpSpPr>
       <p:sp>
         <p:nvSpPr>
-          <p:cNvPr id="111" name="PlaceHolder 1"/>
+          <p:cNvPr id="114" name="PlaceHolder 1"/>
           <p:cNvSpPr>
             <a:spLocks noGrp="1" noRot="1" noChangeAspect="1"/>
           </p:cNvSpPr>
@@ -1235,7 +1264,7 @@
       </p:sp>
       <p:sp>
         <p:nvSpPr>
-          <p:cNvPr id="112" name="PlaceHolder 2"/>
+          <p:cNvPr id="115" name="PlaceHolder 2"/>
           <p:cNvSpPr>
             <a:spLocks noGrp="1"/>
           </p:cNvSpPr>
@@ -1266,7 +1295,7 @@
       </p:sp>
       <p:sp>
         <p:nvSpPr>
-          <p:cNvPr id="113" name="TextShape 3"/>
+          <p:cNvPr id="116" name="TextShape 3"/>
           <p:cNvSpPr txBox="1"/>
           <p:nvPr/>
         </p:nvSpPr>
@@ -1294,7 +1323,7 @@
                 <a:spcPct val="100000"/>
               </a:lnSpc>
             </a:pPr>
-            <a:fld id="{C67F9B4B-CC0E-450B-A46D-9C6685E5D316}" type="slidenum">
+            <a:fld id="{8F24EB30-6B2C-4704-A37B-3FC931D8E1BD}" type="slidenum">
               <a:rPr lang="es-ES" sz="1200" b="0" strike="noStrike" spc="-1">
                 <a:solidFill>
                   <a:srgbClr val="000000"/>
@@ -1302,6 +1331,7 @@
                 <a:latin typeface="Arial"/>
                 <a:ea typeface="+mn-ea"/>
               </a:rPr>
+              <a:t>6</a:t>
             </a:fld>
             <a:endParaRPr lang="es-ES" sz="1200" b="0" strike="noStrike" spc="-1">
               <a:latin typeface="Times New Roman"/>
@@ -1310,6 +1340,11 @@
         </p:txBody>
       </p:sp>
     </p:spTree>
+    <p:extLst>
+      <p:ext uri="{BB962C8B-B14F-4D97-AF65-F5344CB8AC3E}">
+        <p14:creationId xmlns:p14="http://schemas.microsoft.com/office/powerpoint/2010/main" val="2043514732"/>
+      </p:ext>
+    </p:extLst>
   </p:cSld>
   <p:clrMapOvr>
     <a:masterClrMapping/>
@@ -1336,7 +1371,7 @@
       </p:grpSpPr>
       <p:sp>
         <p:nvSpPr>
-          <p:cNvPr id="114" name="PlaceHolder 1"/>
+          <p:cNvPr id="117" name="PlaceHolder 1"/>
           <p:cNvSpPr>
             <a:spLocks noGrp="1" noRot="1" noChangeAspect="1"/>
           </p:cNvSpPr>
@@ -1356,7 +1391,7 @@
       </p:sp>
       <p:sp>
         <p:nvSpPr>
-          <p:cNvPr id="115" name="PlaceHolder 2"/>
+          <p:cNvPr id="118" name="PlaceHolder 2"/>
           <p:cNvSpPr>
             <a:spLocks noGrp="1"/>
           </p:cNvSpPr>
@@ -1387,7 +1422,7 @@
       </p:sp>
       <p:sp>
         <p:nvSpPr>
-          <p:cNvPr id="116" name="TextShape 3"/>
+          <p:cNvPr id="119" name="TextShape 3"/>
           <p:cNvSpPr txBox="1"/>
           <p:nvPr/>
         </p:nvSpPr>
@@ -1415,7 +1450,7 @@
                 <a:spcPct val="100000"/>
               </a:lnSpc>
             </a:pPr>
-            <a:fld id="{8F24EB30-6B2C-4704-A37B-3FC931D8E1BD}" type="slidenum">
+            <a:fld id="{EE04D805-D575-4BA5-8D7C-0FF2B62BA07A}" type="slidenum">
               <a:rPr lang="es-ES" sz="1200" b="0" strike="noStrike" spc="-1">
                 <a:solidFill>
                   <a:srgbClr val="000000"/>
@@ -1423,6 +1458,7 @@
                 <a:latin typeface="Arial"/>
                 <a:ea typeface="+mn-ea"/>
               </a:rPr>
+              <a:t>7</a:t>
             </a:fld>
             <a:endParaRPr lang="es-ES" sz="1200" b="0" strike="noStrike" spc="-1">
               <a:latin typeface="Times New Roman"/>
@@ -1431,6 +1467,11 @@
         </p:txBody>
       </p:sp>
     </p:spTree>
+    <p:extLst>
+      <p:ext uri="{BB962C8B-B14F-4D97-AF65-F5344CB8AC3E}">
+        <p14:creationId xmlns:p14="http://schemas.microsoft.com/office/powerpoint/2010/main" val="3707956195"/>
+      </p:ext>
+    </p:extLst>
   </p:cSld>
   <p:clrMapOvr>
     <a:masterClrMapping/>
@@ -1457,7 +1498,7 @@
       </p:grpSpPr>
       <p:sp>
         <p:nvSpPr>
-          <p:cNvPr id="117" name="PlaceHolder 1"/>
+          <p:cNvPr id="120" name="PlaceHolder 1"/>
           <p:cNvSpPr>
             <a:spLocks noGrp="1" noRot="1" noChangeAspect="1"/>
           </p:cNvSpPr>
@@ -1477,7 +1518,7 @@
       </p:sp>
       <p:sp>
         <p:nvSpPr>
-          <p:cNvPr id="118" name="PlaceHolder 2"/>
+          <p:cNvPr id="121" name="PlaceHolder 2"/>
           <p:cNvSpPr>
             <a:spLocks noGrp="1"/>
           </p:cNvSpPr>
@@ -1508,7 +1549,7 @@
       </p:sp>
       <p:sp>
         <p:nvSpPr>
-          <p:cNvPr id="119" name="TextShape 3"/>
+          <p:cNvPr id="122" name="TextShape 3"/>
           <p:cNvSpPr txBox="1"/>
           <p:nvPr/>
         </p:nvSpPr>
@@ -1536,7 +1577,7 @@
                 <a:spcPct val="100000"/>
               </a:lnSpc>
             </a:pPr>
-            <a:fld id="{EE04D805-D575-4BA5-8D7C-0FF2B62BA07A}" type="slidenum">
+            <a:fld id="{9CAD0EDE-3563-455D-B657-59A913EF016B}" type="slidenum">
               <a:rPr lang="es-ES" sz="1200" b="0" strike="noStrike" spc="-1">
                 <a:solidFill>
                   <a:srgbClr val="000000"/>
@@ -1544,6 +1585,7 @@
                 <a:latin typeface="Arial"/>
                 <a:ea typeface="+mn-ea"/>
               </a:rPr>
+              <a:t>8</a:t>
             </a:fld>
             <a:endParaRPr lang="es-ES" sz="1200" b="0" strike="noStrike" spc="-1">
               <a:latin typeface="Times New Roman"/>
@@ -1552,6 +1594,11 @@
         </p:txBody>
       </p:sp>
     </p:spTree>
+    <p:extLst>
+      <p:ext uri="{BB962C8B-B14F-4D97-AF65-F5344CB8AC3E}">
+        <p14:creationId xmlns:p14="http://schemas.microsoft.com/office/powerpoint/2010/main" val="385021608"/>
+      </p:ext>
+    </p:extLst>
   </p:cSld>
   <p:clrMapOvr>
     <a:masterClrMapping/>
@@ -1578,7 +1625,7 @@
       </p:grpSpPr>
       <p:sp>
         <p:nvSpPr>
-          <p:cNvPr id="120" name="PlaceHolder 1"/>
+          <p:cNvPr id="123" name="PlaceHolder 1"/>
           <p:cNvSpPr>
             <a:spLocks noGrp="1" noRot="1" noChangeAspect="1"/>
           </p:cNvSpPr>
@@ -1598,7 +1645,7 @@
       </p:sp>
       <p:sp>
         <p:nvSpPr>
-          <p:cNvPr id="121" name="PlaceHolder 2"/>
+          <p:cNvPr id="124" name="PlaceHolder 2"/>
           <p:cNvSpPr>
             <a:spLocks noGrp="1"/>
           </p:cNvSpPr>
@@ -1629,7 +1676,7 @@
       </p:sp>
       <p:sp>
         <p:nvSpPr>
-          <p:cNvPr id="122" name="TextShape 3"/>
+          <p:cNvPr id="125" name="TextShape 3"/>
           <p:cNvSpPr txBox="1"/>
           <p:nvPr/>
         </p:nvSpPr>
@@ -1657,7 +1704,7 @@
                 <a:spcPct val="100000"/>
               </a:lnSpc>
             </a:pPr>
-            <a:fld id="{9CAD0EDE-3563-455D-B657-59A913EF016B}" type="slidenum">
+            <a:fld id="{4197BDD6-ED08-4091-B598-90AC00CBED65}" type="slidenum">
               <a:rPr lang="es-ES" sz="1200" b="0" strike="noStrike" spc="-1">
                 <a:solidFill>
                   <a:srgbClr val="000000"/>
@@ -1665,6 +1712,7 @@
                 <a:latin typeface="Arial"/>
                 <a:ea typeface="+mn-ea"/>
               </a:rPr>
+              <a:t>9</a:t>
             </a:fld>
             <a:endParaRPr lang="es-ES" sz="1200" b="0" strike="noStrike" spc="-1">
               <a:latin typeface="Times New Roman"/>
@@ -1673,6 +1721,11 @@
         </p:txBody>
       </p:sp>
     </p:spTree>
+    <p:extLst>
+      <p:ext uri="{BB962C8B-B14F-4D97-AF65-F5344CB8AC3E}">
+        <p14:creationId xmlns:p14="http://schemas.microsoft.com/office/powerpoint/2010/main" val="1610088600"/>
+      </p:ext>
+    </p:extLst>
   </p:cSld>
   <p:clrMapOvr>
     <a:masterClrMapping/>
@@ -1699,7 +1752,7 @@
       </p:grpSpPr>
       <p:sp>
         <p:nvSpPr>
-          <p:cNvPr id="123" name="PlaceHolder 1"/>
+          <p:cNvPr id="129" name="PlaceHolder 1"/>
           <p:cNvSpPr>
             <a:spLocks noGrp="1" noRot="1" noChangeAspect="1"/>
           </p:cNvSpPr>
@@ -1719,7 +1772,7 @@
       </p:sp>
       <p:sp>
         <p:nvSpPr>
-          <p:cNvPr id="124" name="PlaceHolder 2"/>
+          <p:cNvPr id="130" name="PlaceHolder 2"/>
           <p:cNvSpPr>
             <a:spLocks noGrp="1"/>
           </p:cNvSpPr>
@@ -1750,7 +1803,7 @@
       </p:sp>
       <p:sp>
         <p:nvSpPr>
-          <p:cNvPr id="125" name="TextShape 3"/>
+          <p:cNvPr id="131" name="TextShape 3"/>
           <p:cNvSpPr txBox="1"/>
           <p:nvPr/>
         </p:nvSpPr>
@@ -1778,7 +1831,7 @@
                 <a:spcPct val="100000"/>
               </a:lnSpc>
             </a:pPr>
-            <a:fld id="{4197BDD6-ED08-4091-B598-90AC00CBED65}" type="slidenum">
+            <a:fld id="{6A7A1432-E67B-4998-8031-FD8A7E1BD872}" type="slidenum">
               <a:rPr lang="es-ES" sz="1200" b="0" strike="noStrike" spc="-1">
                 <a:solidFill>
                   <a:srgbClr val="000000"/>
@@ -1786,6 +1839,7 @@
                 <a:latin typeface="Arial"/>
                 <a:ea typeface="+mn-ea"/>
               </a:rPr>
+              <a:t>10</a:t>
             </a:fld>
             <a:endParaRPr lang="es-ES" sz="1200" b="0" strike="noStrike" spc="-1">
               <a:latin typeface="Times New Roman"/>
@@ -1794,6 +1848,11 @@
         </p:txBody>
       </p:sp>
     </p:spTree>
+    <p:extLst>
+      <p:ext uri="{BB962C8B-B14F-4D97-AF65-F5344CB8AC3E}">
+        <p14:creationId xmlns:p14="http://schemas.microsoft.com/office/powerpoint/2010/main" val="3226091625"/>
+      </p:ext>
+    </p:extLst>
   </p:cSld>
   <p:clrMapOvr>
     <a:masterClrMapping/>
@@ -3797,6 +3856,7 @@
                 </a:solidFill>
                 <a:latin typeface="Arial"/>
               </a:rPr>
+              <a:t>‹Nº›</a:t>
             </a:fld>
             <a:endParaRPr lang="es-ES" sz="1400" b="0" strike="noStrike" spc="-1">
               <a:latin typeface="Times New Roman"/>
@@ -3838,12 +3898,6 @@
               </a:rPr>
               <a:t>Click to edit the title text format</a:t>
             </a:r>
-            <a:endParaRPr lang="es-ES" sz="4400" b="0" strike="noStrike" spc="-1">
-              <a:solidFill>
-                <a:srgbClr val="000000"/>
-              </a:solidFill>
-              <a:latin typeface="Arial"/>
-            </a:endParaRPr>
           </a:p>
         </p:txBody>
       </p:sp>
@@ -3892,12 +3946,6 @@
               </a:rPr>
               <a:t>Click to edit the outline text format</a:t>
             </a:r>
-            <a:endParaRPr lang="es-ES" sz="3200" b="0" strike="noStrike" spc="-1">
-              <a:solidFill>
-                <a:srgbClr val="000000"/>
-              </a:solidFill>
-              <a:latin typeface="Arial"/>
-            </a:endParaRPr>
           </a:p>
           <a:p>
             <a:pPr marL="864235" lvl="1" indent="-323850">
@@ -3920,12 +3968,6 @@
               </a:rPr>
               <a:t>Second Outline Level</a:t>
             </a:r>
-            <a:endParaRPr lang="es-ES" sz="2400" b="0" strike="noStrike" spc="-1">
-              <a:solidFill>
-                <a:srgbClr val="000000"/>
-              </a:solidFill>
-              <a:latin typeface="Arial"/>
-            </a:endParaRPr>
           </a:p>
           <a:p>
             <a:pPr marL="1296035" lvl="2" indent="-288290">
@@ -3948,12 +3990,6 @@
               </a:rPr>
               <a:t>Third Outline Level</a:t>
             </a:r>
-            <a:endParaRPr lang="es-ES" sz="2000" b="0" strike="noStrike" spc="-1">
-              <a:solidFill>
-                <a:srgbClr val="000000"/>
-              </a:solidFill>
-              <a:latin typeface="Arial"/>
-            </a:endParaRPr>
           </a:p>
           <a:p>
             <a:pPr marL="1727835" lvl="3" indent="-215900">
@@ -3976,12 +4012,6 @@
               </a:rPr>
               <a:t>Fourth Outline Level</a:t>
             </a:r>
-            <a:endParaRPr lang="es-ES" sz="2000" b="0" strike="noStrike" spc="-1">
-              <a:solidFill>
-                <a:srgbClr val="000000"/>
-              </a:solidFill>
-              <a:latin typeface="Arial"/>
-            </a:endParaRPr>
           </a:p>
           <a:p>
             <a:pPr marL="2160270" lvl="4" indent="-215900">
@@ -4004,12 +4034,6 @@
               </a:rPr>
               <a:t>Fifth Outline Level</a:t>
             </a:r>
-            <a:endParaRPr lang="es-ES" sz="2000" b="0" strike="noStrike" spc="-1">
-              <a:solidFill>
-                <a:srgbClr val="000000"/>
-              </a:solidFill>
-              <a:latin typeface="Arial"/>
-            </a:endParaRPr>
           </a:p>
           <a:p>
             <a:pPr marL="2592070" lvl="5" indent="-215900">
@@ -4032,12 +4056,6 @@
               </a:rPr>
               <a:t>Sixth Outline Level</a:t>
             </a:r>
-            <a:endParaRPr lang="es-ES" sz="2000" b="0" strike="noStrike" spc="-1">
-              <a:solidFill>
-                <a:srgbClr val="000000"/>
-              </a:solidFill>
-              <a:latin typeface="Arial"/>
-            </a:endParaRPr>
           </a:p>
           <a:p>
             <a:pPr marL="3023870" lvl="6" indent="-215900">
@@ -4060,12 +4078,6 @@
               </a:rPr>
               <a:t>Seventh Outline Level</a:t>
             </a:r>
-            <a:endParaRPr lang="es-ES" sz="2000" b="0" strike="noStrike" spc="-1">
-              <a:solidFill>
-                <a:srgbClr val="000000"/>
-              </a:solidFill>
-              <a:latin typeface="Arial"/>
-            </a:endParaRPr>
           </a:p>
         </p:txBody>
       </p:sp>
@@ -4393,7 +4405,7 @@
           <p:nvPr/>
         </p:nvPicPr>
         <p:blipFill>
-          <a:blip r:embed="rId1"/>
+          <a:blip r:embed="rId2"/>
           <a:stretch>
             <a:fillRect/>
           </a:stretch>
@@ -4824,7 +4836,7 @@
       </p:grpSpPr>
       <p:sp>
         <p:nvSpPr>
-          <p:cNvPr id="85" name="CustomShape 1"/>
+          <p:cNvPr id="91" name="CustomShape 1"/>
           <p:cNvSpPr/>
           <p:nvPr/>
         </p:nvSpPr>
@@ -4879,69 +4891,30 @@
           </a:p>
         </p:txBody>
       </p:sp>
-      <p:sp>
-        <p:nvSpPr>
-          <p:cNvPr id="86" name="TextShape 2"/>
-          <p:cNvSpPr txBox="1"/>
-          <p:nvPr/>
-        </p:nvSpPr>
-        <p:spPr>
-          <a:xfrm>
-            <a:off x="1224000" y="720000"/>
-            <a:ext cx="7488000" cy="576000"/>
-          </a:xfrm>
-          <a:prstGeom prst="rect">
-            <a:avLst/>
-          </a:prstGeom>
-          <a:noFill/>
-          <a:ln>
-            <a:noFill/>
-          </a:ln>
-        </p:spPr>
-        <p:txBody>
-          <a:bodyPr lIns="90000" tIns="45000" rIns="90000" bIns="45000">
-            <a:spAutoFit/>
-          </a:bodyPr>
-          <a:lstStyle/>
-          <a:p>
-            <a:pPr algn="ctr">
-              <a:lnSpc>
-                <a:spcPct val="100000"/>
-              </a:lnSpc>
-            </a:pPr>
-            <a:r>
-              <a:rPr lang="es-ES" sz="2800" b="1" strike="noStrike" spc="-1">
-                <a:solidFill>
-                  <a:srgbClr val="000000"/>
-                </a:solidFill>
-                <a:latin typeface="Arial"/>
-              </a:rPr>
-              <a:t>Diagrama de clases de diseño del sprint. </a:t>
-            </a:r>
-            <a:endParaRPr lang="es-ES" sz="2800" b="0" strike="noStrike" spc="-1">
-              <a:latin typeface="Arial"/>
-            </a:endParaRPr>
-          </a:p>
-        </p:txBody>
-      </p:sp>
       <p:pic>
         <p:nvPicPr>
-          <p:cNvPr id="2" name="Picture 1"/>
+          <p:cNvPr id="2" name="Imagen 1"/>
           <p:cNvPicPr>
             <a:picLocks noChangeAspect="1"/>
           </p:cNvPicPr>
           <p:nvPr/>
         </p:nvPicPr>
         <p:blipFill>
-          <a:blip r:embed="rId1"/>
+          <a:blip r:embed="rId3">
+            <a:extLst>
+              <a:ext uri="{28A0092B-C50C-407E-A947-70E740481C1C}">
+                <a14:useLocalDpi xmlns:a14="http://schemas.microsoft.com/office/drawing/2010/main" val="0"/>
+              </a:ext>
+            </a:extLst>
+          </a:blip>
           <a:stretch>
             <a:fillRect/>
           </a:stretch>
         </p:blipFill>
         <p:spPr>
           <a:xfrm>
-            <a:off x="1811020" y="1867535"/>
-            <a:ext cx="6314440" cy="4571365"/>
+            <a:off x="799573" y="385337"/>
+            <a:ext cx="7544853" cy="6087325"/>
           </a:xfrm>
           <a:prstGeom prst="rect">
             <a:avLst/>
@@ -4982,7 +4955,7 @@
       </p:grpSpPr>
       <p:sp>
         <p:nvSpPr>
-          <p:cNvPr id="91" name="CustomShape 1"/>
+          <p:cNvPr id="93" name="CustomShape 1"/>
           <p:cNvSpPr/>
           <p:nvPr/>
         </p:nvSpPr>
@@ -5046,7 +5019,7 @@
           <p:nvPr/>
         </p:nvPicPr>
         <p:blipFill>
-          <a:blip r:embed="rId1">
+          <a:blip r:embed="rId3">
             <a:extLst>
               <a:ext uri="{28A0092B-C50C-407E-A947-70E740481C1C}">
                 <a14:useLocalDpi xmlns:a14="http://schemas.microsoft.com/office/drawing/2010/main" val="0"/>
@@ -5059,8 +5032,8 @@
         </p:blipFill>
         <p:spPr>
           <a:xfrm>
-            <a:off x="799573" y="385337"/>
-            <a:ext cx="7544853" cy="6087325"/>
+            <a:off x="807300" y="1198468"/>
+            <a:ext cx="7384967" cy="4978397"/>
           </a:xfrm>
           <a:prstGeom prst="rect">
             <a:avLst/>
@@ -5101,7 +5074,7 @@
       </p:grpSpPr>
       <p:sp>
         <p:nvSpPr>
-          <p:cNvPr id="93" name="CustomShape 1"/>
+          <p:cNvPr id="73" name="CustomShape 1"/>
           <p:cNvSpPr/>
           <p:nvPr/>
         </p:nvSpPr>
@@ -5148,7 +5121,7 @@
                 </a:solidFill>
                 <a:latin typeface="Arial"/>
               </a:rPr>
-              <a:t>Sprint #1.</a:t>
+              <a:t>Sprint #1. </a:t>
             </a:r>
             <a:endParaRPr lang="es-ES" sz="2800" b="0" strike="noStrike" spc="-1">
               <a:latin typeface="Arial"/>
@@ -5158,34 +5131,106 @@
       </p:sp>
       <p:pic>
         <p:nvPicPr>
-          <p:cNvPr id="2" name="Imagen 1"/>
-          <p:cNvPicPr>
-            <a:picLocks noChangeAspect="1"/>
-          </p:cNvPicPr>
+          <p:cNvPr id="74" name="Imagen 73"/>
+          <p:cNvPicPr/>
           <p:nvPr/>
         </p:nvPicPr>
         <p:blipFill>
-          <a:blip r:embed="rId1">
-            <a:extLst>
-              <a:ext uri="{28A0092B-C50C-407E-A947-70E740481C1C}">
-                <a14:useLocalDpi xmlns:a14="http://schemas.microsoft.com/office/drawing/2010/main" val="0"/>
-              </a:ext>
-            </a:extLst>
-          </a:blip>
+          <a:blip r:embed="rId3"/>
           <a:stretch>
             <a:fillRect/>
           </a:stretch>
         </p:blipFill>
         <p:spPr>
           <a:xfrm>
-            <a:off x="807300" y="1198468"/>
-            <a:ext cx="7384967" cy="4978397"/>
-          </a:xfrm>
-          <a:prstGeom prst="rect">
-            <a:avLst/>
-          </a:prstGeom>
+            <a:off x="3758040" y="2170800"/>
+            <a:ext cx="2361960" cy="1933200"/>
+          </a:xfrm>
+          <a:prstGeom prst="rect">
+            <a:avLst/>
+          </a:prstGeom>
+          <a:ln>
+            <a:noFill/>
+          </a:ln>
         </p:spPr>
       </p:pic>
+      <p:sp>
+        <p:nvSpPr>
+          <p:cNvPr id="75" name="TextShape 2"/>
+          <p:cNvSpPr txBox="1"/>
+          <p:nvPr/>
+        </p:nvSpPr>
+        <p:spPr>
+          <a:xfrm>
+            <a:off x="1224000" y="720000"/>
+            <a:ext cx="7488000" cy="576000"/>
+          </a:xfrm>
+          <a:prstGeom prst="rect">
+            <a:avLst/>
+          </a:prstGeom>
+          <a:noFill/>
+          <a:ln>
+            <a:noFill/>
+          </a:ln>
+        </p:spPr>
+        <p:txBody>
+          <a:bodyPr lIns="90000" tIns="45000" rIns="90000" bIns="45000">
+            <a:spAutoFit/>
+          </a:bodyPr>
+          <a:lstStyle/>
+          <a:p>
+            <a:pPr algn="ctr">
+              <a:lnSpc>
+                <a:spcPct val="100000"/>
+              </a:lnSpc>
+            </a:pPr>
+            <a:r>
+              <a:rPr lang="es-ES" sz="2800" b="1" strike="noStrike" spc="-1">
+                <a:solidFill>
+                  <a:srgbClr val="000000"/>
+                </a:solidFill>
+                <a:latin typeface="Arial"/>
+              </a:rPr>
+              <a:t>Interfaz de Usuario + Visor GIS insertado. </a:t>
+            </a:r>
+            <a:endParaRPr lang="es-ES" sz="2800" b="0" strike="noStrike" spc="-1">
+              <a:latin typeface="Arial"/>
+            </a:endParaRPr>
+          </a:p>
+        </p:txBody>
+      </p:sp>
+      <p:sp>
+        <p:nvSpPr>
+          <p:cNvPr id="2" name="CuadroTexto 1"/>
+          <p:cNvSpPr txBox="1"/>
+          <p:nvPr/>
+        </p:nvSpPr>
+        <p:spPr>
+          <a:xfrm>
+            <a:off x="3758040" y="4815068"/>
+            <a:ext cx="2095510" cy="369332"/>
+          </a:xfrm>
+          <a:prstGeom prst="rect">
+            <a:avLst/>
+          </a:prstGeom>
+          <a:noFill/>
+        </p:spPr>
+        <p:txBody>
+          <a:bodyPr wrap="none" rtlCol="0">
+            <a:spAutoFit/>
+          </a:bodyPr>
+          <a:lstStyle/>
+          <a:p>
+            <a:r>
+              <a:rPr lang="es-ES" dirty="0" smtClean="0">
+                <a:hlinkClick r:id="rId4" action="ppaction://hlinkfile"/>
+              </a:rPr>
+              <a:t>Aplicación AGNEX</a:t>
+            </a:r>
+            <a:endParaRPr lang="es-ES" dirty="0"/>
+          </a:p>
+        </p:txBody>
+      </p:sp>
     </p:spTree>
   </p:cSld>
   <p:clrMapOvr>
@@ -5225,7 +5270,7 @@
           <p:nvPr/>
         </p:nvPicPr>
         <p:blipFill>
-          <a:blip r:embed="rId1"/>
+          <a:blip r:embed="rId2"/>
           <a:stretch>
             <a:fillRect/>
           </a:stretch>
@@ -5352,7 +5397,7 @@
               </a:pathLst>
             </a:custGeom>
             <a:blipFill rotWithShape="0">
-              <a:blip r:embed="rId2"/>
+              <a:blip r:embed="rId3"/>
             </a:blipFill>
             <a:ln>
               <a:noFill/>
@@ -5409,7 +5454,7 @@
               </a:pathLst>
             </a:custGeom>
             <a:blipFill rotWithShape="0">
-              <a:blip r:embed="rId2"/>
+              <a:blip r:embed="rId3"/>
             </a:blipFill>
             <a:ln>
               <a:noFill/>
@@ -5466,7 +5511,7 @@
               </a:pathLst>
             </a:custGeom>
             <a:blipFill rotWithShape="0">
-              <a:blip r:embed="rId2"/>
+              <a:blip r:embed="rId3"/>
             </a:blipFill>
             <a:ln>
               <a:noFill/>
@@ -5523,7 +5568,7 @@
               </a:pathLst>
             </a:custGeom>
             <a:blipFill rotWithShape="0">
-              <a:blip r:embed="rId2"/>
+              <a:blip r:embed="rId3"/>
             </a:blipFill>
             <a:ln>
               <a:noFill/>
@@ -5580,7 +5625,7 @@
               </a:pathLst>
             </a:custGeom>
             <a:blipFill rotWithShape="0">
-              <a:blip r:embed="rId2"/>
+              <a:blip r:embed="rId3"/>
             </a:blipFill>
             <a:ln>
               <a:noFill/>
@@ -5637,7 +5682,7 @@
               </a:pathLst>
             </a:custGeom>
             <a:blipFill rotWithShape="0">
-              <a:blip r:embed="rId2"/>
+              <a:blip r:embed="rId3"/>
             </a:blipFill>
             <a:ln>
               <a:noFill/>
@@ -5798,7 +5843,7 @@
               </a:pathLst>
             </a:custGeom>
             <a:blipFill rotWithShape="0">
-              <a:blip r:embed="rId1"/>
+              <a:blip r:embed="rId3"/>
             </a:blipFill>
             <a:ln>
               <a:noFill/>
@@ -5855,7 +5900,7 @@
               </a:pathLst>
             </a:custGeom>
             <a:blipFill rotWithShape="0">
-              <a:blip r:embed="rId1"/>
+              <a:blip r:embed="rId3"/>
             </a:blipFill>
             <a:ln>
               <a:noFill/>
@@ -5912,7 +5957,7 @@
               </a:pathLst>
             </a:custGeom>
             <a:blipFill rotWithShape="0">
-              <a:blip r:embed="rId1"/>
+              <a:blip r:embed="rId3"/>
             </a:blipFill>
             <a:ln>
               <a:noFill/>
@@ -5969,7 +6014,7 @@
               </a:pathLst>
             </a:custGeom>
             <a:blipFill rotWithShape="0">
-              <a:blip r:embed="rId1"/>
+              <a:blip r:embed="rId3"/>
             </a:blipFill>
             <a:ln>
               <a:noFill/>
@@ -6026,7 +6071,7 @@
               </a:pathLst>
             </a:custGeom>
             <a:blipFill rotWithShape="0">
-              <a:blip r:embed="rId1"/>
+              <a:blip r:embed="rId3"/>
             </a:blipFill>
             <a:ln>
               <a:noFill/>
@@ -6083,7 +6128,7 @@
               </a:pathLst>
             </a:custGeom>
             <a:blipFill rotWithShape="0">
-              <a:blip r:embed="rId1"/>
+              <a:blip r:embed="rId3"/>
             </a:blipFill>
             <a:ln>
               <a:noFill/>
@@ -6207,12 +6252,6 @@
               </a:rPr>
               <a:t>Reunión de Planificación.</a:t>
             </a:r>
-            <a:endParaRPr lang="es-ES" sz="2000" b="0" strike="noStrike" spc="-1" dirty="0" smtClean="0">
-              <a:solidFill>
-                <a:srgbClr val="000000"/>
-              </a:solidFill>
-              <a:latin typeface="Arial"/>
-            </a:endParaRPr>
           </a:p>
           <a:p>
             <a:pPr marL="441325" indent="-285750">
@@ -6308,7 +6347,7 @@
               </a:rPr>
               <a:t>).</a:t>
             </a:r>
-            <a:endParaRPr lang="es-ES" sz="2000" b="0" strike="noStrike" spc="-1" dirty="0">
+            <a:endParaRPr lang="es-ES" sz="2000" spc="-1" dirty="0">
               <a:solidFill>
                 <a:srgbClr val="000000"/>
               </a:solidFill>
@@ -6330,35 +6369,14 @@
               <a:buChar char=""/>
             </a:pPr>
             <a:r>
-              <a:rPr lang="es-ES" sz="2000" b="0" strike="noStrike" spc="-1" dirty="0">
+              <a:rPr lang="es-ES" sz="2000" b="0" strike="noStrike" spc="-1" dirty="0" smtClean="0">
                 <a:solidFill>
                   <a:srgbClr val="000000"/>
                 </a:solidFill>
                 <a:latin typeface="Arial"/>
               </a:rPr>
-              <a:t>Interfaz de Usuario + Visor Gis insertado.</a:t>
+              <a:t>Diagrama </a:t>
             </a:r>
-            <a:endParaRPr lang="es-ES" sz="2000" b="0" strike="noStrike" spc="-1" dirty="0">
-              <a:solidFill>
-                <a:srgbClr val="000000"/>
-              </a:solidFill>
-              <a:latin typeface="Arial"/>
-            </a:endParaRPr>
-          </a:p>
-          <a:p>
-            <a:pPr marL="441325" indent="-285750">
-              <a:lnSpc>
-                <a:spcPct val="200000"/>
-              </a:lnSpc>
-              <a:spcBef>
-                <a:spcPts val="1000"/>
-              </a:spcBef>
-              <a:buClr>
-                <a:srgbClr val="BBE0E3"/>
-              </a:buClr>
-              <a:buFont typeface="Wingdings 3" charset="2"/>
-              <a:buChar char=""/>
-            </a:pPr>
             <a:r>
               <a:rPr lang="es-ES" sz="2000" b="0" strike="noStrike" spc="-1" dirty="0">
                 <a:solidFill>
@@ -6366,14 +6384,8 @@
                 </a:solidFill>
                 <a:latin typeface="Arial"/>
               </a:rPr>
-              <a:t>Diagrama de clases de diseño del sprint</a:t>
+              <a:t>de clases de diseño del sprint</a:t>
             </a:r>
-            <a:endParaRPr lang="es-ES" sz="2000" b="0" strike="noStrike" spc="-1" dirty="0">
-              <a:solidFill>
-                <a:srgbClr val="000000"/>
-              </a:solidFill>
-              <a:latin typeface="Arial"/>
-            </a:endParaRPr>
           </a:p>
           <a:p>
             <a:pPr marL="441325" indent="-285750">
@@ -6405,7 +6417,39 @@
                 </a:solidFill>
                 <a:latin typeface="Arial"/>
               </a:rPr>
-              <a:t>de Secuencia de 2 CU.</a:t>
+              <a:t>de Secuencia de 2 CU</a:t>
+            </a:r>
+            <a:r>
+              <a:rPr lang="es-ES" sz="2000" b="0" strike="noStrike" spc="-1" dirty="0" smtClean="0">
+                <a:solidFill>
+                  <a:srgbClr val="000000"/>
+                </a:solidFill>
+                <a:latin typeface="Arial"/>
+              </a:rPr>
+              <a:t>.</a:t>
+            </a:r>
+          </a:p>
+          <a:p>
+            <a:pPr marL="441325" indent="-285750">
+              <a:lnSpc>
+                <a:spcPct val="200000"/>
+              </a:lnSpc>
+              <a:spcBef>
+                <a:spcPts val="1000"/>
+              </a:spcBef>
+              <a:buClr>
+                <a:srgbClr val="BBE0E3"/>
+              </a:buClr>
+              <a:buFont typeface="Wingdings 3" charset="2"/>
+              <a:buChar char=""/>
+            </a:pPr>
+            <a:r>
+              <a:rPr lang="es-ES" sz="2000" spc="-1" dirty="0">
+                <a:solidFill>
+                  <a:srgbClr val="000000"/>
+                </a:solidFill>
+              </a:rPr>
+              <a:t>Interfaz de Usuario + Visor Gis insertado.</a:t>
             </a:r>
             <a:endParaRPr lang="es-ES" sz="2000" b="0" strike="noStrike" spc="-1" dirty="0">
               <a:solidFill>
@@ -6528,7 +6572,7 @@
           <p:nvPr/>
         </p:nvPicPr>
         <p:blipFill>
-          <a:blip r:embed="rId2"/>
+          <a:blip r:embed="rId4"/>
           <a:stretch>
             <a:fillRect/>
           </a:stretch>
@@ -6666,7 +6710,7 @@
           <p:nvPr/>
         </p:nvPicPr>
         <p:blipFill>
-          <a:blip r:embed="rId1"/>
+          <a:blip r:embed="rId3"/>
           <a:stretch>
             <a:fillRect/>
           </a:stretch>
@@ -6690,7 +6734,7 @@
           <p:nvPr/>
         </p:nvPicPr>
         <p:blipFill>
-          <a:blip r:embed="rId2"/>
+          <a:blip r:embed="rId4"/>
           <a:stretch>
             <a:fillRect/>
           </a:stretch>
@@ -6803,7 +6847,7 @@
           <p:nvPr/>
         </p:nvPicPr>
         <p:blipFill>
-          <a:blip r:embed="rId1"/>
+          <a:blip r:embed="rId3"/>
           <a:stretch>
             <a:fillRect/>
           </a:stretch>
@@ -6959,7 +7003,7 @@
           <p:nvPr/>
         </p:nvPicPr>
         <p:blipFill>
-          <a:blip r:embed="rId1"/>
+          <a:blip r:embed="rId3"/>
           <a:stretch>
             <a:fillRect/>
           </a:stretch>
@@ -7011,7 +7055,7 @@
       </p:grpSpPr>
       <p:sp>
         <p:nvSpPr>
-          <p:cNvPr id="73" name="CustomShape 1"/>
+          <p:cNvPr id="76" name="CustomShape 1"/>
           <p:cNvSpPr/>
           <p:nvPr/>
         </p:nvSpPr>
@@ -7058,7 +7102,7 @@
                 </a:solidFill>
                 <a:latin typeface="Arial"/>
               </a:rPr>
-              <a:t>Sprint #1. </a:t>
+              <a:t>Sprint #1.</a:t>
             </a:r>
             <a:endParaRPr lang="es-ES" sz="2800" b="0" strike="noStrike" spc="-1">
               <a:latin typeface="Arial"/>
@@ -7066,34 +7110,9 @@
           </a:p>
         </p:txBody>
       </p:sp>
-      <p:pic>
-        <p:nvPicPr>
-          <p:cNvPr id="74" name="Imagen 73"/>
-          <p:cNvPicPr/>
-          <p:nvPr/>
-        </p:nvPicPr>
-        <p:blipFill>
-          <a:blip r:embed="rId1"/>
-          <a:stretch>
-            <a:fillRect/>
-          </a:stretch>
-        </p:blipFill>
-        <p:spPr>
-          <a:xfrm>
-            <a:off x="3758040" y="2170800"/>
-            <a:ext cx="2361960" cy="1933200"/>
-          </a:xfrm>
-          <a:prstGeom prst="rect">
-            <a:avLst/>
-          </a:prstGeom>
-          <a:ln>
-            <a:noFill/>
-          </a:ln>
-        </p:spPr>
-      </p:pic>
-      <p:sp>
-        <p:nvSpPr>
-          <p:cNvPr id="75" name="TextShape 2"/>
+      <p:sp>
+        <p:nvSpPr>
+          <p:cNvPr id="77" name="TextShape 2"/>
           <p:cNvSpPr txBox="1"/>
           <p:nvPr/>
         </p:nvSpPr>
@@ -7128,7 +7147,7 @@
                 </a:solidFill>
                 <a:latin typeface="Arial"/>
               </a:rPr>
-              <a:t>Interfaz de Usuario + Visor GIS insertado. </a:t>
+              <a:t>Diagrama de clases de diseño del sprint. </a:t>
             </a:r>
             <a:endParaRPr lang="es-ES" sz="2800" b="0" strike="noStrike" spc="-1">
               <a:latin typeface="Arial"/>
@@ -7136,38 +7155,30 @@
           </a:p>
         </p:txBody>
       </p:sp>
-      <p:sp>
-        <p:nvSpPr>
-          <p:cNvPr id="2" name="CuadroTexto 1"/>
-          <p:cNvSpPr txBox="1"/>
+      <p:pic>
+        <p:nvPicPr>
+          <p:cNvPr id="2" name="Picture 1"/>
+          <p:cNvPicPr>
+            <a:picLocks noChangeAspect="1"/>
+          </p:cNvPicPr>
           <p:nvPr/>
-        </p:nvSpPr>
-        <p:spPr>
-          <a:xfrm>
-            <a:off x="3758040" y="4815068"/>
-            <a:ext cx="2095510" cy="369332"/>
-          </a:xfrm>
-          <a:prstGeom prst="rect">
-            <a:avLst/>
-          </a:prstGeom>
-          <a:noFill/>
-        </p:spPr>
-        <p:txBody>
-          <a:bodyPr wrap="none" rtlCol="0">
-            <a:spAutoFit/>
-          </a:bodyPr>
-          <a:lstStyle/>
-          <a:p>
-            <a:r>
-              <a:rPr lang="es-ES" dirty="0" smtClean="0">
-                <a:hlinkClick r:id="rId2" action="ppaction://hlinkfile"/>
-              </a:rPr>
-              <a:t>Aplicación AGNEX</a:t>
-            </a:r>
-            <a:endParaRPr lang="es-ES" dirty="0"/>
-          </a:p>
-        </p:txBody>
-      </p:sp>
+        </p:nvPicPr>
+        <p:blipFill>
+          <a:blip r:embed="rId3"/>
+          <a:stretch>
+            <a:fillRect/>
+          </a:stretch>
+        </p:blipFill>
+        <p:spPr>
+          <a:xfrm>
+            <a:off x="1221740" y="1925320"/>
+            <a:ext cx="7078980" cy="3176905"/>
+          </a:xfrm>
+          <a:prstGeom prst="rect">
+            <a:avLst/>
+          </a:prstGeom>
+        </p:spPr>
+      </p:pic>
     </p:spTree>
   </p:cSld>
   <p:clrMapOvr>
@@ -7202,7 +7213,7 @@
       </p:grpSpPr>
       <p:sp>
         <p:nvSpPr>
-          <p:cNvPr id="76" name="CustomShape 1"/>
+          <p:cNvPr id="79" name="CustomShape 1"/>
           <p:cNvSpPr/>
           <p:nvPr/>
         </p:nvSpPr>
@@ -7259,7 +7270,7 @@
       </p:sp>
       <p:sp>
         <p:nvSpPr>
-          <p:cNvPr id="77" name="TextShape 2"/>
+          <p:cNvPr id="80" name="TextShape 2"/>
           <p:cNvSpPr txBox="1"/>
           <p:nvPr/>
         </p:nvSpPr>
@@ -7304,26 +7315,27 @@
       </p:sp>
       <p:pic>
         <p:nvPicPr>
-          <p:cNvPr id="2" name="Picture 1"/>
-          <p:cNvPicPr>
-            <a:picLocks noChangeAspect="1"/>
-          </p:cNvPicPr>
+          <p:cNvPr id="81" name="Imagen 80"/>
+          <p:cNvPicPr/>
           <p:nvPr/>
         </p:nvPicPr>
         <p:blipFill>
-          <a:blip r:embed="rId1"/>
+          <a:blip r:embed="rId3"/>
           <a:stretch>
             <a:fillRect/>
           </a:stretch>
         </p:blipFill>
         <p:spPr>
           <a:xfrm>
-            <a:off x="1221740" y="1925320"/>
-            <a:ext cx="7078980" cy="3176905"/>
-          </a:xfrm>
-          <a:prstGeom prst="rect">
-            <a:avLst/>
-          </a:prstGeom>
+            <a:off x="1728000" y="1180800"/>
+            <a:ext cx="5472000" cy="5320080"/>
+          </a:xfrm>
+          <a:prstGeom prst="rect">
+            <a:avLst/>
+          </a:prstGeom>
+          <a:ln>
+            <a:noFill/>
+          </a:ln>
         </p:spPr>
       </p:pic>
     </p:spTree>
@@ -7360,7 +7372,7 @@
       </p:grpSpPr>
       <p:sp>
         <p:nvSpPr>
-          <p:cNvPr id="79" name="CustomShape 1"/>
+          <p:cNvPr id="82" name="CustomShape 1"/>
           <p:cNvSpPr/>
           <p:nvPr/>
         </p:nvSpPr>
@@ -7417,7 +7429,7 @@
       </p:sp>
       <p:sp>
         <p:nvSpPr>
-          <p:cNvPr id="80" name="TextShape 2"/>
+          <p:cNvPr id="83" name="TextShape 2"/>
           <p:cNvSpPr txBox="1"/>
           <p:nvPr/>
         </p:nvSpPr>
@@ -7462,20 +7474,20 @@
       </p:sp>
       <p:pic>
         <p:nvPicPr>
-          <p:cNvPr id="81" name="Imagen 80"/>
+          <p:cNvPr id="84" name="Imagen 83"/>
           <p:cNvPicPr/>
           <p:nvPr/>
         </p:nvPicPr>
         <p:blipFill>
-          <a:blip r:embed="rId1"/>
+          <a:blip r:embed="rId3"/>
           <a:stretch>
             <a:fillRect/>
           </a:stretch>
         </p:blipFill>
         <p:spPr>
           <a:xfrm>
-            <a:off x="1728000" y="1180800"/>
-            <a:ext cx="5472000" cy="5320080"/>
+            <a:off x="1728000" y="1143000"/>
+            <a:ext cx="6768000" cy="5352120"/>
           </a:xfrm>
           <a:prstGeom prst="rect">
             <a:avLst/>
@@ -7519,7 +7531,7 @@
       </p:grpSpPr>
       <p:sp>
         <p:nvSpPr>
-          <p:cNvPr id="82" name="CustomShape 1"/>
+          <p:cNvPr id="85" name="CustomShape 1"/>
           <p:cNvSpPr/>
           <p:nvPr/>
         </p:nvSpPr>
@@ -7576,7 +7588,7 @@
       </p:sp>
       <p:sp>
         <p:nvSpPr>
-          <p:cNvPr id="83" name="TextShape 2"/>
+          <p:cNvPr id="86" name="TextShape 2"/>
           <p:cNvSpPr txBox="1"/>
           <p:nvPr/>
         </p:nvSpPr>
@@ -7621,27 +7633,26 @@
       </p:sp>
       <p:pic>
         <p:nvPicPr>
-          <p:cNvPr id="84" name="Imagen 83"/>
-          <p:cNvPicPr/>
+          <p:cNvPr id="2" name="Picture 1"/>
+          <p:cNvPicPr>
+            <a:picLocks noChangeAspect="1"/>
+          </p:cNvPicPr>
           <p:nvPr/>
         </p:nvPicPr>
         <p:blipFill>
-          <a:blip r:embed="rId1"/>
+          <a:blip r:embed="rId3"/>
           <a:stretch>
             <a:fillRect/>
           </a:stretch>
         </p:blipFill>
         <p:spPr>
           <a:xfrm>
-            <a:off x="1728000" y="1143000"/>
-            <a:ext cx="6768000" cy="5352120"/>
-          </a:xfrm>
-          <a:prstGeom prst="rect">
-            <a:avLst/>
-          </a:prstGeom>
-          <a:ln>
-            <a:noFill/>
-          </a:ln>
+            <a:off x="1811020" y="1867535"/>
+            <a:ext cx="6314440" cy="4571365"/>
+          </a:xfrm>
+          <a:prstGeom prst="rect">
+            <a:avLst/>
+          </a:prstGeom>
         </p:spPr>
       </p:pic>
     </p:spTree>
@@ -7879,6 +7890,8 @@
       </a:bgFillStyleLst>
     </a:fmtScheme>
   </a:themeElements>
+  <a:objectDefaults/>
+  <a:extraClrSchemeLst/>
   <a:extLst>
     <a:ext uri="{05A4C25C-085E-4340-85A3-A5531E510DB2}">
       <thm15:themeFamily xmlns:thm15="http://schemas.microsoft.com/office/thememl/2012/main" name="Office Theme" id="{62F939B6-93AF-4DB8-9C6B-D6C7DFDC589F}" vid="{4A3C46E8-61CC-4603-A589-7422A47A8E4A}"/>
@@ -8107,6 +8120,8 @@
       </a:bgFillStyleLst>
     </a:fmtScheme>
   </a:themeElements>
+  <a:objectDefaults/>
+  <a:extraClrSchemeLst/>
   <a:extLst>
     <a:ext uri="{05A4C25C-085E-4340-85A3-A5531E510DB2}">
       <thm15:themeFamily xmlns:thm15="http://schemas.microsoft.com/office/thememl/2012/main" name="Office Theme" id="{62F939B6-93AF-4DB8-9C6B-D6C7DFDC589F}" vid="{4A3C46E8-61CC-4603-A589-7422A47A8E4A}"/>

</xml_diff>